<commit_message>
Updating thesis slides with more insights and explanation.
</commit_message>
<xml_diff>
--- a/Documents/Thesis/ThesisDissertation.pptx
+++ b/Documents/Thesis/ThesisDissertation.pptx
@@ -8,15 +8,18 @@
     <p:sldId id="256" r:id="rId2"/>
     <p:sldId id="257" r:id="rId3"/>
     <p:sldId id="272" r:id="rId4"/>
-    <p:sldId id="269" r:id="rId5"/>
-    <p:sldId id="271" r:id="rId6"/>
-    <p:sldId id="270" r:id="rId7"/>
-    <p:sldId id="268" r:id="rId8"/>
-    <p:sldId id="273" r:id="rId9"/>
-    <p:sldId id="258" r:id="rId10"/>
-    <p:sldId id="259" r:id="rId11"/>
-    <p:sldId id="264" r:id="rId12"/>
-    <p:sldId id="266" r:id="rId13"/>
+    <p:sldId id="276" r:id="rId5"/>
+    <p:sldId id="274" r:id="rId6"/>
+    <p:sldId id="275" r:id="rId7"/>
+    <p:sldId id="269" r:id="rId8"/>
+    <p:sldId id="271" r:id="rId9"/>
+    <p:sldId id="270" r:id="rId10"/>
+    <p:sldId id="268" r:id="rId11"/>
+    <p:sldId id="273" r:id="rId12"/>
+    <p:sldId id="258" r:id="rId13"/>
+    <p:sldId id="259" r:id="rId14"/>
+    <p:sldId id="264" r:id="rId15"/>
+    <p:sldId id="266" r:id="rId16"/>
   </p:sldIdLst>
   <p:sldSz cx="9144000" cy="6858000" type="screen4x3"/>
   <p:notesSz cx="6858000" cy="9144000"/>
@@ -5235,6 +5238,341 @@
           <a:p>
             <a:r>
               <a:rPr lang="en-US" dirty="0" smtClean="0"/>
+              <a:t>Questions</a:t>
+            </a:r>
+            <a:endParaRPr lang="en-US" dirty="0"/>
+          </a:p>
+        </p:txBody>
+      </p:sp>
+      <p:sp>
+        <p:nvSpPr>
+          <p:cNvPr id="3" name="Content Placeholder 2"/>
+          <p:cNvSpPr>
+            <a:spLocks noGrp="1"/>
+          </p:cNvSpPr>
+          <p:nvPr>
+            <p:ph idx="1"/>
+          </p:nvPr>
+        </p:nvSpPr>
+        <p:spPr/>
+        <p:txBody>
+          <a:bodyPr>
+            <a:normAutofit/>
+          </a:bodyPr>
+          <a:lstStyle/>
+          <a:p>
+            <a:pPr marL="0" indent="0" algn="ctr">
+              <a:buNone/>
+            </a:pPr>
+            <a:endParaRPr lang="en-US" dirty="0"/>
+          </a:p>
+          <a:p>
+            <a:pPr marL="0" indent="0" algn="ctr">
+              <a:buNone/>
+            </a:pPr>
+            <a:r>
+              <a:rPr lang="en-US" sz="13800" dirty="0" smtClean="0"/>
+              <a:t>?</a:t>
+            </a:r>
+            <a:endParaRPr lang="en-US" sz="13800" dirty="0"/>
+          </a:p>
+        </p:txBody>
+      </p:sp>
+    </p:spTree>
+    <p:extLst>
+      <p:ext uri="{BB962C8B-B14F-4D97-AF65-F5344CB8AC3E}">
+        <p14:creationId xmlns:p14="http://schemas.microsoft.com/office/powerpoint/2010/main" val="1104780982"/>
+      </p:ext>
+    </p:extLst>
+  </p:cSld>
+  <p:clrMapOvr>
+    <a:masterClrMapping/>
+  </p:clrMapOvr>
+  <p:timing>
+    <p:tnLst>
+      <p:par>
+        <p:cTn xmlns:p14="http://schemas.microsoft.com/office/powerpoint/2010/main" id="1" dur="indefinite" restart="never" nodeType="tmRoot"/>
+      </p:par>
+    </p:tnLst>
+  </p:timing>
+</p:sld>
+</file>
+
+<file path=ppt/slides/slide11.xml><?xml version="1.0" encoding="utf-8"?>
+<p:sld xmlns:a="http://schemas.openxmlformats.org/drawingml/2006/main" xmlns:r="http://schemas.openxmlformats.org/officeDocument/2006/relationships" xmlns:p="http://schemas.openxmlformats.org/presentationml/2006/main">
+  <p:cSld>
+    <p:spTree>
+      <p:nvGrpSpPr>
+        <p:cNvPr id="1" name=""/>
+        <p:cNvGrpSpPr/>
+        <p:nvPr/>
+      </p:nvGrpSpPr>
+      <p:grpSpPr>
+        <a:xfrm>
+          <a:off x="0" y="0"/>
+          <a:ext cx="0" cy="0"/>
+          <a:chOff x="0" y="0"/>
+          <a:chExt cx="0" cy="0"/>
+        </a:xfrm>
+      </p:grpSpPr>
+      <p:sp>
+        <p:nvSpPr>
+          <p:cNvPr id="2" name="Title 1"/>
+          <p:cNvSpPr>
+            <a:spLocks noGrp="1"/>
+          </p:cNvSpPr>
+          <p:nvPr>
+            <p:ph type="title"/>
+          </p:nvPr>
+        </p:nvSpPr>
+        <p:spPr/>
+        <p:txBody>
+          <a:bodyPr/>
+          <a:lstStyle/>
+          <a:p>
+            <a:r>
+              <a:rPr lang="en-US" dirty="0" smtClean="0"/>
+              <a:t>Images</a:t>
+            </a:r>
+            <a:endParaRPr lang="en-US" dirty="0"/>
+          </a:p>
+        </p:txBody>
+      </p:sp>
+      <p:sp>
+        <p:nvSpPr>
+          <p:cNvPr id="3" name="Content Placeholder 2"/>
+          <p:cNvSpPr>
+            <a:spLocks noGrp="1"/>
+          </p:cNvSpPr>
+          <p:nvPr>
+            <p:ph idx="1"/>
+          </p:nvPr>
+        </p:nvSpPr>
+        <p:spPr/>
+        <p:txBody>
+          <a:bodyPr/>
+          <a:lstStyle/>
+          <a:p>
+            <a:pPr marL="457200" indent="-457200">
+              <a:buFont typeface="+mj-lt"/>
+              <a:buAutoNum type="arabicPeriod"/>
+            </a:pPr>
+            <a:r>
+              <a:rPr lang="en-US" dirty="0">
+                <a:hlinkClick r:id="rId2"/>
+              </a:rPr>
+              <a:t>http://www.goodfuneralguide.co.uk/wordpress/wp-content/uploads/2013/04/two-cartoon-men-</a:t>
+            </a:r>
+            <a:r>
+              <a:rPr lang="en-US" dirty="0" smtClean="0">
+                <a:hlinkClick r:id="rId2"/>
+              </a:rPr>
+              <a:t>yelling.jpg</a:t>
+            </a:r>
+            <a:endParaRPr lang="en-US" dirty="0" smtClean="0"/>
+          </a:p>
+          <a:p>
+            <a:pPr marL="457200" indent="-457200">
+              <a:buFont typeface="+mj-lt"/>
+              <a:buAutoNum type="arabicPeriod"/>
+            </a:pPr>
+            <a:endParaRPr lang="en-US" dirty="0"/>
+          </a:p>
+        </p:txBody>
+      </p:sp>
+    </p:spTree>
+    <p:extLst>
+      <p:ext uri="{BB962C8B-B14F-4D97-AF65-F5344CB8AC3E}">
+        <p14:creationId xmlns:p14="http://schemas.microsoft.com/office/powerpoint/2010/main" val="2113985035"/>
+      </p:ext>
+    </p:extLst>
+  </p:cSld>
+  <p:clrMapOvr>
+    <a:masterClrMapping/>
+  </p:clrMapOvr>
+</p:sld>
+</file>
+
+<file path=ppt/slides/slide12.xml><?xml version="1.0" encoding="utf-8"?>
+<p:sld xmlns:a="http://schemas.openxmlformats.org/drawingml/2006/main" xmlns:r="http://schemas.openxmlformats.org/officeDocument/2006/relationships" xmlns:p="http://schemas.openxmlformats.org/presentationml/2006/main">
+  <p:cSld>
+    <p:spTree>
+      <p:nvGrpSpPr>
+        <p:cNvPr id="1" name=""/>
+        <p:cNvGrpSpPr/>
+        <p:nvPr/>
+      </p:nvGrpSpPr>
+      <p:grpSpPr>
+        <a:xfrm>
+          <a:off x="0" y="0"/>
+          <a:ext cx="0" cy="0"/>
+          <a:chOff x="0" y="0"/>
+          <a:chExt cx="0" cy="0"/>
+        </a:xfrm>
+      </p:grpSpPr>
+      <p:sp>
+        <p:nvSpPr>
+          <p:cNvPr id="2" name="Title 1"/>
+          <p:cNvSpPr>
+            <a:spLocks noGrp="1"/>
+          </p:cNvSpPr>
+          <p:nvPr>
+            <p:ph type="title"/>
+          </p:nvPr>
+        </p:nvSpPr>
+        <p:spPr/>
+        <p:txBody>
+          <a:bodyPr/>
+          <a:lstStyle/>
+          <a:p>
+            <a:r>
+              <a:rPr lang="en-US" dirty="0" smtClean="0"/>
+              <a:t>User Questions and Needs</a:t>
+            </a:r>
+            <a:endParaRPr lang="en-US" dirty="0"/>
+          </a:p>
+        </p:txBody>
+      </p:sp>
+      <p:sp>
+        <p:nvSpPr>
+          <p:cNvPr id="3" name="Content Placeholder 2"/>
+          <p:cNvSpPr>
+            <a:spLocks noGrp="1"/>
+          </p:cNvSpPr>
+          <p:nvPr>
+            <p:ph idx="1"/>
+          </p:nvPr>
+        </p:nvSpPr>
+        <p:spPr>
+          <a:xfrm>
+            <a:off x="739775" y="2770094"/>
+            <a:ext cx="2600917" cy="4003522"/>
+          </a:xfrm>
+        </p:spPr>
+        <p:txBody>
+          <a:bodyPr>
+            <a:normAutofit fontScale="92500" lnSpcReduction="20000"/>
+          </a:bodyPr>
+          <a:lstStyle/>
+          <a:p>
+            <a:r>
+              <a:rPr lang="en-US" dirty="0" smtClean="0"/>
+              <a:t>How difficult is this piece</a:t>
+            </a:r>
+            <a:r>
+              <a:rPr lang="en-US" dirty="0"/>
+              <a:t> </a:t>
+            </a:r>
+            <a:r>
+              <a:rPr lang="en-US" dirty="0" smtClean="0"/>
+              <a:t>of music?</a:t>
+            </a:r>
+          </a:p>
+          <a:p>
+            <a:r>
+              <a:rPr lang="en-US" dirty="0" smtClean="0"/>
+              <a:t>What makes this piece of music more or less difficult than others?</a:t>
+            </a:r>
+          </a:p>
+          <a:p>
+            <a:r>
+              <a:rPr lang="en-US" dirty="0" smtClean="0"/>
+              <a:t>What portion of this piece is the most difficult?</a:t>
+            </a:r>
+          </a:p>
+          <a:p>
+            <a:r>
+              <a:rPr lang="en-US" dirty="0" smtClean="0"/>
+              <a:t>Why?</a:t>
+            </a:r>
+            <a:endParaRPr lang="en-US" dirty="0"/>
+          </a:p>
+        </p:txBody>
+      </p:sp>
+      <p:pic>
+        <p:nvPicPr>
+          <p:cNvPr id="5" name="Picture 4" descr="Screen Shot 2015-03-17 at 4.07.36 PM.png"/>
+          <p:cNvPicPr>
+            <a:picLocks noChangeAspect="1"/>
+          </p:cNvPicPr>
+          <p:nvPr/>
+        </p:nvPicPr>
+        <p:blipFill>
+          <a:blip r:embed="rId2">
+            <a:extLst>
+              <a:ext uri="{28A0092B-C50C-407E-A947-70E740481C1C}">
+                <a14:useLocalDpi xmlns:a14="http://schemas.microsoft.com/office/drawing/2010/main" val="0"/>
+              </a:ext>
+            </a:extLst>
+          </a:blip>
+          <a:stretch>
+            <a:fillRect/>
+          </a:stretch>
+        </p:blipFill>
+        <p:spPr>
+          <a:xfrm>
+            <a:off x="3831319" y="1830708"/>
+            <a:ext cx="5209881" cy="4794164"/>
+          </a:xfrm>
+          <a:prstGeom prst="rect">
+            <a:avLst/>
+          </a:prstGeom>
+        </p:spPr>
+      </p:pic>
+    </p:spTree>
+    <p:extLst>
+      <p:ext uri="{BB962C8B-B14F-4D97-AF65-F5344CB8AC3E}">
+        <p14:creationId xmlns:p14="http://schemas.microsoft.com/office/powerpoint/2010/main" val="3557287677"/>
+      </p:ext>
+    </p:extLst>
+  </p:cSld>
+  <p:clrMapOvr>
+    <a:masterClrMapping/>
+  </p:clrMapOvr>
+  <p:timing>
+    <p:tnLst>
+      <p:par>
+        <p:cTn xmlns:p14="http://schemas.microsoft.com/office/powerpoint/2010/main" id="1" dur="indefinite" restart="never" nodeType="tmRoot"/>
+      </p:par>
+    </p:tnLst>
+  </p:timing>
+</p:sld>
+</file>
+
+<file path=ppt/slides/slide13.xml><?xml version="1.0" encoding="utf-8"?>
+<p:sld xmlns:a="http://schemas.openxmlformats.org/drawingml/2006/main" xmlns:r="http://schemas.openxmlformats.org/officeDocument/2006/relationships" xmlns:p="http://schemas.openxmlformats.org/presentationml/2006/main">
+  <p:cSld>
+    <p:spTree>
+      <p:nvGrpSpPr>
+        <p:cNvPr id="1" name=""/>
+        <p:cNvGrpSpPr/>
+        <p:nvPr/>
+      </p:nvGrpSpPr>
+      <p:grpSpPr>
+        <a:xfrm>
+          <a:off x="0" y="0"/>
+          <a:ext cx="0" cy="0"/>
+          <a:chOff x="0" y="0"/>
+          <a:chExt cx="0" cy="0"/>
+        </a:xfrm>
+      </p:grpSpPr>
+      <p:sp>
+        <p:nvSpPr>
+          <p:cNvPr id="2" name="Title 1"/>
+          <p:cNvSpPr>
+            <a:spLocks noGrp="1"/>
+          </p:cNvSpPr>
+          <p:nvPr>
+            <p:ph type="title"/>
+          </p:nvPr>
+        </p:nvSpPr>
+        <p:spPr/>
+        <p:txBody>
+          <a:bodyPr/>
+          <a:lstStyle/>
+          <a:p>
+            <a:r>
+              <a:rPr lang="en-US" dirty="0" smtClean="0"/>
               <a:t>Problem</a:t>
             </a:r>
             <a:endParaRPr lang="en-US" dirty="0"/>
@@ -5317,7 +5655,7 @@
 </p:sld>
 </file>
 
-<file path=ppt/slides/slide11.xml><?xml version="1.0" encoding="utf-8"?>
+<file path=ppt/slides/slide14.xml><?xml version="1.0" encoding="utf-8"?>
 <p:sld xmlns:a="http://schemas.openxmlformats.org/drawingml/2006/main" xmlns:r="http://schemas.openxmlformats.org/officeDocument/2006/relationships" xmlns:p="http://schemas.openxmlformats.org/presentationml/2006/main">
   <p:cSld>
     <p:spTree>
@@ -5458,7 +5796,7 @@
 </p:sld>
 </file>
 
-<file path=ppt/slides/slide12.xml><?xml version="1.0" encoding="utf-8"?>
+<file path=ppt/slides/slide15.xml><?xml version="1.0" encoding="utf-8"?>
 <p:sld xmlns:a="http://schemas.openxmlformats.org/drawingml/2006/main" xmlns:r="http://schemas.openxmlformats.org/officeDocument/2006/relationships" xmlns:p="http://schemas.openxmlformats.org/presentationml/2006/main">
   <p:cSld>
     <p:spTree>
@@ -5829,7 +6167,7 @@
         </p:spPr>
         <p:txBody>
           <a:bodyPr>
-            <a:normAutofit fontScale="92500"/>
+            <a:normAutofit/>
           </a:bodyPr>
           <a:lstStyle/>
           <a:p>
@@ -5842,18 +6180,6 @@
             <a:r>
               <a:rPr lang="en-US" dirty="0" smtClean="0"/>
               <a:t>Musicians can agree that notes in different registers pose different difficulties on wind instruments, although they may not agree on the magnitude of the difference.</a:t>
-            </a:r>
-          </a:p>
-          <a:p>
-            <a:r>
-              <a:rPr lang="en-US" dirty="0" smtClean="0"/>
-              <a:t>Computing offers us the capability to build upon that insight by relaxing the cognitive load required to measure it.</a:t>
-            </a:r>
-          </a:p>
-          <a:p>
-            <a:r>
-              <a:rPr lang="en-US" dirty="0" smtClean="0"/>
-              <a:t>Educators, performers, professionals, composers, publishers, and more can leverage this technology to simplify their work.</a:t>
             </a:r>
             <a:endParaRPr lang="en-US" dirty="0"/>
           </a:p>
@@ -5913,6 +6239,289 @@
           </a:p>
         </p:txBody>
       </p:sp>
+      <p:pic>
+        <p:nvPicPr>
+          <p:cNvPr id="6" name="Picture 5" descr="BGExampleText.png"/>
+          <p:cNvPicPr>
+            <a:picLocks noChangeAspect="1"/>
+          </p:cNvPicPr>
+          <p:nvPr/>
+        </p:nvPicPr>
+        <p:blipFill>
+          <a:blip r:embed="rId3">
+            <a:extLst>
+              <a:ext uri="{28A0092B-C50C-407E-A947-70E740481C1C}">
+                <a14:useLocalDpi xmlns:a14="http://schemas.microsoft.com/office/drawing/2010/main" val="0"/>
+              </a:ext>
+            </a:extLst>
+          </a:blip>
+          <a:stretch>
+            <a:fillRect/>
+          </a:stretch>
+        </p:blipFill>
+        <p:spPr>
+          <a:xfrm>
+            <a:off x="1267319" y="5598090"/>
+            <a:ext cx="5016500" cy="863600"/>
+          </a:xfrm>
+          <a:prstGeom prst="rect">
+            <a:avLst/>
+          </a:prstGeom>
+        </p:spPr>
+      </p:pic>
+      <p:sp>
+        <p:nvSpPr>
+          <p:cNvPr id="7" name="Content Placeholder 2"/>
+          <p:cNvSpPr txBox="1">
+            <a:spLocks/>
+          </p:cNvSpPr>
+          <p:nvPr/>
+        </p:nvSpPr>
+        <p:spPr>
+          <a:xfrm>
+            <a:off x="5609102" y="4980921"/>
+            <a:ext cx="2350495" cy="1792311"/>
+          </a:xfrm>
+          <a:prstGeom prst="rect">
+            <a:avLst/>
+          </a:prstGeom>
+        </p:spPr>
+        <p:txBody>
+          <a:bodyPr vert="horz" lIns="91440" tIns="45720" rIns="91440" bIns="45720" rtlCol="0">
+            <a:normAutofit fontScale="70000" lnSpcReduction="20000"/>
+          </a:bodyPr>
+          <a:lstStyle>
+            <a:lvl1pPr marL="342900" indent="-342900" algn="l" defTabSz="914400" rtl="0" eaLnBrk="1" latinLnBrk="0" hangingPunct="1">
+              <a:spcBef>
+                <a:spcPts val="2000"/>
+              </a:spcBef>
+              <a:buClr>
+                <a:schemeClr val="accent1"/>
+              </a:buClr>
+              <a:buSzPct val="90000"/>
+              <a:buFont typeface="Wingdings" pitchFamily="2" charset="2"/>
+              <a:buChar char="S"/>
+              <a:defRPr sz="2200" kern="1200">
+                <a:solidFill>
+                  <a:schemeClr val="tx1">
+                    <a:lumMod val="65000"/>
+                    <a:lumOff val="35000"/>
+                  </a:schemeClr>
+                </a:solidFill>
+                <a:latin typeface="+mn-lt"/>
+                <a:ea typeface="+mn-ea"/>
+                <a:cs typeface="+mn-cs"/>
+              </a:defRPr>
+            </a:lvl1pPr>
+            <a:lvl2pPr marL="685800" indent="-336550" algn="l" defTabSz="914400" rtl="0" eaLnBrk="1" latinLnBrk="0" hangingPunct="1">
+              <a:spcBef>
+                <a:spcPts val="600"/>
+              </a:spcBef>
+              <a:buClr>
+                <a:schemeClr val="accent1">
+                  <a:lumMod val="60000"/>
+                  <a:lumOff val="40000"/>
+                </a:schemeClr>
+              </a:buClr>
+              <a:buSzPct val="90000"/>
+              <a:buFont typeface="Wingdings" pitchFamily="2" charset="2"/>
+              <a:buChar char="S"/>
+              <a:defRPr sz="2000" kern="1200">
+                <a:solidFill>
+                  <a:schemeClr val="tx1">
+                    <a:lumMod val="65000"/>
+                    <a:lumOff val="35000"/>
+                  </a:schemeClr>
+                </a:solidFill>
+                <a:latin typeface="+mn-lt"/>
+                <a:ea typeface="+mn-ea"/>
+                <a:cs typeface="+mn-cs"/>
+              </a:defRPr>
+            </a:lvl2pPr>
+            <a:lvl3pPr marL="1035050" indent="-349250" algn="l" defTabSz="914400" rtl="0" eaLnBrk="1" latinLnBrk="0" hangingPunct="1">
+              <a:spcBef>
+                <a:spcPts val="600"/>
+              </a:spcBef>
+              <a:buClr>
+                <a:schemeClr val="accent1"/>
+              </a:buClr>
+              <a:buSzPct val="90000"/>
+              <a:buFont typeface="Wingdings" pitchFamily="2" charset="2"/>
+              <a:buChar char="S"/>
+              <a:defRPr sz="1800" kern="1200">
+                <a:solidFill>
+                  <a:schemeClr val="tx1">
+                    <a:lumMod val="65000"/>
+                    <a:lumOff val="35000"/>
+                  </a:schemeClr>
+                </a:solidFill>
+                <a:latin typeface="+mn-lt"/>
+                <a:ea typeface="+mn-ea"/>
+                <a:cs typeface="+mn-cs"/>
+              </a:defRPr>
+            </a:lvl3pPr>
+            <a:lvl4pPr marL="1371600" indent="-336550" algn="l" defTabSz="914400" rtl="0" eaLnBrk="1" latinLnBrk="0" hangingPunct="1">
+              <a:spcBef>
+                <a:spcPts val="600"/>
+              </a:spcBef>
+              <a:buClr>
+                <a:schemeClr val="accent1">
+                  <a:lumMod val="60000"/>
+                  <a:lumOff val="40000"/>
+                </a:schemeClr>
+              </a:buClr>
+              <a:buSzPct val="90000"/>
+              <a:buFont typeface="Wingdings" pitchFamily="2" charset="2"/>
+              <a:buChar char="S"/>
+              <a:defRPr sz="1800" kern="1200">
+                <a:solidFill>
+                  <a:schemeClr val="tx1">
+                    <a:lumMod val="65000"/>
+                    <a:lumOff val="35000"/>
+                  </a:schemeClr>
+                </a:solidFill>
+                <a:latin typeface="+mn-lt"/>
+                <a:ea typeface="+mn-ea"/>
+                <a:cs typeface="+mn-cs"/>
+              </a:defRPr>
+            </a:lvl4pPr>
+            <a:lvl5pPr marL="1720850" indent="-349250" algn="l" defTabSz="914400" rtl="0" eaLnBrk="1" latinLnBrk="0" hangingPunct="1">
+              <a:spcBef>
+                <a:spcPts val="600"/>
+              </a:spcBef>
+              <a:buClr>
+                <a:schemeClr val="accent1"/>
+              </a:buClr>
+              <a:buSzPct val="90000"/>
+              <a:buFont typeface="Wingdings" pitchFamily="2" charset="2"/>
+              <a:buChar char="S"/>
+              <a:defRPr sz="1800" kern="1200">
+                <a:solidFill>
+                  <a:schemeClr val="tx1">
+                    <a:lumMod val="65000"/>
+                    <a:lumOff val="35000"/>
+                  </a:schemeClr>
+                </a:solidFill>
+                <a:latin typeface="+mn-lt"/>
+                <a:ea typeface="+mn-ea"/>
+                <a:cs typeface="+mn-cs"/>
+              </a:defRPr>
+            </a:lvl5pPr>
+            <a:lvl6pPr marL="2055813" indent="-344488" algn="l" defTabSz="914400" rtl="0" eaLnBrk="1" latinLnBrk="0" hangingPunct="1">
+              <a:spcBef>
+                <a:spcPct val="20000"/>
+              </a:spcBef>
+              <a:buClr>
+                <a:schemeClr val="accent1">
+                  <a:lumMod val="60000"/>
+                  <a:lumOff val="40000"/>
+                </a:schemeClr>
+              </a:buClr>
+              <a:buSzPct val="90000"/>
+              <a:buFont typeface="Wingdings" pitchFamily="2" charset="2"/>
+              <a:buChar char=""/>
+              <a:defRPr lang="en-US" sz="1800" kern="1200" dirty="0" smtClean="0">
+                <a:solidFill>
+                  <a:schemeClr val="tx1">
+                    <a:lumMod val="65000"/>
+                    <a:lumOff val="35000"/>
+                  </a:schemeClr>
+                </a:solidFill>
+                <a:latin typeface="+mn-lt"/>
+                <a:ea typeface="+mn-ea"/>
+                <a:cs typeface="+mn-cs"/>
+              </a:defRPr>
+            </a:lvl6pPr>
+            <a:lvl7pPr marL="2398713" indent="-344488" algn="l" defTabSz="914400" rtl="0" eaLnBrk="1" latinLnBrk="0" hangingPunct="1">
+              <a:spcBef>
+                <a:spcPct val="20000"/>
+              </a:spcBef>
+              <a:buClr>
+                <a:schemeClr val="accent1"/>
+              </a:buClr>
+              <a:buSzPct val="90000"/>
+              <a:buFont typeface="Wingdings" pitchFamily="2" charset="2"/>
+              <a:buChar char=""/>
+              <a:defRPr lang="en-US" sz="1800" kern="1200" dirty="0" smtClean="0">
+                <a:solidFill>
+                  <a:schemeClr val="tx1">
+                    <a:lumMod val="65000"/>
+                    <a:lumOff val="35000"/>
+                  </a:schemeClr>
+                </a:solidFill>
+                <a:latin typeface="+mn-lt"/>
+                <a:ea typeface="+mn-ea"/>
+                <a:cs typeface="+mn-cs"/>
+              </a:defRPr>
+            </a:lvl7pPr>
+            <a:lvl8pPr marL="2743200" indent="-344488" algn="l" defTabSz="914400" rtl="0" eaLnBrk="1" latinLnBrk="0" hangingPunct="1">
+              <a:spcBef>
+                <a:spcPct val="20000"/>
+              </a:spcBef>
+              <a:buClr>
+                <a:schemeClr val="accent1">
+                  <a:lumMod val="60000"/>
+                  <a:lumOff val="40000"/>
+                </a:schemeClr>
+              </a:buClr>
+              <a:buSzPct val="90000"/>
+              <a:buFont typeface="Wingdings" pitchFamily="2" charset="2"/>
+              <a:buChar char=""/>
+              <a:defRPr lang="en-US" sz="1800" kern="1200" dirty="0" smtClean="0">
+                <a:solidFill>
+                  <a:schemeClr val="tx1">
+                    <a:lumMod val="65000"/>
+                    <a:lumOff val="35000"/>
+                  </a:schemeClr>
+                </a:solidFill>
+                <a:latin typeface="+mn-lt"/>
+                <a:ea typeface="+mn-ea"/>
+                <a:cs typeface="+mn-cs"/>
+              </a:defRPr>
+            </a:lvl8pPr>
+            <a:lvl9pPr marL="3087688" indent="-344488" algn="l" defTabSz="914400" rtl="0" eaLnBrk="1" latinLnBrk="0" hangingPunct="1">
+              <a:spcBef>
+                <a:spcPct val="20000"/>
+              </a:spcBef>
+              <a:buClr>
+                <a:schemeClr val="accent1"/>
+              </a:buClr>
+              <a:buSzPct val="90000"/>
+              <a:buFont typeface="Wingdings" pitchFamily="2" charset="2"/>
+              <a:buChar char=""/>
+              <a:defRPr lang="en-US" sz="1800" kern="1200" dirty="0">
+                <a:solidFill>
+                  <a:schemeClr val="tx1">
+                    <a:lumMod val="65000"/>
+                    <a:lumOff val="35000"/>
+                  </a:schemeClr>
+                </a:solidFill>
+                <a:latin typeface="+mn-lt"/>
+                <a:ea typeface="+mn-ea"/>
+                <a:cs typeface="+mn-cs"/>
+              </a:defRPr>
+            </a:lvl9pPr>
+          </a:lstStyle>
+          <a:p>
+            <a:pPr marL="0" indent="0" algn="ctr">
+              <a:buFont typeface="Wingdings" pitchFamily="2" charset="2"/>
+              <a:buNone/>
+            </a:pPr>
+            <a:endParaRPr lang="en-US" dirty="0" smtClean="0"/>
+          </a:p>
+          <a:p>
+            <a:pPr marL="0" indent="0" algn="ctr">
+              <a:buFont typeface="Wingdings" pitchFamily="2" charset="2"/>
+              <a:buNone/>
+            </a:pPr>
+            <a:r>
+              <a:rPr lang="en-US" sz="13800" dirty="0" smtClean="0"/>
+              <a:t>?</a:t>
+            </a:r>
+            <a:endParaRPr lang="en-US" sz="13800" dirty="0"/>
+          </a:p>
+        </p:txBody>
+      </p:sp>
     </p:spTree>
     <p:extLst>
       <p:ext uri="{BB962C8B-B14F-4D97-AF65-F5344CB8AC3E}">
@@ -5934,6 +6543,522 @@
 </file>
 
 <file path=ppt/slides/slide4.xml><?xml version="1.0" encoding="utf-8"?>
+<p:sld xmlns:a="http://schemas.openxmlformats.org/drawingml/2006/main" xmlns:r="http://schemas.openxmlformats.org/officeDocument/2006/relationships" xmlns:p="http://schemas.openxmlformats.org/presentationml/2006/main">
+  <p:cSld>
+    <p:spTree>
+      <p:nvGrpSpPr>
+        <p:cNvPr id="1" name=""/>
+        <p:cNvGrpSpPr/>
+        <p:nvPr/>
+      </p:nvGrpSpPr>
+      <p:grpSpPr>
+        <a:xfrm>
+          <a:off x="0" y="0"/>
+          <a:ext cx="0" cy="0"/>
+          <a:chOff x="0" y="0"/>
+          <a:chExt cx="0" cy="0"/>
+        </a:xfrm>
+      </p:grpSpPr>
+      <p:sp>
+        <p:nvSpPr>
+          <p:cNvPr id="2" name="Title 1"/>
+          <p:cNvSpPr>
+            <a:spLocks noGrp="1"/>
+          </p:cNvSpPr>
+          <p:nvPr>
+            <p:ph type="title"/>
+          </p:nvPr>
+        </p:nvSpPr>
+        <p:spPr/>
+        <p:txBody>
+          <a:bodyPr/>
+          <a:lstStyle/>
+          <a:p>
+            <a:r>
+              <a:rPr lang="en-US" dirty="0" smtClean="0"/>
+              <a:t>Insights</a:t>
+            </a:r>
+            <a:endParaRPr lang="en-US" dirty="0"/>
+          </a:p>
+        </p:txBody>
+      </p:sp>
+      <p:sp>
+        <p:nvSpPr>
+          <p:cNvPr id="3" name="Content Placeholder 2"/>
+          <p:cNvSpPr>
+            <a:spLocks noGrp="1"/>
+          </p:cNvSpPr>
+          <p:nvPr>
+            <p:ph idx="1"/>
+          </p:nvPr>
+        </p:nvSpPr>
+        <p:spPr/>
+        <p:txBody>
+          <a:bodyPr/>
+          <a:lstStyle/>
+          <a:p>
+            <a:r>
+              <a:rPr lang="en-US" dirty="0" smtClean="0"/>
+              <a:t>Notes on string and percussion instruments do not suffer as large a difference, but intervals between those notes impose varying difficulties analogously.</a:t>
+            </a:r>
+            <a:endParaRPr lang="en-US" dirty="0"/>
+          </a:p>
+        </p:txBody>
+      </p:sp>
+      <p:sp>
+        <p:nvSpPr>
+          <p:cNvPr id="5" name="Content Placeholder 2"/>
+          <p:cNvSpPr txBox="1">
+            <a:spLocks/>
+          </p:cNvSpPr>
+          <p:nvPr/>
+        </p:nvSpPr>
+        <p:spPr>
+          <a:xfrm>
+            <a:off x="5609102" y="4980921"/>
+            <a:ext cx="2350495" cy="1792311"/>
+          </a:xfrm>
+          <a:prstGeom prst="rect">
+            <a:avLst/>
+          </a:prstGeom>
+        </p:spPr>
+        <p:txBody>
+          <a:bodyPr vert="horz" lIns="91440" tIns="45720" rIns="91440" bIns="45720" rtlCol="0">
+            <a:normAutofit fontScale="70000" lnSpcReduction="20000"/>
+          </a:bodyPr>
+          <a:lstStyle>
+            <a:lvl1pPr marL="342900" indent="-342900" algn="l" defTabSz="914400" rtl="0" eaLnBrk="1" latinLnBrk="0" hangingPunct="1">
+              <a:spcBef>
+                <a:spcPts val="2000"/>
+              </a:spcBef>
+              <a:buClr>
+                <a:schemeClr val="accent1"/>
+              </a:buClr>
+              <a:buSzPct val="90000"/>
+              <a:buFont typeface="Wingdings" pitchFamily="2" charset="2"/>
+              <a:buChar char="S"/>
+              <a:defRPr sz="2200" kern="1200">
+                <a:solidFill>
+                  <a:schemeClr val="tx1">
+                    <a:lumMod val="65000"/>
+                    <a:lumOff val="35000"/>
+                  </a:schemeClr>
+                </a:solidFill>
+                <a:latin typeface="+mn-lt"/>
+                <a:ea typeface="+mn-ea"/>
+                <a:cs typeface="+mn-cs"/>
+              </a:defRPr>
+            </a:lvl1pPr>
+            <a:lvl2pPr marL="685800" indent="-336550" algn="l" defTabSz="914400" rtl="0" eaLnBrk="1" latinLnBrk="0" hangingPunct="1">
+              <a:spcBef>
+                <a:spcPts val="600"/>
+              </a:spcBef>
+              <a:buClr>
+                <a:schemeClr val="accent1">
+                  <a:lumMod val="60000"/>
+                  <a:lumOff val="40000"/>
+                </a:schemeClr>
+              </a:buClr>
+              <a:buSzPct val="90000"/>
+              <a:buFont typeface="Wingdings" pitchFamily="2" charset="2"/>
+              <a:buChar char="S"/>
+              <a:defRPr sz="2000" kern="1200">
+                <a:solidFill>
+                  <a:schemeClr val="tx1">
+                    <a:lumMod val="65000"/>
+                    <a:lumOff val="35000"/>
+                  </a:schemeClr>
+                </a:solidFill>
+                <a:latin typeface="+mn-lt"/>
+                <a:ea typeface="+mn-ea"/>
+                <a:cs typeface="+mn-cs"/>
+              </a:defRPr>
+            </a:lvl2pPr>
+            <a:lvl3pPr marL="1035050" indent="-349250" algn="l" defTabSz="914400" rtl="0" eaLnBrk="1" latinLnBrk="0" hangingPunct="1">
+              <a:spcBef>
+                <a:spcPts val="600"/>
+              </a:spcBef>
+              <a:buClr>
+                <a:schemeClr val="accent1"/>
+              </a:buClr>
+              <a:buSzPct val="90000"/>
+              <a:buFont typeface="Wingdings" pitchFamily="2" charset="2"/>
+              <a:buChar char="S"/>
+              <a:defRPr sz="1800" kern="1200">
+                <a:solidFill>
+                  <a:schemeClr val="tx1">
+                    <a:lumMod val="65000"/>
+                    <a:lumOff val="35000"/>
+                  </a:schemeClr>
+                </a:solidFill>
+                <a:latin typeface="+mn-lt"/>
+                <a:ea typeface="+mn-ea"/>
+                <a:cs typeface="+mn-cs"/>
+              </a:defRPr>
+            </a:lvl3pPr>
+            <a:lvl4pPr marL="1371600" indent="-336550" algn="l" defTabSz="914400" rtl="0" eaLnBrk="1" latinLnBrk="0" hangingPunct="1">
+              <a:spcBef>
+                <a:spcPts val="600"/>
+              </a:spcBef>
+              <a:buClr>
+                <a:schemeClr val="accent1">
+                  <a:lumMod val="60000"/>
+                  <a:lumOff val="40000"/>
+                </a:schemeClr>
+              </a:buClr>
+              <a:buSzPct val="90000"/>
+              <a:buFont typeface="Wingdings" pitchFamily="2" charset="2"/>
+              <a:buChar char="S"/>
+              <a:defRPr sz="1800" kern="1200">
+                <a:solidFill>
+                  <a:schemeClr val="tx1">
+                    <a:lumMod val="65000"/>
+                    <a:lumOff val="35000"/>
+                  </a:schemeClr>
+                </a:solidFill>
+                <a:latin typeface="+mn-lt"/>
+                <a:ea typeface="+mn-ea"/>
+                <a:cs typeface="+mn-cs"/>
+              </a:defRPr>
+            </a:lvl4pPr>
+            <a:lvl5pPr marL="1720850" indent="-349250" algn="l" defTabSz="914400" rtl="0" eaLnBrk="1" latinLnBrk="0" hangingPunct="1">
+              <a:spcBef>
+                <a:spcPts val="600"/>
+              </a:spcBef>
+              <a:buClr>
+                <a:schemeClr val="accent1"/>
+              </a:buClr>
+              <a:buSzPct val="90000"/>
+              <a:buFont typeface="Wingdings" pitchFamily="2" charset="2"/>
+              <a:buChar char="S"/>
+              <a:defRPr sz="1800" kern="1200">
+                <a:solidFill>
+                  <a:schemeClr val="tx1">
+                    <a:lumMod val="65000"/>
+                    <a:lumOff val="35000"/>
+                  </a:schemeClr>
+                </a:solidFill>
+                <a:latin typeface="+mn-lt"/>
+                <a:ea typeface="+mn-ea"/>
+                <a:cs typeface="+mn-cs"/>
+              </a:defRPr>
+            </a:lvl5pPr>
+            <a:lvl6pPr marL="2055813" indent="-344488" algn="l" defTabSz="914400" rtl="0" eaLnBrk="1" latinLnBrk="0" hangingPunct="1">
+              <a:spcBef>
+                <a:spcPct val="20000"/>
+              </a:spcBef>
+              <a:buClr>
+                <a:schemeClr val="accent1">
+                  <a:lumMod val="60000"/>
+                  <a:lumOff val="40000"/>
+                </a:schemeClr>
+              </a:buClr>
+              <a:buSzPct val="90000"/>
+              <a:buFont typeface="Wingdings" pitchFamily="2" charset="2"/>
+              <a:buChar char=""/>
+              <a:defRPr lang="en-US" sz="1800" kern="1200" dirty="0" smtClean="0">
+                <a:solidFill>
+                  <a:schemeClr val="tx1">
+                    <a:lumMod val="65000"/>
+                    <a:lumOff val="35000"/>
+                  </a:schemeClr>
+                </a:solidFill>
+                <a:latin typeface="+mn-lt"/>
+                <a:ea typeface="+mn-ea"/>
+                <a:cs typeface="+mn-cs"/>
+              </a:defRPr>
+            </a:lvl6pPr>
+            <a:lvl7pPr marL="2398713" indent="-344488" algn="l" defTabSz="914400" rtl="0" eaLnBrk="1" latinLnBrk="0" hangingPunct="1">
+              <a:spcBef>
+                <a:spcPct val="20000"/>
+              </a:spcBef>
+              <a:buClr>
+                <a:schemeClr val="accent1"/>
+              </a:buClr>
+              <a:buSzPct val="90000"/>
+              <a:buFont typeface="Wingdings" pitchFamily="2" charset="2"/>
+              <a:buChar char=""/>
+              <a:defRPr lang="en-US" sz="1800" kern="1200" dirty="0" smtClean="0">
+                <a:solidFill>
+                  <a:schemeClr val="tx1">
+                    <a:lumMod val="65000"/>
+                    <a:lumOff val="35000"/>
+                  </a:schemeClr>
+                </a:solidFill>
+                <a:latin typeface="+mn-lt"/>
+                <a:ea typeface="+mn-ea"/>
+                <a:cs typeface="+mn-cs"/>
+              </a:defRPr>
+            </a:lvl7pPr>
+            <a:lvl8pPr marL="2743200" indent="-344488" algn="l" defTabSz="914400" rtl="0" eaLnBrk="1" latinLnBrk="0" hangingPunct="1">
+              <a:spcBef>
+                <a:spcPct val="20000"/>
+              </a:spcBef>
+              <a:buClr>
+                <a:schemeClr val="accent1">
+                  <a:lumMod val="60000"/>
+                  <a:lumOff val="40000"/>
+                </a:schemeClr>
+              </a:buClr>
+              <a:buSzPct val="90000"/>
+              <a:buFont typeface="Wingdings" pitchFamily="2" charset="2"/>
+              <a:buChar char=""/>
+              <a:defRPr lang="en-US" sz="1800" kern="1200" dirty="0" smtClean="0">
+                <a:solidFill>
+                  <a:schemeClr val="tx1">
+                    <a:lumMod val="65000"/>
+                    <a:lumOff val="35000"/>
+                  </a:schemeClr>
+                </a:solidFill>
+                <a:latin typeface="+mn-lt"/>
+                <a:ea typeface="+mn-ea"/>
+                <a:cs typeface="+mn-cs"/>
+              </a:defRPr>
+            </a:lvl8pPr>
+            <a:lvl9pPr marL="3087688" indent="-344488" algn="l" defTabSz="914400" rtl="0" eaLnBrk="1" latinLnBrk="0" hangingPunct="1">
+              <a:spcBef>
+                <a:spcPct val="20000"/>
+              </a:spcBef>
+              <a:buClr>
+                <a:schemeClr val="accent1"/>
+              </a:buClr>
+              <a:buSzPct val="90000"/>
+              <a:buFont typeface="Wingdings" pitchFamily="2" charset="2"/>
+              <a:buChar char=""/>
+              <a:defRPr lang="en-US" sz="1800" kern="1200" dirty="0">
+                <a:solidFill>
+                  <a:schemeClr val="tx1">
+                    <a:lumMod val="65000"/>
+                    <a:lumOff val="35000"/>
+                  </a:schemeClr>
+                </a:solidFill>
+                <a:latin typeface="+mn-lt"/>
+                <a:ea typeface="+mn-ea"/>
+                <a:cs typeface="+mn-cs"/>
+              </a:defRPr>
+            </a:lvl9pPr>
+          </a:lstStyle>
+          <a:p>
+            <a:pPr marL="0" indent="0" algn="ctr">
+              <a:buFont typeface="Wingdings" pitchFamily="2" charset="2"/>
+              <a:buNone/>
+            </a:pPr>
+            <a:endParaRPr lang="en-US" dirty="0" smtClean="0"/>
+          </a:p>
+          <a:p>
+            <a:pPr marL="0" indent="0" algn="ctr">
+              <a:buFont typeface="Wingdings" pitchFamily="2" charset="2"/>
+              <a:buNone/>
+            </a:pPr>
+            <a:r>
+              <a:rPr lang="en-US" sz="13800" dirty="0" smtClean="0"/>
+              <a:t>?</a:t>
+            </a:r>
+            <a:endParaRPr lang="en-US" sz="13800" dirty="0"/>
+          </a:p>
+        </p:txBody>
+      </p:sp>
+      <p:pic>
+        <p:nvPicPr>
+          <p:cNvPr id="6" name="Picture 5" descr="BGViolinExampleText.png"/>
+          <p:cNvPicPr>
+            <a:picLocks noChangeAspect="1"/>
+          </p:cNvPicPr>
+          <p:nvPr/>
+        </p:nvPicPr>
+        <p:blipFill>
+          <a:blip r:embed="rId2">
+            <a:extLst>
+              <a:ext uri="{28A0092B-C50C-407E-A947-70E740481C1C}">
+                <a14:useLocalDpi xmlns:a14="http://schemas.microsoft.com/office/drawing/2010/main" val="0"/>
+              </a:ext>
+            </a:extLst>
+          </a:blip>
+          <a:stretch>
+            <a:fillRect/>
+          </a:stretch>
+        </p:blipFill>
+        <p:spPr>
+          <a:xfrm>
+            <a:off x="1235598" y="5613056"/>
+            <a:ext cx="5006375" cy="773457"/>
+          </a:xfrm>
+          <a:prstGeom prst="rect">
+            <a:avLst/>
+          </a:prstGeom>
+        </p:spPr>
+      </p:pic>
+    </p:spTree>
+    <p:extLst>
+      <p:ext uri="{BB962C8B-B14F-4D97-AF65-F5344CB8AC3E}">
+        <p14:creationId xmlns:p14="http://schemas.microsoft.com/office/powerpoint/2010/main" val="2957700749"/>
+      </p:ext>
+    </p:extLst>
+  </p:cSld>
+  <p:clrMapOvr>
+    <a:masterClrMapping/>
+  </p:clrMapOvr>
+</p:sld>
+</file>
+
+<file path=ppt/slides/slide5.xml><?xml version="1.0" encoding="utf-8"?>
+<p:sld xmlns:a="http://schemas.openxmlformats.org/drawingml/2006/main" xmlns:r="http://schemas.openxmlformats.org/officeDocument/2006/relationships" xmlns:p="http://schemas.openxmlformats.org/presentationml/2006/main">
+  <p:cSld>
+    <p:spTree>
+      <p:nvGrpSpPr>
+        <p:cNvPr id="1" name=""/>
+        <p:cNvGrpSpPr/>
+        <p:nvPr/>
+      </p:nvGrpSpPr>
+      <p:grpSpPr>
+        <a:xfrm>
+          <a:off x="0" y="0"/>
+          <a:ext cx="0" cy="0"/>
+          <a:chOff x="0" y="0"/>
+          <a:chExt cx="0" cy="0"/>
+        </a:xfrm>
+      </p:grpSpPr>
+      <p:sp>
+        <p:nvSpPr>
+          <p:cNvPr id="2" name="Title 1"/>
+          <p:cNvSpPr>
+            <a:spLocks noGrp="1"/>
+          </p:cNvSpPr>
+          <p:nvPr>
+            <p:ph type="title"/>
+          </p:nvPr>
+        </p:nvSpPr>
+        <p:spPr/>
+        <p:txBody>
+          <a:bodyPr/>
+          <a:lstStyle/>
+          <a:p>
+            <a:r>
+              <a:rPr lang="en-US" dirty="0" smtClean="0"/>
+              <a:t>Insights</a:t>
+            </a:r>
+            <a:endParaRPr lang="en-US" dirty="0"/>
+          </a:p>
+        </p:txBody>
+      </p:sp>
+      <p:sp>
+        <p:nvSpPr>
+          <p:cNvPr id="3" name="Content Placeholder 2"/>
+          <p:cNvSpPr>
+            <a:spLocks noGrp="1"/>
+          </p:cNvSpPr>
+          <p:nvPr>
+            <p:ph idx="1"/>
+          </p:nvPr>
+        </p:nvSpPr>
+        <p:spPr/>
+        <p:txBody>
+          <a:bodyPr/>
+          <a:lstStyle/>
+          <a:p>
+            <a:r>
+              <a:rPr lang="en-US" dirty="0" smtClean="0"/>
+              <a:t>Computing </a:t>
+            </a:r>
+            <a:r>
+              <a:rPr lang="en-US" dirty="0"/>
+              <a:t>offers us the capability to build upon that insight by relaxing the cognitive load required to measure it.</a:t>
+            </a:r>
+          </a:p>
+          <a:p>
+            <a:endParaRPr lang="en-US" dirty="0"/>
+          </a:p>
+        </p:txBody>
+      </p:sp>
+    </p:spTree>
+    <p:extLst>
+      <p:ext uri="{BB962C8B-B14F-4D97-AF65-F5344CB8AC3E}">
+        <p14:creationId xmlns:p14="http://schemas.microsoft.com/office/powerpoint/2010/main" val="1192939561"/>
+      </p:ext>
+    </p:extLst>
+  </p:cSld>
+  <p:clrMapOvr>
+    <a:masterClrMapping/>
+  </p:clrMapOvr>
+</p:sld>
+</file>
+
+<file path=ppt/slides/slide6.xml><?xml version="1.0" encoding="utf-8"?>
+<p:sld xmlns:a="http://schemas.openxmlformats.org/drawingml/2006/main" xmlns:r="http://schemas.openxmlformats.org/officeDocument/2006/relationships" xmlns:p="http://schemas.openxmlformats.org/presentationml/2006/main">
+  <p:cSld>
+    <p:spTree>
+      <p:nvGrpSpPr>
+        <p:cNvPr id="1" name=""/>
+        <p:cNvGrpSpPr/>
+        <p:nvPr/>
+      </p:nvGrpSpPr>
+      <p:grpSpPr>
+        <a:xfrm>
+          <a:off x="0" y="0"/>
+          <a:ext cx="0" cy="0"/>
+          <a:chOff x="0" y="0"/>
+          <a:chExt cx="0" cy="0"/>
+        </a:xfrm>
+      </p:grpSpPr>
+      <p:sp>
+        <p:nvSpPr>
+          <p:cNvPr id="2" name="Title 1"/>
+          <p:cNvSpPr>
+            <a:spLocks noGrp="1"/>
+          </p:cNvSpPr>
+          <p:nvPr>
+            <p:ph type="title"/>
+          </p:nvPr>
+        </p:nvSpPr>
+        <p:spPr/>
+        <p:txBody>
+          <a:bodyPr/>
+          <a:lstStyle/>
+          <a:p>
+            <a:r>
+              <a:rPr lang="en-US" dirty="0" smtClean="0"/>
+              <a:t>Insights</a:t>
+            </a:r>
+            <a:endParaRPr lang="en-US" dirty="0"/>
+          </a:p>
+        </p:txBody>
+      </p:sp>
+      <p:sp>
+        <p:nvSpPr>
+          <p:cNvPr id="3" name="Content Placeholder 2"/>
+          <p:cNvSpPr>
+            <a:spLocks noGrp="1"/>
+          </p:cNvSpPr>
+          <p:nvPr>
+            <p:ph idx="1"/>
+          </p:nvPr>
+        </p:nvSpPr>
+        <p:spPr/>
+        <p:txBody>
+          <a:bodyPr/>
+          <a:lstStyle/>
+          <a:p>
+            <a:r>
+              <a:rPr lang="en-US" dirty="0"/>
+              <a:t>Educators, performers, professionals, composers, publishers, and more can leverage this technology to simplify their work.</a:t>
+            </a:r>
+          </a:p>
+        </p:txBody>
+      </p:sp>
+    </p:spTree>
+    <p:extLst>
+      <p:ext uri="{BB962C8B-B14F-4D97-AF65-F5344CB8AC3E}">
+        <p14:creationId xmlns:p14="http://schemas.microsoft.com/office/powerpoint/2010/main" val="3127582937"/>
+      </p:ext>
+    </p:extLst>
+  </p:cSld>
+  <p:clrMapOvr>
+    <a:masterClrMapping/>
+  </p:clrMapOvr>
+</p:sld>
+</file>
+
+<file path=ppt/slides/slide7.xml><?xml version="1.0" encoding="utf-8"?>
 <p:sld xmlns:a="http://schemas.openxmlformats.org/drawingml/2006/main" xmlns:r="http://schemas.openxmlformats.org/officeDocument/2006/relationships" xmlns:p="http://schemas.openxmlformats.org/presentationml/2006/main">
   <p:cSld>
     <p:spTree>
@@ -6105,7 +7230,7 @@
 </p:sld>
 </file>
 
-<file path=ppt/slides/slide5.xml><?xml version="1.0" encoding="utf-8"?>
+<file path=ppt/slides/slide8.xml><?xml version="1.0" encoding="utf-8"?>
 <p:sld xmlns:a="http://schemas.openxmlformats.org/drawingml/2006/main" xmlns:r="http://schemas.openxmlformats.org/officeDocument/2006/relationships" xmlns:p="http://schemas.openxmlformats.org/presentationml/2006/main">
   <p:cSld>
     <p:spTree>
@@ -6284,7 +7409,7 @@
 </p:sld>
 </file>
 
-<file path=ppt/slides/slide6.xml><?xml version="1.0" encoding="utf-8"?>
+<file path=ppt/slides/slide9.xml><?xml version="1.0" encoding="utf-8"?>
 <p:sld xmlns:a="http://schemas.openxmlformats.org/drawingml/2006/main" xmlns:r="http://schemas.openxmlformats.org/officeDocument/2006/relationships" xmlns:p="http://schemas.openxmlformats.org/presentationml/2006/main">
   <p:cSld>
     <p:spTree>
@@ -6419,341 +7544,6 @@
     <p:extLst>
       <p:ext uri="{BB962C8B-B14F-4D97-AF65-F5344CB8AC3E}">
         <p14:creationId xmlns:p14="http://schemas.microsoft.com/office/powerpoint/2010/main" val="4058623573"/>
-      </p:ext>
-    </p:extLst>
-  </p:cSld>
-  <p:clrMapOvr>
-    <a:masterClrMapping/>
-  </p:clrMapOvr>
-  <p:timing>
-    <p:tnLst>
-      <p:par>
-        <p:cTn xmlns:p14="http://schemas.microsoft.com/office/powerpoint/2010/main" id="1" dur="indefinite" restart="never" nodeType="tmRoot"/>
-      </p:par>
-    </p:tnLst>
-  </p:timing>
-</p:sld>
-</file>
-
-<file path=ppt/slides/slide7.xml><?xml version="1.0" encoding="utf-8"?>
-<p:sld xmlns:a="http://schemas.openxmlformats.org/drawingml/2006/main" xmlns:r="http://schemas.openxmlformats.org/officeDocument/2006/relationships" xmlns:p="http://schemas.openxmlformats.org/presentationml/2006/main">
-  <p:cSld>
-    <p:spTree>
-      <p:nvGrpSpPr>
-        <p:cNvPr id="1" name=""/>
-        <p:cNvGrpSpPr/>
-        <p:nvPr/>
-      </p:nvGrpSpPr>
-      <p:grpSpPr>
-        <a:xfrm>
-          <a:off x="0" y="0"/>
-          <a:ext cx="0" cy="0"/>
-          <a:chOff x="0" y="0"/>
-          <a:chExt cx="0" cy="0"/>
-        </a:xfrm>
-      </p:grpSpPr>
-      <p:sp>
-        <p:nvSpPr>
-          <p:cNvPr id="2" name="Title 1"/>
-          <p:cNvSpPr>
-            <a:spLocks noGrp="1"/>
-          </p:cNvSpPr>
-          <p:nvPr>
-            <p:ph type="title"/>
-          </p:nvPr>
-        </p:nvSpPr>
-        <p:spPr/>
-        <p:txBody>
-          <a:bodyPr/>
-          <a:lstStyle/>
-          <a:p>
-            <a:r>
-              <a:rPr lang="en-US" dirty="0" smtClean="0"/>
-              <a:t>Questions</a:t>
-            </a:r>
-            <a:endParaRPr lang="en-US" dirty="0"/>
-          </a:p>
-        </p:txBody>
-      </p:sp>
-      <p:sp>
-        <p:nvSpPr>
-          <p:cNvPr id="3" name="Content Placeholder 2"/>
-          <p:cNvSpPr>
-            <a:spLocks noGrp="1"/>
-          </p:cNvSpPr>
-          <p:nvPr>
-            <p:ph idx="1"/>
-          </p:nvPr>
-        </p:nvSpPr>
-        <p:spPr/>
-        <p:txBody>
-          <a:bodyPr>
-            <a:normAutofit/>
-          </a:bodyPr>
-          <a:lstStyle/>
-          <a:p>
-            <a:pPr marL="0" indent="0" algn="ctr">
-              <a:buNone/>
-            </a:pPr>
-            <a:endParaRPr lang="en-US" dirty="0"/>
-          </a:p>
-          <a:p>
-            <a:pPr marL="0" indent="0" algn="ctr">
-              <a:buNone/>
-            </a:pPr>
-            <a:r>
-              <a:rPr lang="en-US" sz="13800" dirty="0" smtClean="0"/>
-              <a:t>?</a:t>
-            </a:r>
-            <a:endParaRPr lang="en-US" sz="13800" dirty="0"/>
-          </a:p>
-        </p:txBody>
-      </p:sp>
-    </p:spTree>
-    <p:extLst>
-      <p:ext uri="{BB962C8B-B14F-4D97-AF65-F5344CB8AC3E}">
-        <p14:creationId xmlns:p14="http://schemas.microsoft.com/office/powerpoint/2010/main" val="1104780982"/>
-      </p:ext>
-    </p:extLst>
-  </p:cSld>
-  <p:clrMapOvr>
-    <a:masterClrMapping/>
-  </p:clrMapOvr>
-  <p:timing>
-    <p:tnLst>
-      <p:par>
-        <p:cTn xmlns:p14="http://schemas.microsoft.com/office/powerpoint/2010/main" id="1" dur="indefinite" restart="never" nodeType="tmRoot"/>
-      </p:par>
-    </p:tnLst>
-  </p:timing>
-</p:sld>
-</file>
-
-<file path=ppt/slides/slide8.xml><?xml version="1.0" encoding="utf-8"?>
-<p:sld xmlns:a="http://schemas.openxmlformats.org/drawingml/2006/main" xmlns:r="http://schemas.openxmlformats.org/officeDocument/2006/relationships" xmlns:p="http://schemas.openxmlformats.org/presentationml/2006/main">
-  <p:cSld>
-    <p:spTree>
-      <p:nvGrpSpPr>
-        <p:cNvPr id="1" name=""/>
-        <p:cNvGrpSpPr/>
-        <p:nvPr/>
-      </p:nvGrpSpPr>
-      <p:grpSpPr>
-        <a:xfrm>
-          <a:off x="0" y="0"/>
-          <a:ext cx="0" cy="0"/>
-          <a:chOff x="0" y="0"/>
-          <a:chExt cx="0" cy="0"/>
-        </a:xfrm>
-      </p:grpSpPr>
-      <p:sp>
-        <p:nvSpPr>
-          <p:cNvPr id="2" name="Title 1"/>
-          <p:cNvSpPr>
-            <a:spLocks noGrp="1"/>
-          </p:cNvSpPr>
-          <p:nvPr>
-            <p:ph type="title"/>
-          </p:nvPr>
-        </p:nvSpPr>
-        <p:spPr/>
-        <p:txBody>
-          <a:bodyPr/>
-          <a:lstStyle/>
-          <a:p>
-            <a:r>
-              <a:rPr lang="en-US" dirty="0" smtClean="0"/>
-              <a:t>Images</a:t>
-            </a:r>
-            <a:endParaRPr lang="en-US" dirty="0"/>
-          </a:p>
-        </p:txBody>
-      </p:sp>
-      <p:sp>
-        <p:nvSpPr>
-          <p:cNvPr id="3" name="Content Placeholder 2"/>
-          <p:cNvSpPr>
-            <a:spLocks noGrp="1"/>
-          </p:cNvSpPr>
-          <p:nvPr>
-            <p:ph idx="1"/>
-          </p:nvPr>
-        </p:nvSpPr>
-        <p:spPr/>
-        <p:txBody>
-          <a:bodyPr/>
-          <a:lstStyle/>
-          <a:p>
-            <a:pPr marL="457200" indent="-457200">
-              <a:buFont typeface="+mj-lt"/>
-              <a:buAutoNum type="arabicPeriod"/>
-            </a:pPr>
-            <a:r>
-              <a:rPr lang="en-US" dirty="0">
-                <a:hlinkClick r:id="rId2"/>
-              </a:rPr>
-              <a:t>http://www.goodfuneralguide.co.uk/wordpress/wp-content/uploads/2013/04/two-cartoon-men-</a:t>
-            </a:r>
-            <a:r>
-              <a:rPr lang="en-US" dirty="0" smtClean="0">
-                <a:hlinkClick r:id="rId2"/>
-              </a:rPr>
-              <a:t>yelling.jpg</a:t>
-            </a:r>
-            <a:endParaRPr lang="en-US" dirty="0" smtClean="0"/>
-          </a:p>
-          <a:p>
-            <a:pPr marL="457200" indent="-457200">
-              <a:buFont typeface="+mj-lt"/>
-              <a:buAutoNum type="arabicPeriod"/>
-            </a:pPr>
-            <a:endParaRPr lang="en-US" dirty="0"/>
-          </a:p>
-        </p:txBody>
-      </p:sp>
-    </p:spTree>
-    <p:extLst>
-      <p:ext uri="{BB962C8B-B14F-4D97-AF65-F5344CB8AC3E}">
-        <p14:creationId xmlns:p14="http://schemas.microsoft.com/office/powerpoint/2010/main" val="2113985035"/>
-      </p:ext>
-    </p:extLst>
-  </p:cSld>
-  <p:clrMapOvr>
-    <a:masterClrMapping/>
-  </p:clrMapOvr>
-</p:sld>
-</file>
-
-<file path=ppt/slides/slide9.xml><?xml version="1.0" encoding="utf-8"?>
-<p:sld xmlns:a="http://schemas.openxmlformats.org/drawingml/2006/main" xmlns:r="http://schemas.openxmlformats.org/officeDocument/2006/relationships" xmlns:p="http://schemas.openxmlformats.org/presentationml/2006/main">
-  <p:cSld>
-    <p:spTree>
-      <p:nvGrpSpPr>
-        <p:cNvPr id="1" name=""/>
-        <p:cNvGrpSpPr/>
-        <p:nvPr/>
-      </p:nvGrpSpPr>
-      <p:grpSpPr>
-        <a:xfrm>
-          <a:off x="0" y="0"/>
-          <a:ext cx="0" cy="0"/>
-          <a:chOff x="0" y="0"/>
-          <a:chExt cx="0" cy="0"/>
-        </a:xfrm>
-      </p:grpSpPr>
-      <p:sp>
-        <p:nvSpPr>
-          <p:cNvPr id="2" name="Title 1"/>
-          <p:cNvSpPr>
-            <a:spLocks noGrp="1"/>
-          </p:cNvSpPr>
-          <p:nvPr>
-            <p:ph type="title"/>
-          </p:nvPr>
-        </p:nvSpPr>
-        <p:spPr/>
-        <p:txBody>
-          <a:bodyPr/>
-          <a:lstStyle/>
-          <a:p>
-            <a:r>
-              <a:rPr lang="en-US" dirty="0" smtClean="0"/>
-              <a:t>User Questions and Needs</a:t>
-            </a:r>
-            <a:endParaRPr lang="en-US" dirty="0"/>
-          </a:p>
-        </p:txBody>
-      </p:sp>
-      <p:sp>
-        <p:nvSpPr>
-          <p:cNvPr id="3" name="Content Placeholder 2"/>
-          <p:cNvSpPr>
-            <a:spLocks noGrp="1"/>
-          </p:cNvSpPr>
-          <p:nvPr>
-            <p:ph idx="1"/>
-          </p:nvPr>
-        </p:nvSpPr>
-        <p:spPr>
-          <a:xfrm>
-            <a:off x="739775" y="2770094"/>
-            <a:ext cx="2600917" cy="4003522"/>
-          </a:xfrm>
-        </p:spPr>
-        <p:txBody>
-          <a:bodyPr>
-            <a:normAutofit fontScale="92500" lnSpcReduction="20000"/>
-          </a:bodyPr>
-          <a:lstStyle/>
-          <a:p>
-            <a:r>
-              <a:rPr lang="en-US" dirty="0" smtClean="0"/>
-              <a:t>How difficult is this piece</a:t>
-            </a:r>
-            <a:r>
-              <a:rPr lang="en-US" dirty="0"/>
-              <a:t> </a:t>
-            </a:r>
-            <a:r>
-              <a:rPr lang="en-US" dirty="0" smtClean="0"/>
-              <a:t>of music?</a:t>
-            </a:r>
-          </a:p>
-          <a:p>
-            <a:r>
-              <a:rPr lang="en-US" dirty="0" smtClean="0"/>
-              <a:t>What makes this piece of music more or less difficult than others?</a:t>
-            </a:r>
-          </a:p>
-          <a:p>
-            <a:r>
-              <a:rPr lang="en-US" dirty="0" smtClean="0"/>
-              <a:t>What portion of this piece is the most difficult?</a:t>
-            </a:r>
-          </a:p>
-          <a:p>
-            <a:r>
-              <a:rPr lang="en-US" dirty="0" smtClean="0"/>
-              <a:t>Why?</a:t>
-            </a:r>
-            <a:endParaRPr lang="en-US" dirty="0"/>
-          </a:p>
-        </p:txBody>
-      </p:sp>
-      <p:pic>
-        <p:nvPicPr>
-          <p:cNvPr id="5" name="Picture 4" descr="Screen Shot 2015-03-17 at 4.07.36 PM.png"/>
-          <p:cNvPicPr>
-            <a:picLocks noChangeAspect="1"/>
-          </p:cNvPicPr>
-          <p:nvPr/>
-        </p:nvPicPr>
-        <p:blipFill>
-          <a:blip r:embed="rId2">
-            <a:extLst>
-              <a:ext uri="{28A0092B-C50C-407E-A947-70E740481C1C}">
-                <a14:useLocalDpi xmlns:a14="http://schemas.microsoft.com/office/drawing/2010/main" val="0"/>
-              </a:ext>
-            </a:extLst>
-          </a:blip>
-          <a:stretch>
-            <a:fillRect/>
-          </a:stretch>
-        </p:blipFill>
-        <p:spPr>
-          <a:xfrm>
-            <a:off x="3831319" y="1830708"/>
-            <a:ext cx="5209881" cy="4794164"/>
-          </a:xfrm>
-          <a:prstGeom prst="rect">
-            <a:avLst/>
-          </a:prstGeom>
-        </p:spPr>
-      </p:pic>
-    </p:spTree>
-    <p:extLst>
-      <p:ext uri="{BB962C8B-B14F-4D97-AF65-F5344CB8AC3E}">
-        <p14:creationId xmlns:p14="http://schemas.microsoft.com/office/powerpoint/2010/main" val="3557287677"/>
       </p:ext>
     </p:extLst>
   </p:cSld>

</xml_diff>

<commit_message>
Updating slides for xwsxethan/MusicScoring#103
</commit_message>
<xml_diff>
--- a/Documents/Thesis/ThesisDissertation.pptx
+++ b/Documents/Thesis/ThesisDissertation.pptx
@@ -6962,8 +6962,25 @@
             </a:r>
             <a:r>
               <a:rPr lang="en-US" dirty="0"/>
-              <a:t>offers us the capability to build upon that insight by relaxing the cognitive load required to measure it.</a:t>
-            </a:r>
+              <a:t>offers us the capability to build upon that insight by relaxing the cognitive load required to measure it</a:t>
+            </a:r>
+            <a:r>
+              <a:rPr lang="en-US" dirty="0" smtClean="0"/>
+              <a:t>.</a:t>
+            </a:r>
+          </a:p>
+          <a:p>
+            <a:r>
+              <a:rPr lang="en-US" dirty="0" smtClean="0"/>
+              <a:t>Bio-informatics</a:t>
+            </a:r>
+          </a:p>
+          <a:p>
+            <a:r>
+              <a:rPr lang="en-US" smtClean="0"/>
+              <a:t>DNA Metaphor</a:t>
+            </a:r>
+            <a:endParaRPr lang="en-US" dirty="0"/>
           </a:p>
           <a:p>
             <a:endParaRPr lang="en-US" dirty="0"/>

</xml_diff>

<commit_message>
Updating thesis slides after expanding some previous sections.
Related to xwsxethan/MusicScoring#103
</commit_message>
<xml_diff>
--- a/Documents/Thesis/ThesisDissertation.pptx
+++ b/Documents/Thesis/ThesisDissertation.pptx
@@ -5,7 +5,7 @@
     <p:sldMasterId id="2147483672" r:id="rId1"/>
   </p:sldMasterIdLst>
   <p:notesMasterIdLst>
-    <p:notesMasterId r:id="rId30"/>
+    <p:notesMasterId r:id="rId41"/>
   </p:notesMasterIdLst>
   <p:sldIdLst>
     <p:sldId id="256" r:id="rId2"/>
@@ -15,27 +15,38 @@
     <p:sldId id="274" r:id="rId6"/>
     <p:sldId id="275" r:id="rId7"/>
     <p:sldId id="269" r:id="rId8"/>
-    <p:sldId id="277" r:id="rId9"/>
-    <p:sldId id="278" r:id="rId10"/>
-    <p:sldId id="279" r:id="rId11"/>
-    <p:sldId id="280" r:id="rId12"/>
-    <p:sldId id="281" r:id="rId13"/>
-    <p:sldId id="282" r:id="rId14"/>
-    <p:sldId id="283" r:id="rId15"/>
-    <p:sldId id="284" r:id="rId16"/>
-    <p:sldId id="285" r:id="rId17"/>
-    <p:sldId id="286" r:id="rId18"/>
-    <p:sldId id="287" r:id="rId19"/>
-    <p:sldId id="289" r:id="rId20"/>
-    <p:sldId id="288" r:id="rId21"/>
-    <p:sldId id="271" r:id="rId22"/>
-    <p:sldId id="270" r:id="rId23"/>
-    <p:sldId id="268" r:id="rId24"/>
-    <p:sldId id="273" r:id="rId25"/>
-    <p:sldId id="258" r:id="rId26"/>
-    <p:sldId id="259" r:id="rId27"/>
-    <p:sldId id="264" r:id="rId28"/>
-    <p:sldId id="266" r:id="rId29"/>
+    <p:sldId id="295" r:id="rId9"/>
+    <p:sldId id="296" r:id="rId10"/>
+    <p:sldId id="297" r:id="rId11"/>
+    <p:sldId id="277" r:id="rId12"/>
+    <p:sldId id="278" r:id="rId13"/>
+    <p:sldId id="279" r:id="rId14"/>
+    <p:sldId id="280" r:id="rId15"/>
+    <p:sldId id="281" r:id="rId16"/>
+    <p:sldId id="282" r:id="rId17"/>
+    <p:sldId id="283" r:id="rId18"/>
+    <p:sldId id="284" r:id="rId19"/>
+    <p:sldId id="285" r:id="rId20"/>
+    <p:sldId id="286" r:id="rId21"/>
+    <p:sldId id="287" r:id="rId22"/>
+    <p:sldId id="289" r:id="rId23"/>
+    <p:sldId id="288" r:id="rId24"/>
+    <p:sldId id="271" r:id="rId25"/>
+    <p:sldId id="291" r:id="rId26"/>
+    <p:sldId id="292" r:id="rId27"/>
+    <p:sldId id="293" r:id="rId28"/>
+    <p:sldId id="294" r:id="rId29"/>
+    <p:sldId id="298" r:id="rId30"/>
+    <p:sldId id="299" r:id="rId31"/>
+    <p:sldId id="300" r:id="rId32"/>
+    <p:sldId id="270" r:id="rId33"/>
+    <p:sldId id="268" r:id="rId34"/>
+    <p:sldId id="273" r:id="rId35"/>
+    <p:sldId id="258" r:id="rId36"/>
+    <p:sldId id="259" r:id="rId37"/>
+    <p:sldId id="264" r:id="rId38"/>
+    <p:sldId id="266" r:id="rId39"/>
+    <p:sldId id="301" r:id="rId40"/>
   </p:sldIdLst>
   <p:sldSz cx="9144000" cy="6858000" type="screen4x3"/>
   <p:notesSz cx="6858000" cy="9144000"/>
@@ -535,6 +546,24 @@
               <a:rPr lang="en-US" dirty="0" smtClean="0"/>
               <a:t>Mention bioinformatics</a:t>
             </a:r>
+          </a:p>
+          <a:p>
+            <a:r>
+              <a:rPr lang="en-US" dirty="0" smtClean="0"/>
+              <a:t>http://</a:t>
+            </a:r>
+            <a:r>
+              <a:rPr lang="en-US" dirty="0" err="1" smtClean="0"/>
+              <a:t>www.zsgenetics.com</a:t>
+            </a:r>
+            <a:r>
+              <a:rPr lang="en-US" dirty="0" smtClean="0"/>
+              <a:t>/sample-preparation/#!</a:t>
+            </a:r>
+            <a:r>
+              <a:rPr lang="en-US" dirty="0" err="1" smtClean="0"/>
+              <a:t>prettyPhoto</a:t>
+            </a:r>
             <a:endParaRPr lang="en-US" dirty="0"/>
           </a:p>
         </p:txBody>
@@ -644,7 +673,7 @@
           <a:p>
             <a:fld id="{B56E73BB-2898-FC45-8D5E-0919D848ACC5}" type="slidenum">
               <a:rPr lang="en-US" smtClean="0"/>
-              <a:t>11</a:t>
+              <a:t>14</a:t>
             </a:fld>
             <a:endParaRPr lang="en-US"/>
           </a:p>
@@ -732,7 +761,7 @@
           <a:p>
             <a:fld id="{B56E73BB-2898-FC45-8D5E-0919D848ACC5}" type="slidenum">
               <a:rPr lang="en-US" smtClean="0"/>
-              <a:t>12</a:t>
+              <a:t>15</a:t>
             </a:fld>
             <a:endParaRPr lang="en-US"/>
           </a:p>
@@ -824,7 +853,7 @@
           <a:p>
             <a:fld id="{B56E73BB-2898-FC45-8D5E-0919D848ACC5}" type="slidenum">
               <a:rPr lang="en-US" smtClean="0"/>
-              <a:t>13</a:t>
+              <a:t>16</a:t>
             </a:fld>
             <a:endParaRPr lang="en-US"/>
           </a:p>
@@ -908,7 +937,7 @@
           <a:p>
             <a:fld id="{B56E73BB-2898-FC45-8D5E-0919D848ACC5}" type="slidenum">
               <a:rPr lang="en-US" smtClean="0"/>
-              <a:t>20</a:t>
+              <a:t>23</a:t>
             </a:fld>
             <a:endParaRPr lang="en-US"/>
           </a:p>
@@ -6044,6 +6073,134 @@
           <a:p>
             <a:r>
               <a:rPr lang="en-US" dirty="0" smtClean="0"/>
+              <a:t>Overview</a:t>
+            </a:r>
+            <a:endParaRPr lang="en-US" dirty="0"/>
+          </a:p>
+        </p:txBody>
+      </p:sp>
+      <p:sp>
+        <p:nvSpPr>
+          <p:cNvPr id="3" name="Content Placeholder 2"/>
+          <p:cNvSpPr>
+            <a:spLocks noGrp="1"/>
+          </p:cNvSpPr>
+          <p:nvPr>
+            <p:ph idx="1"/>
+          </p:nvPr>
+        </p:nvSpPr>
+        <p:spPr/>
+        <p:txBody>
+          <a:bodyPr/>
+          <a:lstStyle/>
+          <a:p>
+            <a:r>
+              <a:rPr lang="en-US" sz="2400" dirty="0"/>
+              <a:t>Leverage </a:t>
+            </a:r>
+            <a:r>
+              <a:rPr lang="en-US" sz="2400" dirty="0" smtClean="0"/>
+              <a:t>outside experts </a:t>
+            </a:r>
+            <a:r>
+              <a:rPr lang="en-US" sz="2400" dirty="0"/>
+              <a:t>to </a:t>
+            </a:r>
+            <a:r>
+              <a:rPr lang="en-US" sz="2400" dirty="0" smtClean="0"/>
+              <a:t>determine complexity parameters for </a:t>
+            </a:r>
+            <a:r>
+              <a:rPr lang="en-US" sz="2400" dirty="0"/>
+              <a:t>individual </a:t>
+            </a:r>
+            <a:r>
+              <a:rPr lang="en-US" sz="2400" dirty="0" smtClean="0"/>
+              <a:t>musical elements </a:t>
+            </a:r>
+            <a:r>
+              <a:rPr lang="en-US" sz="2400" dirty="0"/>
+              <a:t>on each instrument</a:t>
+            </a:r>
+            <a:r>
+              <a:rPr lang="en-US" sz="2400" dirty="0" smtClean="0"/>
+              <a:t>.</a:t>
+            </a:r>
+          </a:p>
+          <a:p>
+            <a:pPr lvl="1"/>
+            <a:r>
+              <a:rPr lang="en-US" dirty="0" err="1" smtClean="0"/>
+              <a:t>Qualtrics</a:t>
+            </a:r>
+            <a:r>
+              <a:rPr lang="en-US" dirty="0" smtClean="0"/>
+              <a:t> Survey</a:t>
+            </a:r>
+          </a:p>
+          <a:p>
+            <a:pPr lvl="1"/>
+            <a:r>
+              <a:rPr lang="en-US" dirty="0" smtClean="0"/>
+              <a:t>Awaiting IRB Approval</a:t>
+            </a:r>
+          </a:p>
+          <a:p>
+            <a:r>
+              <a:rPr lang="en-US" sz="2400" dirty="0" smtClean="0"/>
+              <a:t>Use our own parameters until we have conclusive new ones.</a:t>
+            </a:r>
+            <a:endParaRPr lang="en-US" dirty="0"/>
+          </a:p>
+        </p:txBody>
+      </p:sp>
+    </p:spTree>
+    <p:extLst>
+      <p:ext uri="{BB962C8B-B14F-4D97-AF65-F5344CB8AC3E}">
+        <p14:creationId xmlns:p14="http://schemas.microsoft.com/office/powerpoint/2010/main" val="1516808550"/>
+      </p:ext>
+    </p:extLst>
+  </p:cSld>
+  <p:clrMapOvr>
+    <a:masterClrMapping/>
+  </p:clrMapOvr>
+</p:sld>
+</file>
+
+<file path=ppt/slides/slide11.xml><?xml version="1.0" encoding="utf-8"?>
+<p:sld xmlns:a="http://schemas.openxmlformats.org/drawingml/2006/main" xmlns:r="http://schemas.openxmlformats.org/officeDocument/2006/relationships" xmlns:p="http://schemas.openxmlformats.org/presentationml/2006/main">
+  <p:cSld>
+    <p:spTree>
+      <p:nvGrpSpPr>
+        <p:cNvPr id="1" name=""/>
+        <p:cNvGrpSpPr/>
+        <p:nvPr/>
+      </p:nvGrpSpPr>
+      <p:grpSpPr>
+        <a:xfrm>
+          <a:off x="0" y="0"/>
+          <a:ext cx="0" cy="0"/>
+          <a:chOff x="0" y="0"/>
+          <a:chExt cx="0" cy="0"/>
+        </a:xfrm>
+      </p:grpSpPr>
+      <p:sp>
+        <p:nvSpPr>
+          <p:cNvPr id="2" name="Title 1"/>
+          <p:cNvSpPr>
+            <a:spLocks noGrp="1"/>
+          </p:cNvSpPr>
+          <p:nvPr>
+            <p:ph type="title"/>
+          </p:nvPr>
+        </p:nvSpPr>
+        <p:spPr/>
+        <p:txBody>
+          <a:bodyPr/>
+          <a:lstStyle/>
+          <a:p>
+            <a:r>
+              <a:rPr lang="en-US" dirty="0" smtClean="0"/>
               <a:t>Example</a:t>
             </a:r>
             <a:endParaRPr lang="en-US" dirty="0"/>
@@ -6080,6 +6237,337 @@
           </a:prstGeom>
         </p:spPr>
       </p:pic>
+    </p:spTree>
+    <p:extLst>
+      <p:ext uri="{BB962C8B-B14F-4D97-AF65-F5344CB8AC3E}">
+        <p14:creationId xmlns:p14="http://schemas.microsoft.com/office/powerpoint/2010/main" val="1083142572"/>
+      </p:ext>
+    </p:extLst>
+  </p:cSld>
+  <p:clrMapOvr>
+    <a:masterClrMapping/>
+  </p:clrMapOvr>
+</p:sld>
+</file>
+
+<file path=ppt/slides/slide12.xml><?xml version="1.0" encoding="utf-8"?>
+<p:sld xmlns:a="http://schemas.openxmlformats.org/drawingml/2006/main" xmlns:r="http://schemas.openxmlformats.org/officeDocument/2006/relationships" xmlns:p="http://schemas.openxmlformats.org/presentationml/2006/main">
+  <p:cSld>
+    <p:spTree>
+      <p:nvGrpSpPr>
+        <p:cNvPr id="1" name=""/>
+        <p:cNvGrpSpPr/>
+        <p:nvPr/>
+      </p:nvGrpSpPr>
+      <p:grpSpPr>
+        <a:xfrm>
+          <a:off x="0" y="0"/>
+          <a:ext cx="0" cy="0"/>
+          <a:chOff x="0" y="0"/>
+          <a:chExt cx="0" cy="0"/>
+        </a:xfrm>
+      </p:grpSpPr>
+      <p:sp>
+        <p:nvSpPr>
+          <p:cNvPr id="2" name="Title 1"/>
+          <p:cNvSpPr>
+            <a:spLocks noGrp="1"/>
+          </p:cNvSpPr>
+          <p:nvPr>
+            <p:ph type="title"/>
+          </p:nvPr>
+        </p:nvSpPr>
+        <p:spPr/>
+        <p:txBody>
+          <a:bodyPr/>
+          <a:lstStyle/>
+          <a:p>
+            <a:r>
+              <a:rPr lang="en-US" dirty="0" smtClean="0"/>
+              <a:t>Example</a:t>
+            </a:r>
+            <a:endParaRPr lang="en-US" dirty="0"/>
+          </a:p>
+        </p:txBody>
+      </p:sp>
+      <p:pic>
+        <p:nvPicPr>
+          <p:cNvPr id="6" name="Picture 5" descr="TwinkleTwinkleLittleStar.png"/>
+          <p:cNvPicPr>
+            <a:picLocks noChangeAspect="1"/>
+          </p:cNvPicPr>
+          <p:nvPr/>
+        </p:nvPicPr>
+        <p:blipFill>
+          <a:blip r:embed="rId2">
+            <a:extLst>
+              <a:ext uri="{28A0092B-C50C-407E-A947-70E740481C1C}">
+                <a14:useLocalDpi xmlns:a14="http://schemas.microsoft.com/office/drawing/2010/main" val="0"/>
+              </a:ext>
+            </a:extLst>
+          </a:blip>
+          <a:stretch>
+            <a:fillRect/>
+          </a:stretch>
+        </p:blipFill>
+        <p:spPr>
+          <a:xfrm>
+            <a:off x="837400" y="3009900"/>
+            <a:ext cx="7454900" cy="3848100"/>
+          </a:xfrm>
+          <a:prstGeom prst="rect">
+            <a:avLst/>
+          </a:prstGeom>
+        </p:spPr>
+      </p:pic>
+      <p:sp>
+        <p:nvSpPr>
+          <p:cNvPr id="7" name="TextBox 6"/>
+          <p:cNvSpPr txBox="1"/>
+          <p:nvPr/>
+        </p:nvSpPr>
+        <p:spPr>
+          <a:xfrm>
+            <a:off x="837400" y="2527069"/>
+            <a:ext cx="761634" cy="369332"/>
+          </a:xfrm>
+          <a:prstGeom prst="rect">
+            <a:avLst/>
+          </a:prstGeom>
+          <a:noFill/>
+        </p:spPr>
+        <p:txBody>
+          <a:bodyPr wrap="none" rtlCol="0">
+            <a:spAutoFit/>
+          </a:bodyPr>
+          <a:lstStyle/>
+          <a:p>
+            <a:r>
+              <a:rPr lang="en-US" dirty="0" smtClean="0">
+                <a:solidFill>
+                  <a:schemeClr val="tx1">
+                    <a:lumMod val="65000"/>
+                    <a:lumOff val="35000"/>
+                  </a:schemeClr>
+                </a:solidFill>
+              </a:rPr>
+              <a:t>Notes</a:t>
+            </a:r>
+            <a:endParaRPr lang="en-US" dirty="0">
+              <a:solidFill>
+                <a:schemeClr val="tx1">
+                  <a:lumMod val="65000"/>
+                  <a:lumOff val="35000"/>
+                </a:schemeClr>
+              </a:solidFill>
+            </a:endParaRPr>
+          </a:p>
+        </p:txBody>
+      </p:sp>
+      <p:sp>
+        <p:nvSpPr>
+          <p:cNvPr id="8" name="TextBox 7"/>
+          <p:cNvSpPr txBox="1"/>
+          <p:nvPr/>
+        </p:nvSpPr>
+        <p:spPr>
+          <a:xfrm>
+            <a:off x="1599034" y="4127341"/>
+            <a:ext cx="6263253" cy="2123658"/>
+          </a:xfrm>
+          <a:prstGeom prst="rect">
+            <a:avLst/>
+          </a:prstGeom>
+          <a:noFill/>
+        </p:spPr>
+        <p:txBody>
+          <a:bodyPr wrap="none" rtlCol="0">
+            <a:spAutoFit/>
+          </a:bodyPr>
+          <a:lstStyle/>
+          <a:p>
+            <a:r>
+              <a:rPr lang="en-US" dirty="0" smtClean="0"/>
+              <a:t>            </a:t>
+            </a:r>
+            <a:r>
+              <a:rPr lang="en-US" sz="1600" dirty="0" smtClean="0">
+                <a:solidFill>
+                  <a:srgbClr val="FF0000"/>
+                </a:solidFill>
+              </a:rPr>
+              <a:t>C4  C4  G4  G4   A4  A4  G4      F4  F4  E4  E4     D4  D4  C4</a:t>
+            </a:r>
+          </a:p>
+          <a:p>
+            <a:endParaRPr lang="en-US" dirty="0">
+              <a:solidFill>
+                <a:srgbClr val="FF0000"/>
+              </a:solidFill>
+            </a:endParaRPr>
+          </a:p>
+          <a:p>
+            <a:endParaRPr lang="en-US" dirty="0" smtClean="0">
+              <a:solidFill>
+                <a:srgbClr val="FF0000"/>
+              </a:solidFill>
+            </a:endParaRPr>
+          </a:p>
+          <a:p>
+            <a:r>
+              <a:rPr lang="en-US" dirty="0" smtClean="0">
+                <a:solidFill>
+                  <a:srgbClr val="FF0000"/>
+                </a:solidFill>
+              </a:rPr>
+              <a:t>   </a:t>
+            </a:r>
+            <a:r>
+              <a:rPr lang="en-US" sz="1600" dirty="0" smtClean="0">
+                <a:solidFill>
+                  <a:srgbClr val="FF0000"/>
+                </a:solidFill>
+              </a:rPr>
+              <a:t>G4  G4  F4  F4      E4  E4  D4          G4  G4  F4  F4     E4  E4   D4</a:t>
+            </a:r>
+          </a:p>
+          <a:p>
+            <a:endParaRPr lang="en-US" sz="1600" dirty="0">
+              <a:solidFill>
+                <a:srgbClr val="FF0000"/>
+              </a:solidFill>
+            </a:endParaRPr>
+          </a:p>
+          <a:p>
+            <a:endParaRPr lang="en-US" sz="1200" dirty="0" smtClean="0">
+              <a:solidFill>
+                <a:srgbClr val="FF0000"/>
+              </a:solidFill>
+            </a:endParaRPr>
+          </a:p>
+          <a:p>
+            <a:r>
+              <a:rPr lang="en-US" sz="1200" dirty="0" smtClean="0">
+                <a:solidFill>
+                  <a:srgbClr val="FF0000"/>
+                </a:solidFill>
+              </a:rPr>
+              <a:t>  </a:t>
+            </a:r>
+            <a:endParaRPr lang="en-US" sz="1000" dirty="0" smtClean="0">
+              <a:solidFill>
+                <a:srgbClr val="FF0000"/>
+              </a:solidFill>
+            </a:endParaRPr>
+          </a:p>
+          <a:p>
+            <a:r>
+              <a:rPr lang="en-US" sz="1600" dirty="0">
+                <a:solidFill>
+                  <a:srgbClr val="FF0000"/>
+                </a:solidFill>
+              </a:rPr>
+              <a:t> </a:t>
+            </a:r>
+            <a:r>
+              <a:rPr lang="en-US" sz="1600" dirty="0" smtClean="0">
+                <a:solidFill>
+                  <a:srgbClr val="FF0000"/>
+                </a:solidFill>
+              </a:rPr>
+              <a:t>   C4  C4  G4  G4     A4  A4  G4        F4   F4   E4  E4     D4  D4  C4</a:t>
+            </a:r>
+            <a:endParaRPr lang="en-US" sz="1600" dirty="0">
+              <a:solidFill>
+                <a:srgbClr val="FF0000"/>
+              </a:solidFill>
+            </a:endParaRPr>
+          </a:p>
+        </p:txBody>
+      </p:sp>
+    </p:spTree>
+    <p:extLst>
+      <p:ext uri="{BB962C8B-B14F-4D97-AF65-F5344CB8AC3E}">
+        <p14:creationId xmlns:p14="http://schemas.microsoft.com/office/powerpoint/2010/main" val="653559424"/>
+      </p:ext>
+    </p:extLst>
+  </p:cSld>
+  <p:clrMapOvr>
+    <a:masterClrMapping/>
+  </p:clrMapOvr>
+</p:sld>
+</file>
+
+<file path=ppt/slides/slide13.xml><?xml version="1.0" encoding="utf-8"?>
+<p:sld xmlns:a="http://schemas.openxmlformats.org/drawingml/2006/main" xmlns:r="http://schemas.openxmlformats.org/officeDocument/2006/relationships" xmlns:p="http://schemas.openxmlformats.org/presentationml/2006/main">
+  <p:cSld>
+    <p:spTree>
+      <p:nvGrpSpPr>
+        <p:cNvPr id="1" name=""/>
+        <p:cNvGrpSpPr/>
+        <p:nvPr/>
+      </p:nvGrpSpPr>
+      <p:grpSpPr>
+        <a:xfrm>
+          <a:off x="0" y="0"/>
+          <a:ext cx="0" cy="0"/>
+          <a:chOff x="0" y="0"/>
+          <a:chExt cx="0" cy="0"/>
+        </a:xfrm>
+      </p:grpSpPr>
+      <p:sp>
+        <p:nvSpPr>
+          <p:cNvPr id="2" name="Title 1"/>
+          <p:cNvSpPr>
+            <a:spLocks noGrp="1"/>
+          </p:cNvSpPr>
+          <p:nvPr>
+            <p:ph type="title"/>
+          </p:nvPr>
+        </p:nvSpPr>
+        <p:spPr/>
+        <p:txBody>
+          <a:bodyPr/>
+          <a:lstStyle/>
+          <a:p>
+            <a:r>
+              <a:rPr lang="en-US" dirty="0" smtClean="0"/>
+              <a:t>Example</a:t>
+            </a:r>
+            <a:endParaRPr lang="en-US" dirty="0"/>
+          </a:p>
+        </p:txBody>
+      </p:sp>
+      <p:pic>
+        <p:nvPicPr>
+          <p:cNvPr id="6" name="Picture 5" descr="TwinkleTwinkleLittleStar.png"/>
+          <p:cNvPicPr>
+            <a:picLocks noChangeAspect="1"/>
+          </p:cNvPicPr>
+          <p:nvPr/>
+        </p:nvPicPr>
+        <p:blipFill>
+          <a:blip r:embed="rId2">
+            <a:extLst>
+              <a:ext uri="{28A0092B-C50C-407E-A947-70E740481C1C}">
+                <a14:useLocalDpi xmlns:a14="http://schemas.microsoft.com/office/drawing/2010/main" val="0"/>
+              </a:ext>
+            </a:extLst>
+          </a:blip>
+          <a:stretch>
+            <a:fillRect/>
+          </a:stretch>
+        </p:blipFill>
+        <p:spPr>
+          <a:xfrm>
+            <a:off x="837400" y="3009900"/>
+            <a:ext cx="7454900" cy="3848100"/>
+          </a:xfrm>
+          <a:prstGeom prst="rect">
+            <a:avLst/>
+          </a:prstGeom>
+        </p:spPr>
+      </p:pic>
       <p:sp>
         <p:nvSpPr>
           <p:cNvPr id="7" name="TextBox 6"/>
@@ -6258,7 +6746,7 @@
 </p:sld>
 </file>
 
-<file path=ppt/slides/slide11.xml><?xml version="1.0" encoding="utf-8"?>
+<file path=ppt/slides/slide14.xml><?xml version="1.0" encoding="utf-8"?>
 <p:sld xmlns:a="http://schemas.openxmlformats.org/drawingml/2006/main" xmlns:r="http://schemas.openxmlformats.org/officeDocument/2006/relationships" xmlns:p="http://schemas.openxmlformats.org/presentationml/2006/main">
   <p:cSld>
     <p:spTree>
@@ -6506,7 +6994,7 @@
 </p:sld>
 </file>
 
-<file path=ppt/slides/slide12.xml><?xml version="1.0" encoding="utf-8"?>
+<file path=ppt/slides/slide15.xml><?xml version="1.0" encoding="utf-8"?>
 <p:sld xmlns:a="http://schemas.openxmlformats.org/drawingml/2006/main" xmlns:r="http://schemas.openxmlformats.org/officeDocument/2006/relationships" xmlns:p="http://schemas.openxmlformats.org/presentationml/2006/main">
   <p:cSld>
     <p:spTree>
@@ -6821,7 +7309,7 @@
 </p:sld>
 </file>
 
-<file path=ppt/slides/slide13.xml><?xml version="1.0" encoding="utf-8"?>
+<file path=ppt/slides/slide16.xml><?xml version="1.0" encoding="utf-8"?>
 <p:sld xmlns:a="http://schemas.openxmlformats.org/drawingml/2006/main" xmlns:r="http://schemas.openxmlformats.org/officeDocument/2006/relationships" xmlns:p="http://schemas.openxmlformats.org/presentationml/2006/main">
   <p:cSld>
     <p:spTree>
@@ -7285,7 +7773,7 @@
 </p:sld>
 </file>
 
-<file path=ppt/slides/slide14.xml><?xml version="1.0" encoding="utf-8"?>
+<file path=ppt/slides/slide17.xml><?xml version="1.0" encoding="utf-8"?>
 <p:sld xmlns:a="http://schemas.openxmlformats.org/drawingml/2006/main" xmlns:r="http://schemas.openxmlformats.org/officeDocument/2006/relationships" xmlns:p="http://schemas.openxmlformats.org/presentationml/2006/main">
   <p:cSld>
     <p:spTree>
@@ -7613,7 +8101,7 @@
 </p:sld>
 </file>
 
-<file path=ppt/slides/slide15.xml><?xml version="1.0" encoding="utf-8"?>
+<file path=ppt/slides/slide18.xml><?xml version="1.0" encoding="utf-8"?>
 <p:sld xmlns:a="http://schemas.openxmlformats.org/drawingml/2006/main" xmlns:r="http://schemas.openxmlformats.org/officeDocument/2006/relationships" xmlns:p="http://schemas.openxmlformats.org/presentationml/2006/main">
   <p:cSld>
     <p:spTree>
@@ -7909,7 +8397,7 @@
 </p:sld>
 </file>
 
-<file path=ppt/slides/slide16.xml><?xml version="1.0" encoding="utf-8"?>
+<file path=ppt/slides/slide19.xml><?xml version="1.0" encoding="utf-8"?>
 <p:sld xmlns:a="http://schemas.openxmlformats.org/drawingml/2006/main" xmlns:r="http://schemas.openxmlformats.org/officeDocument/2006/relationships" xmlns:p="http://schemas.openxmlformats.org/presentationml/2006/main">
   <p:cSld>
     <p:spTree>
@@ -8205,7 +8693,135 @@
 </p:sld>
 </file>
 
-<file path=ppt/slides/slide17.xml><?xml version="1.0" encoding="utf-8"?>
+<file path=ppt/slides/slide2.xml><?xml version="1.0" encoding="utf-8"?>
+<p:sld xmlns:a="http://schemas.openxmlformats.org/drawingml/2006/main" xmlns:r="http://schemas.openxmlformats.org/officeDocument/2006/relationships" xmlns:p="http://schemas.openxmlformats.org/presentationml/2006/main">
+  <p:cSld>
+    <p:spTree>
+      <p:nvGrpSpPr>
+        <p:cNvPr id="1" name=""/>
+        <p:cNvGrpSpPr/>
+        <p:nvPr/>
+      </p:nvGrpSpPr>
+      <p:grpSpPr>
+        <a:xfrm>
+          <a:off x="0" y="0"/>
+          <a:ext cx="0" cy="0"/>
+          <a:chOff x="0" y="0"/>
+          <a:chExt cx="0" cy="0"/>
+        </a:xfrm>
+      </p:grpSpPr>
+      <p:sp>
+        <p:nvSpPr>
+          <p:cNvPr id="2" name="Title 1"/>
+          <p:cNvSpPr>
+            <a:spLocks noGrp="1"/>
+          </p:cNvSpPr>
+          <p:nvPr>
+            <p:ph type="title"/>
+          </p:nvPr>
+        </p:nvSpPr>
+        <p:spPr/>
+        <p:txBody>
+          <a:bodyPr/>
+          <a:lstStyle/>
+          <a:p>
+            <a:r>
+              <a:rPr lang="en-US" dirty="0" smtClean="0"/>
+              <a:t>Contents</a:t>
+            </a:r>
+            <a:endParaRPr lang="en-US" dirty="0"/>
+          </a:p>
+        </p:txBody>
+      </p:sp>
+      <p:sp>
+        <p:nvSpPr>
+          <p:cNvPr id="3" name="Content Placeholder 2"/>
+          <p:cNvSpPr>
+            <a:spLocks noGrp="1"/>
+          </p:cNvSpPr>
+          <p:nvPr>
+            <p:ph idx="1"/>
+          </p:nvPr>
+        </p:nvSpPr>
+        <p:spPr/>
+        <p:txBody>
+          <a:bodyPr>
+            <a:normAutofit fontScale="92500" lnSpcReduction="20000"/>
+          </a:bodyPr>
+          <a:lstStyle/>
+          <a:p>
+            <a:r>
+              <a:rPr lang="en-US" dirty="0" smtClean="0"/>
+              <a:t>Insights</a:t>
+            </a:r>
+          </a:p>
+          <a:p>
+            <a:r>
+              <a:rPr lang="en-US" dirty="0" smtClean="0"/>
+              <a:t>Overview</a:t>
+            </a:r>
+          </a:p>
+          <a:p>
+            <a:pPr lvl="1"/>
+            <a:r>
+              <a:rPr lang="en-US" dirty="0" smtClean="0"/>
+              <a:t>Example</a:t>
+            </a:r>
+            <a:endParaRPr lang="en-US" dirty="0"/>
+          </a:p>
+          <a:p>
+            <a:r>
+              <a:rPr lang="en-US" dirty="0" smtClean="0"/>
+              <a:t>Proof of Concept</a:t>
+            </a:r>
+          </a:p>
+          <a:p>
+            <a:r>
+              <a:rPr lang="en-US" dirty="0" smtClean="0"/>
+              <a:t>Findings</a:t>
+            </a:r>
+            <a:endParaRPr lang="en-US" dirty="0" smtClean="0"/>
+          </a:p>
+          <a:p>
+            <a:r>
+              <a:rPr lang="en-US" dirty="0" smtClean="0"/>
+              <a:t>Contributions</a:t>
+            </a:r>
+            <a:endParaRPr lang="en-US" dirty="0" smtClean="0"/>
+          </a:p>
+          <a:p>
+            <a:r>
+              <a:rPr lang="en-US" dirty="0" smtClean="0"/>
+              <a:t>Questions?</a:t>
+            </a:r>
+            <a:endParaRPr lang="en-US" dirty="0" smtClean="0"/>
+          </a:p>
+          <a:p>
+            <a:endParaRPr lang="en-US" dirty="0"/>
+          </a:p>
+        </p:txBody>
+      </p:sp>
+    </p:spTree>
+    <p:extLst>
+      <p:ext uri="{BB962C8B-B14F-4D97-AF65-F5344CB8AC3E}">
+        <p14:creationId xmlns:p14="http://schemas.microsoft.com/office/powerpoint/2010/main" val="1705346336"/>
+      </p:ext>
+    </p:extLst>
+  </p:cSld>
+  <p:clrMapOvr>
+    <a:masterClrMapping/>
+  </p:clrMapOvr>
+  <p:timing>
+    <p:tnLst>
+      <p:par>
+        <p:cTn xmlns:p14="http://schemas.microsoft.com/office/powerpoint/2010/main" id="1" dur="indefinite" restart="never" nodeType="tmRoot"/>
+      </p:par>
+    </p:tnLst>
+  </p:timing>
+</p:sld>
+</file>
+
+<file path=ppt/slides/slide20.xml><?xml version="1.0" encoding="utf-8"?>
 <p:sld xmlns:a="http://schemas.openxmlformats.org/drawingml/2006/main" xmlns:r="http://schemas.openxmlformats.org/officeDocument/2006/relationships" xmlns:p="http://schemas.openxmlformats.org/presentationml/2006/main">
   <p:cSld>
     <p:spTree>
@@ -8560,7 +9176,7 @@
 </p:sld>
 </file>
 
-<file path=ppt/slides/slide18.xml><?xml version="1.0" encoding="utf-8"?>
+<file path=ppt/slides/slide21.xml><?xml version="1.0" encoding="utf-8"?>
 <p:sld xmlns:a="http://schemas.openxmlformats.org/drawingml/2006/main" xmlns:r="http://schemas.openxmlformats.org/officeDocument/2006/relationships" xmlns:p="http://schemas.openxmlformats.org/presentationml/2006/main">
   <p:cSld>
     <p:spTree>
@@ -9080,7 +9696,7 @@
 </p:sld>
 </file>
 
-<file path=ppt/slides/slide19.xml><?xml version="1.0" encoding="utf-8"?>
+<file path=ppt/slides/slide22.xml><?xml version="1.0" encoding="utf-8"?>
 <p:sld xmlns:a="http://schemas.openxmlformats.org/drawingml/2006/main" xmlns:r="http://schemas.openxmlformats.org/officeDocument/2006/relationships" xmlns:p="http://schemas.openxmlformats.org/presentationml/2006/main">
   <p:cSld>
     <p:spTree>
@@ -9575,128 +10191,7 @@
 </p:sld>
 </file>
 
-<file path=ppt/slides/slide2.xml><?xml version="1.0" encoding="utf-8"?>
-<p:sld xmlns:a="http://schemas.openxmlformats.org/drawingml/2006/main" xmlns:r="http://schemas.openxmlformats.org/officeDocument/2006/relationships" xmlns:p="http://schemas.openxmlformats.org/presentationml/2006/main">
-  <p:cSld>
-    <p:spTree>
-      <p:nvGrpSpPr>
-        <p:cNvPr id="1" name=""/>
-        <p:cNvGrpSpPr/>
-        <p:nvPr/>
-      </p:nvGrpSpPr>
-      <p:grpSpPr>
-        <a:xfrm>
-          <a:off x="0" y="0"/>
-          <a:ext cx="0" cy="0"/>
-          <a:chOff x="0" y="0"/>
-          <a:chExt cx="0" cy="0"/>
-        </a:xfrm>
-      </p:grpSpPr>
-      <p:sp>
-        <p:nvSpPr>
-          <p:cNvPr id="2" name="Title 1"/>
-          <p:cNvSpPr>
-            <a:spLocks noGrp="1"/>
-          </p:cNvSpPr>
-          <p:nvPr>
-            <p:ph type="title"/>
-          </p:nvPr>
-        </p:nvSpPr>
-        <p:spPr/>
-        <p:txBody>
-          <a:bodyPr/>
-          <a:lstStyle/>
-          <a:p>
-            <a:r>
-              <a:rPr lang="en-US" dirty="0" smtClean="0"/>
-              <a:t>Contents</a:t>
-            </a:r>
-            <a:endParaRPr lang="en-US" dirty="0"/>
-          </a:p>
-        </p:txBody>
-      </p:sp>
-      <p:sp>
-        <p:nvSpPr>
-          <p:cNvPr id="3" name="Content Placeholder 2"/>
-          <p:cNvSpPr>
-            <a:spLocks noGrp="1"/>
-          </p:cNvSpPr>
-          <p:nvPr>
-            <p:ph idx="1"/>
-          </p:nvPr>
-        </p:nvSpPr>
-        <p:spPr/>
-        <p:txBody>
-          <a:bodyPr>
-            <a:normAutofit lnSpcReduction="10000"/>
-          </a:bodyPr>
-          <a:lstStyle/>
-          <a:p>
-            <a:r>
-              <a:rPr lang="en-US" dirty="0" smtClean="0"/>
-              <a:t>Insights</a:t>
-            </a:r>
-          </a:p>
-          <a:p>
-            <a:r>
-              <a:rPr lang="en-US" dirty="0" smtClean="0"/>
-              <a:t>Overview</a:t>
-            </a:r>
-          </a:p>
-          <a:p>
-            <a:r>
-              <a:rPr lang="en-US" dirty="0" smtClean="0"/>
-              <a:t>Example</a:t>
-            </a:r>
-            <a:endParaRPr lang="en-US" dirty="0"/>
-          </a:p>
-          <a:p>
-            <a:r>
-              <a:rPr lang="en-US" dirty="0" smtClean="0"/>
-              <a:t>Proof of Concept</a:t>
-            </a:r>
-            <a:endParaRPr lang="en-US" dirty="0" smtClean="0"/>
-          </a:p>
-          <a:p>
-            <a:r>
-              <a:rPr lang="en-US" dirty="0" smtClean="0"/>
-              <a:t>Contributions</a:t>
-            </a:r>
-            <a:endParaRPr lang="en-US" dirty="0" smtClean="0"/>
-          </a:p>
-          <a:p>
-            <a:r>
-              <a:rPr lang="en-US" dirty="0" smtClean="0"/>
-              <a:t>Questions?</a:t>
-            </a:r>
-            <a:endParaRPr lang="en-US" dirty="0" smtClean="0"/>
-          </a:p>
-          <a:p>
-            <a:endParaRPr lang="en-US" dirty="0"/>
-          </a:p>
-        </p:txBody>
-      </p:sp>
-    </p:spTree>
-    <p:extLst>
-      <p:ext uri="{BB962C8B-B14F-4D97-AF65-F5344CB8AC3E}">
-        <p14:creationId xmlns:p14="http://schemas.microsoft.com/office/powerpoint/2010/main" val="1705346336"/>
-      </p:ext>
-    </p:extLst>
-  </p:cSld>
-  <p:clrMapOvr>
-    <a:masterClrMapping/>
-  </p:clrMapOvr>
-  <p:timing>
-    <p:tnLst>
-      <p:par>
-        <p:cTn xmlns:p14="http://schemas.microsoft.com/office/powerpoint/2010/main" id="1" dur="indefinite" restart="never" nodeType="tmRoot"/>
-      </p:par>
-    </p:tnLst>
-  </p:timing>
-</p:sld>
-</file>
-
-<file path=ppt/slides/slide20.xml><?xml version="1.0" encoding="utf-8"?>
+<file path=ppt/slides/slide23.xml><?xml version="1.0" encoding="utf-8"?>
 <p:sld xmlns:a="http://schemas.openxmlformats.org/drawingml/2006/main" xmlns:r="http://schemas.openxmlformats.org/officeDocument/2006/relationships" xmlns:p="http://schemas.openxmlformats.org/presentationml/2006/main">
   <p:cSld>
     <p:spTree>
@@ -10023,7 +10518,7 @@
 </p:sld>
 </file>
 
-<file path=ppt/slides/slide21.xml><?xml version="1.0" encoding="utf-8"?>
+<file path=ppt/slides/slide24.xml><?xml version="1.0" encoding="utf-8"?>
 <p:sld xmlns:a="http://schemas.openxmlformats.org/drawingml/2006/main" xmlns:r="http://schemas.openxmlformats.org/officeDocument/2006/relationships" xmlns:p="http://schemas.openxmlformats.org/presentationml/2006/main">
   <p:cSld>
     <p:spTree>
@@ -10149,43 +10644,356 @@
           </a:prstGeom>
         </p:spPr>
       </p:pic>
-      <p:sp>
-        <p:nvSpPr>
-          <p:cNvPr id="7" name="TextBox 6"/>
-          <p:cNvSpPr txBox="1"/>
+    </p:spTree>
+    <p:extLst>
+      <p:ext uri="{BB962C8B-B14F-4D97-AF65-F5344CB8AC3E}">
+        <p14:creationId xmlns:p14="http://schemas.microsoft.com/office/powerpoint/2010/main" val="3991589010"/>
+      </p:ext>
+    </p:extLst>
+  </p:cSld>
+  <p:clrMapOvr>
+    <a:masterClrMapping/>
+  </p:clrMapOvr>
+  <p:timing>
+    <p:tnLst>
+      <p:par>
+        <p:cTn xmlns:p14="http://schemas.microsoft.com/office/powerpoint/2010/main" id="1" dur="indefinite" restart="never" nodeType="tmRoot">
+          <p:childTnLst>
+            <p:seq concurrent="1" nextAc="seek">
+              <p:cTn id="2" dur="indefinite" nodeType="mainSeq">
+                <p:childTnLst>
+                  <p:par>
+                    <p:cTn id="3" fill="hold">
+                      <p:stCondLst>
+                        <p:cond delay="indefinite"/>
+                      </p:stCondLst>
+                      <p:childTnLst>
+                        <p:par>
+                          <p:cTn id="4" fill="hold">
+                            <p:stCondLst>
+                              <p:cond delay="0"/>
+                            </p:stCondLst>
+                            <p:childTnLst>
+                              <p:par>
+                                <p:cTn id="5" presetID="1" presetClass="entr" presetSubtype="0" fill="hold" nodeType="clickEffect">
+                                  <p:stCondLst>
+                                    <p:cond delay="0"/>
+                                  </p:stCondLst>
+                                  <p:childTnLst>
+                                    <p:set>
+                                      <p:cBhvr>
+                                        <p:cTn id="6" dur="1" fill="hold">
+                                          <p:stCondLst>
+                                            <p:cond delay="0"/>
+                                          </p:stCondLst>
+                                        </p:cTn>
+                                        <p:tgtEl>
+                                          <p:spTgt spid="3">
+                                            <p:txEl>
+                                              <p:pRg st="0" end="0"/>
+                                            </p:txEl>
+                                          </p:spTgt>
+                                        </p:tgtEl>
+                                        <p:attrNameLst>
+                                          <p:attrName>style.visibility</p:attrName>
+                                        </p:attrNameLst>
+                                      </p:cBhvr>
+                                      <p:to>
+                                        <p:strVal val="visible"/>
+                                      </p:to>
+                                    </p:set>
+                                  </p:childTnLst>
+                                </p:cTn>
+                              </p:par>
+                            </p:childTnLst>
+                          </p:cTn>
+                        </p:par>
+                      </p:childTnLst>
+                    </p:cTn>
+                  </p:par>
+                  <p:par>
+                    <p:cTn id="7" fill="hold">
+                      <p:stCondLst>
+                        <p:cond delay="indefinite"/>
+                      </p:stCondLst>
+                      <p:childTnLst>
+                        <p:par>
+                          <p:cTn id="8" fill="hold">
+                            <p:stCondLst>
+                              <p:cond delay="0"/>
+                            </p:stCondLst>
+                            <p:childTnLst>
+                              <p:par>
+                                <p:cTn id="9" presetID="1" presetClass="entr" presetSubtype="0" fill="hold" nodeType="clickEffect">
+                                  <p:stCondLst>
+                                    <p:cond delay="0"/>
+                                  </p:stCondLst>
+                                  <p:childTnLst>
+                                    <p:set>
+                                      <p:cBhvr>
+                                        <p:cTn id="10" dur="1" fill="hold">
+                                          <p:stCondLst>
+                                            <p:cond delay="0"/>
+                                          </p:stCondLst>
+                                        </p:cTn>
+                                        <p:tgtEl>
+                                          <p:spTgt spid="3">
+                                            <p:txEl>
+                                              <p:pRg st="1" end="1"/>
+                                            </p:txEl>
+                                          </p:spTgt>
+                                        </p:tgtEl>
+                                        <p:attrNameLst>
+                                          <p:attrName>style.visibility</p:attrName>
+                                        </p:attrNameLst>
+                                      </p:cBhvr>
+                                      <p:to>
+                                        <p:strVal val="visible"/>
+                                      </p:to>
+                                    </p:set>
+                                  </p:childTnLst>
+                                </p:cTn>
+                              </p:par>
+                            </p:childTnLst>
+                          </p:cTn>
+                        </p:par>
+                      </p:childTnLst>
+                    </p:cTn>
+                  </p:par>
+                  <p:par>
+                    <p:cTn id="11" fill="hold">
+                      <p:stCondLst>
+                        <p:cond delay="indefinite"/>
+                      </p:stCondLst>
+                      <p:childTnLst>
+                        <p:par>
+                          <p:cTn id="12" fill="hold">
+                            <p:stCondLst>
+                              <p:cond delay="0"/>
+                            </p:stCondLst>
+                            <p:childTnLst>
+                              <p:par>
+                                <p:cTn id="13" presetID="1" presetClass="entr" presetSubtype="0" fill="hold" nodeType="clickEffect">
+                                  <p:stCondLst>
+                                    <p:cond delay="0"/>
+                                  </p:stCondLst>
+                                  <p:childTnLst>
+                                    <p:set>
+                                      <p:cBhvr>
+                                        <p:cTn id="14" dur="1" fill="hold">
+                                          <p:stCondLst>
+                                            <p:cond delay="0"/>
+                                          </p:stCondLst>
+                                        </p:cTn>
+                                        <p:tgtEl>
+                                          <p:spTgt spid="3">
+                                            <p:txEl>
+                                              <p:pRg st="2" end="2"/>
+                                            </p:txEl>
+                                          </p:spTgt>
+                                        </p:tgtEl>
+                                        <p:attrNameLst>
+                                          <p:attrName>style.visibility</p:attrName>
+                                        </p:attrNameLst>
+                                      </p:cBhvr>
+                                      <p:to>
+                                        <p:strVal val="visible"/>
+                                      </p:to>
+                                    </p:set>
+                                  </p:childTnLst>
+                                </p:cTn>
+                              </p:par>
+                            </p:childTnLst>
+                          </p:cTn>
+                        </p:par>
+                      </p:childTnLst>
+                    </p:cTn>
+                  </p:par>
+                  <p:par>
+                    <p:cTn id="15" fill="hold">
+                      <p:stCondLst>
+                        <p:cond delay="indefinite"/>
+                      </p:stCondLst>
+                      <p:childTnLst>
+                        <p:par>
+                          <p:cTn id="16" fill="hold">
+                            <p:stCondLst>
+                              <p:cond delay="0"/>
+                            </p:stCondLst>
+                            <p:childTnLst>
+                              <p:par>
+                                <p:cTn id="17" presetID="1" presetClass="entr" presetSubtype="0" fill="hold" nodeType="clickEffect">
+                                  <p:stCondLst>
+                                    <p:cond delay="0"/>
+                                  </p:stCondLst>
+                                  <p:childTnLst>
+                                    <p:set>
+                                      <p:cBhvr>
+                                        <p:cTn id="18" dur="1" fill="hold">
+                                          <p:stCondLst>
+                                            <p:cond delay="0"/>
+                                          </p:stCondLst>
+                                        </p:cTn>
+                                        <p:tgtEl>
+                                          <p:spTgt spid="3">
+                                            <p:txEl>
+                                              <p:pRg st="3" end="3"/>
+                                            </p:txEl>
+                                          </p:spTgt>
+                                        </p:tgtEl>
+                                        <p:attrNameLst>
+                                          <p:attrName>style.visibility</p:attrName>
+                                        </p:attrNameLst>
+                                      </p:cBhvr>
+                                      <p:to>
+                                        <p:strVal val="visible"/>
+                                      </p:to>
+                                    </p:set>
+                                  </p:childTnLst>
+                                </p:cTn>
+                              </p:par>
+                            </p:childTnLst>
+                          </p:cTn>
+                        </p:par>
+                      </p:childTnLst>
+                    </p:cTn>
+                  </p:par>
+                </p:childTnLst>
+              </p:cTn>
+              <p:prevCondLst>
+                <p:cond evt="onPrev" delay="0">
+                  <p:tgtEl>
+                    <p:sldTgt/>
+                  </p:tgtEl>
+                </p:cond>
+              </p:prevCondLst>
+              <p:nextCondLst>
+                <p:cond evt="onNext" delay="0">
+                  <p:tgtEl>
+                    <p:sldTgt/>
+                  </p:tgtEl>
+                </p:cond>
+              </p:nextCondLst>
+            </p:seq>
+          </p:childTnLst>
+        </p:cTn>
+      </p:par>
+    </p:tnLst>
+  </p:timing>
+</p:sld>
+</file>
+
+<file path=ppt/slides/slide25.xml><?xml version="1.0" encoding="utf-8"?>
+<p:sld xmlns:a="http://schemas.openxmlformats.org/drawingml/2006/main" xmlns:r="http://schemas.openxmlformats.org/officeDocument/2006/relationships" xmlns:p="http://schemas.openxmlformats.org/presentationml/2006/main">
+  <p:cSld>
+    <p:spTree>
+      <p:nvGrpSpPr>
+        <p:cNvPr id="1" name=""/>
+        <p:cNvGrpSpPr/>
+        <p:nvPr/>
+      </p:nvGrpSpPr>
+      <p:grpSpPr>
+        <a:xfrm>
+          <a:off x="0" y="0"/>
+          <a:ext cx="0" cy="0"/>
+          <a:chOff x="0" y="0"/>
+          <a:chExt cx="0" cy="0"/>
+        </a:xfrm>
+      </p:grpSpPr>
+      <p:sp>
+        <p:nvSpPr>
+          <p:cNvPr id="2" name="Title 1"/>
+          <p:cNvSpPr>
+            <a:spLocks noGrp="1"/>
+          </p:cNvSpPr>
+          <p:nvPr>
+            <p:ph type="title"/>
+          </p:nvPr>
+        </p:nvSpPr>
+        <p:spPr/>
+        <p:txBody>
+          <a:bodyPr/>
+          <a:lstStyle/>
+          <a:p>
+            <a:r>
+              <a:rPr lang="en-US" dirty="0" smtClean="0"/>
+              <a:t>Proof of Concept</a:t>
+            </a:r>
+            <a:endParaRPr lang="en-US" dirty="0"/>
+          </a:p>
+        </p:txBody>
+      </p:sp>
+      <p:sp>
+        <p:nvSpPr>
+          <p:cNvPr id="3" name="Content Placeholder 2"/>
+          <p:cNvSpPr>
+            <a:spLocks noGrp="1"/>
+          </p:cNvSpPr>
+          <p:nvPr>
+            <p:ph idx="1"/>
+          </p:nvPr>
+        </p:nvSpPr>
+        <p:spPr/>
+        <p:txBody>
+          <a:bodyPr/>
+          <a:lstStyle/>
+          <a:p>
+            <a:r>
+              <a:rPr lang="en-US" dirty="0" smtClean="0"/>
+              <a:t>Cloud interface for generating complexity scores.</a:t>
+            </a:r>
+            <a:endParaRPr lang="en-US" dirty="0" smtClean="0">
+              <a:hlinkClick r:id="rId2"/>
+            </a:endParaRPr>
+          </a:p>
+          <a:p>
+            <a:r>
+              <a:rPr lang="en-US" dirty="0" smtClean="0">
+                <a:hlinkClick r:id="rId2"/>
+              </a:rPr>
+              <a:t>http://mickey.cs.vt.edu/</a:t>
+            </a:r>
+            <a:endParaRPr lang="en-US" dirty="0" smtClean="0"/>
+          </a:p>
+          <a:p>
+            <a:endParaRPr lang="en-US" dirty="0"/>
+          </a:p>
+        </p:txBody>
+      </p:sp>
+      <p:pic>
+        <p:nvPicPr>
+          <p:cNvPr id="5" name="Picture 4" descr="qrcode.27555132.png"/>
+          <p:cNvPicPr>
+            <a:picLocks noChangeAspect="1"/>
+          </p:cNvPicPr>
           <p:nvPr/>
-        </p:nvSpPr>
+        </p:nvPicPr>
+        <p:blipFill>
+          <a:blip r:embed="rId3">
+            <a:extLst>
+              <a:ext uri="{28A0092B-C50C-407E-A947-70E740481C1C}">
+                <a14:useLocalDpi xmlns:a14="http://schemas.microsoft.com/office/drawing/2010/main" val="0"/>
+              </a:ext>
+            </a:extLst>
+          </a:blip>
+          <a:stretch>
+            <a:fillRect/>
+          </a:stretch>
+        </p:blipFill>
         <p:spPr>
           <a:xfrm>
-            <a:off x="2928826" y="6420067"/>
-            <a:ext cx="3615269" cy="369332"/>
+            <a:off x="3306290" y="4187796"/>
+            <a:ext cx="2540000" cy="2540000"/>
           </a:xfrm>
           <a:prstGeom prst="rect">
             <a:avLst/>
           </a:prstGeom>
-          <a:noFill/>
         </p:spPr>
-        <p:txBody>
-          <a:bodyPr wrap="square" rtlCol="0">
-            <a:spAutoFit/>
-          </a:bodyPr>
-          <a:lstStyle/>
-          <a:p>
-            <a:pPr algn="ctr"/>
-            <a:r>
-              <a:rPr lang="en-US" dirty="0" smtClean="0">
-                <a:hlinkClick r:id="rId3"/>
-              </a:rPr>
-              <a:t>http://mickey.cs.vt.edu/</a:t>
-            </a:r>
-            <a:endParaRPr lang="en-US" dirty="0"/>
-          </a:p>
-        </p:txBody>
-      </p:sp>
+      </p:pic>
     </p:spTree>
     <p:extLst>
       <p:ext uri="{BB962C8B-B14F-4D97-AF65-F5344CB8AC3E}">
-        <p14:creationId xmlns:p14="http://schemas.microsoft.com/office/powerpoint/2010/main" val="3991589010"/>
+        <p14:creationId xmlns:p14="http://schemas.microsoft.com/office/powerpoint/2010/main" val="3588540139"/>
       </p:ext>
     </p:extLst>
   </p:cSld>
@@ -10202,7 +11010,7 @@
 </p:sld>
 </file>
 
-<file path=ppt/slides/slide22.xml><?xml version="1.0" encoding="utf-8"?>
+<file path=ppt/slides/slide26.xml><?xml version="1.0" encoding="utf-8"?>
 <p:sld xmlns:a="http://schemas.openxmlformats.org/drawingml/2006/main" xmlns:r="http://schemas.openxmlformats.org/officeDocument/2006/relationships" xmlns:p="http://schemas.openxmlformats.org/presentationml/2006/main">
   <p:cSld>
     <p:spTree>
@@ -10236,6 +11044,1202 @@
           <a:p>
             <a:r>
               <a:rPr lang="en-US" dirty="0" smtClean="0"/>
+              <a:t>Proof of Concept</a:t>
+            </a:r>
+            <a:endParaRPr lang="en-US" dirty="0"/>
+          </a:p>
+        </p:txBody>
+      </p:sp>
+      <p:sp>
+        <p:nvSpPr>
+          <p:cNvPr id="3" name="Content Placeholder 2"/>
+          <p:cNvSpPr>
+            <a:spLocks noGrp="1"/>
+          </p:cNvSpPr>
+          <p:nvPr>
+            <p:ph idx="1"/>
+          </p:nvPr>
+        </p:nvSpPr>
+        <p:spPr/>
+        <p:txBody>
+          <a:bodyPr/>
+          <a:lstStyle/>
+          <a:p>
+            <a:endParaRPr lang="en-US"/>
+          </a:p>
+        </p:txBody>
+      </p:sp>
+      <p:pic>
+        <p:nvPicPr>
+          <p:cNvPr id="4" name="Picture 3" descr="WebsiteLandingInput.png"/>
+          <p:cNvPicPr>
+            <a:picLocks noChangeAspect="1"/>
+          </p:cNvPicPr>
+          <p:nvPr/>
+        </p:nvPicPr>
+        <p:blipFill>
+          <a:blip r:embed="rId2">
+            <a:extLst>
+              <a:ext uri="{28A0092B-C50C-407E-A947-70E740481C1C}">
+                <a14:useLocalDpi xmlns:a14="http://schemas.microsoft.com/office/drawing/2010/main" val="0"/>
+              </a:ext>
+            </a:extLst>
+          </a:blip>
+          <a:stretch>
+            <a:fillRect/>
+          </a:stretch>
+        </p:blipFill>
+        <p:spPr>
+          <a:xfrm>
+            <a:off x="0" y="1315949"/>
+            <a:ext cx="9144000" cy="5542051"/>
+          </a:xfrm>
+          <a:prstGeom prst="rect">
+            <a:avLst/>
+          </a:prstGeom>
+        </p:spPr>
+      </p:pic>
+    </p:spTree>
+    <p:extLst>
+      <p:ext uri="{BB962C8B-B14F-4D97-AF65-F5344CB8AC3E}">
+        <p14:creationId xmlns:p14="http://schemas.microsoft.com/office/powerpoint/2010/main" val="3747113770"/>
+      </p:ext>
+    </p:extLst>
+  </p:cSld>
+  <p:clrMapOvr>
+    <a:masterClrMapping/>
+  </p:clrMapOvr>
+  <p:timing>
+    <p:tnLst>
+      <p:par>
+        <p:cTn xmlns:p14="http://schemas.microsoft.com/office/powerpoint/2010/main" id="1" dur="indefinite" restart="never" nodeType="tmRoot"/>
+      </p:par>
+    </p:tnLst>
+  </p:timing>
+</p:sld>
+</file>
+
+<file path=ppt/slides/slide27.xml><?xml version="1.0" encoding="utf-8"?>
+<p:sld xmlns:a="http://schemas.openxmlformats.org/drawingml/2006/main" xmlns:r="http://schemas.openxmlformats.org/officeDocument/2006/relationships" xmlns:p="http://schemas.openxmlformats.org/presentationml/2006/main">
+  <p:cSld>
+    <p:spTree>
+      <p:nvGrpSpPr>
+        <p:cNvPr id="1" name=""/>
+        <p:cNvGrpSpPr/>
+        <p:nvPr/>
+      </p:nvGrpSpPr>
+      <p:grpSpPr>
+        <a:xfrm>
+          <a:off x="0" y="0"/>
+          <a:ext cx="0" cy="0"/>
+          <a:chOff x="0" y="0"/>
+          <a:chExt cx="0" cy="0"/>
+        </a:xfrm>
+      </p:grpSpPr>
+      <p:sp>
+        <p:nvSpPr>
+          <p:cNvPr id="2" name="Title 1"/>
+          <p:cNvSpPr>
+            <a:spLocks noGrp="1"/>
+          </p:cNvSpPr>
+          <p:nvPr>
+            <p:ph type="title"/>
+          </p:nvPr>
+        </p:nvSpPr>
+        <p:spPr/>
+        <p:txBody>
+          <a:bodyPr/>
+          <a:lstStyle/>
+          <a:p>
+            <a:r>
+              <a:rPr lang="en-US" dirty="0" smtClean="0"/>
+              <a:t>Proof of Concept</a:t>
+            </a:r>
+            <a:endParaRPr lang="en-US" dirty="0"/>
+          </a:p>
+        </p:txBody>
+      </p:sp>
+      <p:pic>
+        <p:nvPicPr>
+          <p:cNvPr id="4" name="Content Placeholder 3" descr="WebsiteTable.png"/>
+          <p:cNvPicPr>
+            <a:picLocks noGrp="1" noChangeAspect="1"/>
+          </p:cNvPicPr>
+          <p:nvPr>
+            <p:ph idx="1"/>
+          </p:nvPr>
+        </p:nvPicPr>
+        <p:blipFill>
+          <a:blip r:embed="rId2">
+            <a:extLst>
+              <a:ext uri="{28A0092B-C50C-407E-A947-70E740481C1C}">
+                <a14:useLocalDpi xmlns:a14="http://schemas.microsoft.com/office/drawing/2010/main" val="0"/>
+              </a:ext>
+            </a:extLst>
+          </a:blip>
+          <a:srcRect t="329" b="329"/>
+          <a:stretch>
+            <a:fillRect/>
+          </a:stretch>
+        </p:blipFill>
+        <p:spPr>
+          <a:xfrm>
+            <a:off x="0" y="2973859"/>
+            <a:ext cx="9109920" cy="3884141"/>
+          </a:xfrm>
+        </p:spPr>
+      </p:pic>
+    </p:spTree>
+    <p:extLst>
+      <p:ext uri="{BB962C8B-B14F-4D97-AF65-F5344CB8AC3E}">
+        <p14:creationId xmlns:p14="http://schemas.microsoft.com/office/powerpoint/2010/main" val="2473166769"/>
+      </p:ext>
+    </p:extLst>
+  </p:cSld>
+  <p:clrMapOvr>
+    <a:masterClrMapping/>
+  </p:clrMapOvr>
+</p:sld>
+</file>
+
+<file path=ppt/slides/slide28.xml><?xml version="1.0" encoding="utf-8"?>
+<p:sld xmlns:a="http://schemas.openxmlformats.org/drawingml/2006/main" xmlns:r="http://schemas.openxmlformats.org/officeDocument/2006/relationships" xmlns:p="http://schemas.openxmlformats.org/presentationml/2006/main">
+  <p:cSld>
+    <p:spTree>
+      <p:nvGrpSpPr>
+        <p:cNvPr id="1" name=""/>
+        <p:cNvGrpSpPr/>
+        <p:nvPr/>
+      </p:nvGrpSpPr>
+      <p:grpSpPr>
+        <a:xfrm>
+          <a:off x="0" y="0"/>
+          <a:ext cx="0" cy="0"/>
+          <a:chOff x="0" y="0"/>
+          <a:chExt cx="0" cy="0"/>
+        </a:xfrm>
+      </p:grpSpPr>
+      <p:sp>
+        <p:nvSpPr>
+          <p:cNvPr id="2" name="Title 1"/>
+          <p:cNvSpPr>
+            <a:spLocks noGrp="1"/>
+          </p:cNvSpPr>
+          <p:nvPr>
+            <p:ph type="title"/>
+          </p:nvPr>
+        </p:nvSpPr>
+        <p:spPr/>
+        <p:txBody>
+          <a:bodyPr/>
+          <a:lstStyle/>
+          <a:p>
+            <a:r>
+              <a:rPr lang="en-US" dirty="0" smtClean="0"/>
+              <a:t>Proof of Concept</a:t>
+            </a:r>
+            <a:endParaRPr lang="en-US" dirty="0"/>
+          </a:p>
+        </p:txBody>
+      </p:sp>
+      <p:sp>
+        <p:nvSpPr>
+          <p:cNvPr id="3" name="Content Placeholder 2"/>
+          <p:cNvSpPr>
+            <a:spLocks noGrp="1"/>
+          </p:cNvSpPr>
+          <p:nvPr>
+            <p:ph idx="1"/>
+          </p:nvPr>
+        </p:nvSpPr>
+        <p:spPr/>
+        <p:txBody>
+          <a:bodyPr/>
+          <a:lstStyle/>
+          <a:p>
+            <a:endParaRPr lang="en-US"/>
+          </a:p>
+        </p:txBody>
+      </p:sp>
+      <p:pic>
+        <p:nvPicPr>
+          <p:cNvPr id="4" name="Picture 3" descr="WebsiteDetails.png"/>
+          <p:cNvPicPr>
+            <a:picLocks noChangeAspect="1"/>
+          </p:cNvPicPr>
+          <p:nvPr/>
+        </p:nvPicPr>
+        <p:blipFill>
+          <a:blip r:embed="rId2">
+            <a:extLst>
+              <a:ext uri="{28A0092B-C50C-407E-A947-70E740481C1C}">
+                <a14:useLocalDpi xmlns:a14="http://schemas.microsoft.com/office/drawing/2010/main" val="0"/>
+              </a:ext>
+            </a:extLst>
+          </a:blip>
+          <a:stretch>
+            <a:fillRect/>
+          </a:stretch>
+        </p:blipFill>
+        <p:spPr>
+          <a:xfrm>
+            <a:off x="0" y="2286000"/>
+            <a:ext cx="9144000" cy="4572000"/>
+          </a:xfrm>
+          <a:prstGeom prst="rect">
+            <a:avLst/>
+          </a:prstGeom>
+        </p:spPr>
+      </p:pic>
+    </p:spTree>
+    <p:extLst>
+      <p:ext uri="{BB962C8B-B14F-4D97-AF65-F5344CB8AC3E}">
+        <p14:creationId xmlns:p14="http://schemas.microsoft.com/office/powerpoint/2010/main" val="3592266054"/>
+      </p:ext>
+    </p:extLst>
+  </p:cSld>
+  <p:clrMapOvr>
+    <a:masterClrMapping/>
+  </p:clrMapOvr>
+</p:sld>
+</file>
+
+<file path=ppt/slides/slide29.xml><?xml version="1.0" encoding="utf-8"?>
+<p:sld xmlns:a="http://schemas.openxmlformats.org/drawingml/2006/main" xmlns:r="http://schemas.openxmlformats.org/officeDocument/2006/relationships" xmlns:p="http://schemas.openxmlformats.org/presentationml/2006/main">
+  <p:cSld>
+    <p:spTree>
+      <p:nvGrpSpPr>
+        <p:cNvPr id="1" name=""/>
+        <p:cNvGrpSpPr/>
+        <p:nvPr/>
+      </p:nvGrpSpPr>
+      <p:grpSpPr>
+        <a:xfrm>
+          <a:off x="0" y="0"/>
+          <a:ext cx="0" cy="0"/>
+          <a:chOff x="0" y="0"/>
+          <a:chExt cx="0" cy="0"/>
+        </a:xfrm>
+      </p:grpSpPr>
+      <p:sp>
+        <p:nvSpPr>
+          <p:cNvPr id="2" name="Title 1"/>
+          <p:cNvSpPr>
+            <a:spLocks noGrp="1"/>
+          </p:cNvSpPr>
+          <p:nvPr>
+            <p:ph type="title"/>
+          </p:nvPr>
+        </p:nvSpPr>
+        <p:spPr/>
+        <p:txBody>
+          <a:bodyPr/>
+          <a:lstStyle/>
+          <a:p>
+            <a:r>
+              <a:rPr lang="en-US" dirty="0" smtClean="0"/>
+              <a:t>Findings</a:t>
+            </a:r>
+            <a:endParaRPr lang="en-US" dirty="0"/>
+          </a:p>
+        </p:txBody>
+      </p:sp>
+      <p:sp>
+        <p:nvSpPr>
+          <p:cNvPr id="3" name="Content Placeholder 2"/>
+          <p:cNvSpPr>
+            <a:spLocks noGrp="1"/>
+          </p:cNvSpPr>
+          <p:nvPr>
+            <p:ph idx="1"/>
+          </p:nvPr>
+        </p:nvSpPr>
+        <p:spPr/>
+        <p:txBody>
+          <a:bodyPr/>
+          <a:lstStyle/>
+          <a:p>
+            <a:r>
+              <a:rPr lang="en-US" dirty="0" smtClean="0"/>
+              <a:t>Experiment Setup: </a:t>
+            </a:r>
+          </a:p>
+          <a:p>
+            <a:pPr lvl="1"/>
+            <a:r>
+              <a:rPr lang="en-US" dirty="0" smtClean="0"/>
+              <a:t>Find manually scored pieces of music </a:t>
+            </a:r>
+            <a:r>
+              <a:rPr lang="en-US" dirty="0"/>
+              <a:t>for Bb Clarinet </a:t>
+            </a:r>
+            <a:r>
+              <a:rPr lang="en-US" dirty="0" smtClean="0"/>
+              <a:t>from an outside source (Royal Conservatory syllabus).</a:t>
+            </a:r>
+          </a:p>
+          <a:p>
+            <a:pPr lvl="1"/>
+            <a:r>
+              <a:rPr lang="en-US" dirty="0" smtClean="0"/>
+              <a:t>Convert these manually scored pieces into </a:t>
+            </a:r>
+            <a:r>
+              <a:rPr lang="en-US" dirty="0" err="1" smtClean="0"/>
+              <a:t>MusicXML</a:t>
+            </a:r>
+            <a:r>
+              <a:rPr lang="en-US" dirty="0" smtClean="0"/>
+              <a:t> (music OCR software).</a:t>
+            </a:r>
+          </a:p>
+          <a:p>
+            <a:pPr lvl="1"/>
+            <a:r>
+              <a:rPr lang="en-US" dirty="0" smtClean="0"/>
+              <a:t>Generate complexity scores for these pieces with our system.</a:t>
+            </a:r>
+          </a:p>
+          <a:p>
+            <a:pPr lvl="1"/>
+            <a:r>
+              <a:rPr lang="en-US" dirty="0" smtClean="0"/>
+              <a:t>Compare our complexity scores to the manual scores.</a:t>
+            </a:r>
+            <a:endParaRPr lang="en-US" dirty="0"/>
+          </a:p>
+        </p:txBody>
+      </p:sp>
+    </p:spTree>
+    <p:extLst>
+      <p:ext uri="{BB962C8B-B14F-4D97-AF65-F5344CB8AC3E}">
+        <p14:creationId xmlns:p14="http://schemas.microsoft.com/office/powerpoint/2010/main" val="457856985"/>
+      </p:ext>
+    </p:extLst>
+  </p:cSld>
+  <p:clrMapOvr>
+    <a:masterClrMapping/>
+  </p:clrMapOvr>
+</p:sld>
+</file>
+
+<file path=ppt/slides/slide3.xml><?xml version="1.0" encoding="utf-8"?>
+<p:sld xmlns:a="http://schemas.openxmlformats.org/drawingml/2006/main" xmlns:r="http://schemas.openxmlformats.org/officeDocument/2006/relationships" xmlns:p="http://schemas.openxmlformats.org/presentationml/2006/main">
+  <p:cSld>
+    <p:spTree>
+      <p:nvGrpSpPr>
+        <p:cNvPr id="1" name=""/>
+        <p:cNvGrpSpPr/>
+        <p:nvPr/>
+      </p:nvGrpSpPr>
+      <p:grpSpPr>
+        <a:xfrm>
+          <a:off x="0" y="0"/>
+          <a:ext cx="0" cy="0"/>
+          <a:chOff x="0" y="0"/>
+          <a:chExt cx="0" cy="0"/>
+        </a:xfrm>
+      </p:grpSpPr>
+      <p:sp>
+        <p:nvSpPr>
+          <p:cNvPr id="2" name="Title 1"/>
+          <p:cNvSpPr>
+            <a:spLocks noGrp="1"/>
+          </p:cNvSpPr>
+          <p:nvPr>
+            <p:ph type="title"/>
+          </p:nvPr>
+        </p:nvSpPr>
+        <p:spPr/>
+        <p:txBody>
+          <a:bodyPr/>
+          <a:lstStyle/>
+          <a:p>
+            <a:r>
+              <a:rPr lang="en-US" dirty="0" smtClean="0"/>
+              <a:t>Insights</a:t>
+            </a:r>
+            <a:endParaRPr lang="en-US" dirty="0"/>
+          </a:p>
+        </p:txBody>
+      </p:sp>
+      <p:sp>
+        <p:nvSpPr>
+          <p:cNvPr id="3" name="Content Placeholder 2"/>
+          <p:cNvSpPr>
+            <a:spLocks noGrp="1"/>
+          </p:cNvSpPr>
+          <p:nvPr>
+            <p:ph idx="1"/>
+          </p:nvPr>
+        </p:nvSpPr>
+        <p:spPr>
+          <a:xfrm>
+            <a:off x="739775" y="2770094"/>
+            <a:ext cx="7662864" cy="4087906"/>
+          </a:xfrm>
+        </p:spPr>
+        <p:txBody>
+          <a:bodyPr>
+            <a:normAutofit/>
+          </a:bodyPr>
+          <a:lstStyle/>
+          <a:p>
+            <a:endParaRPr lang="en-US" dirty="0" smtClean="0"/>
+          </a:p>
+          <a:p>
+            <a:endParaRPr lang="en-US" dirty="0"/>
+          </a:p>
+          <a:p>
+            <a:r>
+              <a:rPr lang="en-US" dirty="0" smtClean="0"/>
+              <a:t>Musicians can agree that notes in different registers pose different difficulties on wind instruments, although they may not agree on the magnitude of the difference.</a:t>
+            </a:r>
+            <a:endParaRPr lang="en-US" dirty="0"/>
+          </a:p>
+        </p:txBody>
+      </p:sp>
+      <p:pic>
+        <p:nvPicPr>
+          <p:cNvPr id="4" name="Picture 3"/>
+          <p:cNvPicPr>
+            <a:picLocks noChangeAspect="1"/>
+          </p:cNvPicPr>
+          <p:nvPr/>
+        </p:nvPicPr>
+        <p:blipFill>
+          <a:blip r:embed="rId2"/>
+          <a:stretch>
+            <a:fillRect/>
+          </a:stretch>
+        </p:blipFill>
+        <p:spPr>
+          <a:xfrm>
+            <a:off x="2940267" y="1658291"/>
+            <a:ext cx="3343552" cy="2223605"/>
+          </a:xfrm>
+          <a:prstGeom prst="rect">
+            <a:avLst/>
+          </a:prstGeom>
+        </p:spPr>
+      </p:pic>
+      <p:sp>
+        <p:nvSpPr>
+          <p:cNvPr id="5" name="TextBox 4"/>
+          <p:cNvSpPr txBox="1"/>
+          <p:nvPr/>
+        </p:nvSpPr>
+        <p:spPr>
+          <a:xfrm>
+            <a:off x="6406806" y="2770094"/>
+            <a:ext cx="377544" cy="253916"/>
+          </a:xfrm>
+          <a:prstGeom prst="rect">
+            <a:avLst/>
+          </a:prstGeom>
+          <a:noFill/>
+        </p:spPr>
+        <p:txBody>
+          <a:bodyPr wrap="square" rtlCol="0">
+            <a:spAutoFit/>
+          </a:bodyPr>
+          <a:lstStyle/>
+          <a:p>
+            <a:r>
+              <a:rPr lang="en-US" sz="1050" dirty="0" smtClean="0"/>
+              <a:t>[1]</a:t>
+            </a:r>
+            <a:endParaRPr lang="en-US" sz="1050" dirty="0"/>
+          </a:p>
+        </p:txBody>
+      </p:sp>
+      <p:pic>
+        <p:nvPicPr>
+          <p:cNvPr id="6" name="Picture 5" descr="BGExampleText.png"/>
+          <p:cNvPicPr>
+            <a:picLocks noChangeAspect="1"/>
+          </p:cNvPicPr>
+          <p:nvPr/>
+        </p:nvPicPr>
+        <p:blipFill>
+          <a:blip r:embed="rId3">
+            <a:extLst>
+              <a:ext uri="{28A0092B-C50C-407E-A947-70E740481C1C}">
+                <a14:useLocalDpi xmlns:a14="http://schemas.microsoft.com/office/drawing/2010/main" val="0"/>
+              </a:ext>
+            </a:extLst>
+          </a:blip>
+          <a:stretch>
+            <a:fillRect/>
+          </a:stretch>
+        </p:blipFill>
+        <p:spPr>
+          <a:xfrm>
+            <a:off x="1267319" y="5598090"/>
+            <a:ext cx="5016500" cy="863600"/>
+          </a:xfrm>
+          <a:prstGeom prst="rect">
+            <a:avLst/>
+          </a:prstGeom>
+        </p:spPr>
+      </p:pic>
+      <p:sp>
+        <p:nvSpPr>
+          <p:cNvPr id="7" name="Content Placeholder 2"/>
+          <p:cNvSpPr txBox="1">
+            <a:spLocks/>
+          </p:cNvSpPr>
+          <p:nvPr/>
+        </p:nvSpPr>
+        <p:spPr>
+          <a:xfrm>
+            <a:off x="5609102" y="4980921"/>
+            <a:ext cx="2350495" cy="1792311"/>
+          </a:xfrm>
+          <a:prstGeom prst="rect">
+            <a:avLst/>
+          </a:prstGeom>
+        </p:spPr>
+        <p:txBody>
+          <a:bodyPr vert="horz" lIns="91440" tIns="45720" rIns="91440" bIns="45720" rtlCol="0">
+            <a:normAutofit fontScale="70000" lnSpcReduction="20000"/>
+          </a:bodyPr>
+          <a:lstStyle>
+            <a:lvl1pPr marL="342900" indent="-342900" algn="l" defTabSz="914400" rtl="0" eaLnBrk="1" latinLnBrk="0" hangingPunct="1">
+              <a:spcBef>
+                <a:spcPts val="2000"/>
+              </a:spcBef>
+              <a:buClr>
+                <a:schemeClr val="accent1"/>
+              </a:buClr>
+              <a:buSzPct val="90000"/>
+              <a:buFont typeface="Wingdings" pitchFamily="2" charset="2"/>
+              <a:buChar char="S"/>
+              <a:defRPr sz="2200" kern="1200">
+                <a:solidFill>
+                  <a:schemeClr val="tx1">
+                    <a:lumMod val="65000"/>
+                    <a:lumOff val="35000"/>
+                  </a:schemeClr>
+                </a:solidFill>
+                <a:latin typeface="+mn-lt"/>
+                <a:ea typeface="+mn-ea"/>
+                <a:cs typeface="+mn-cs"/>
+              </a:defRPr>
+            </a:lvl1pPr>
+            <a:lvl2pPr marL="685800" indent="-336550" algn="l" defTabSz="914400" rtl="0" eaLnBrk="1" latinLnBrk="0" hangingPunct="1">
+              <a:spcBef>
+                <a:spcPts val="600"/>
+              </a:spcBef>
+              <a:buClr>
+                <a:schemeClr val="accent1">
+                  <a:lumMod val="60000"/>
+                  <a:lumOff val="40000"/>
+                </a:schemeClr>
+              </a:buClr>
+              <a:buSzPct val="90000"/>
+              <a:buFont typeface="Wingdings" pitchFamily="2" charset="2"/>
+              <a:buChar char="S"/>
+              <a:defRPr sz="2000" kern="1200">
+                <a:solidFill>
+                  <a:schemeClr val="tx1">
+                    <a:lumMod val="65000"/>
+                    <a:lumOff val="35000"/>
+                  </a:schemeClr>
+                </a:solidFill>
+                <a:latin typeface="+mn-lt"/>
+                <a:ea typeface="+mn-ea"/>
+                <a:cs typeface="+mn-cs"/>
+              </a:defRPr>
+            </a:lvl2pPr>
+            <a:lvl3pPr marL="1035050" indent="-349250" algn="l" defTabSz="914400" rtl="0" eaLnBrk="1" latinLnBrk="0" hangingPunct="1">
+              <a:spcBef>
+                <a:spcPts val="600"/>
+              </a:spcBef>
+              <a:buClr>
+                <a:schemeClr val="accent1"/>
+              </a:buClr>
+              <a:buSzPct val="90000"/>
+              <a:buFont typeface="Wingdings" pitchFamily="2" charset="2"/>
+              <a:buChar char="S"/>
+              <a:defRPr sz="1800" kern="1200">
+                <a:solidFill>
+                  <a:schemeClr val="tx1">
+                    <a:lumMod val="65000"/>
+                    <a:lumOff val="35000"/>
+                  </a:schemeClr>
+                </a:solidFill>
+                <a:latin typeface="+mn-lt"/>
+                <a:ea typeface="+mn-ea"/>
+                <a:cs typeface="+mn-cs"/>
+              </a:defRPr>
+            </a:lvl3pPr>
+            <a:lvl4pPr marL="1371600" indent="-336550" algn="l" defTabSz="914400" rtl="0" eaLnBrk="1" latinLnBrk="0" hangingPunct="1">
+              <a:spcBef>
+                <a:spcPts val="600"/>
+              </a:spcBef>
+              <a:buClr>
+                <a:schemeClr val="accent1">
+                  <a:lumMod val="60000"/>
+                  <a:lumOff val="40000"/>
+                </a:schemeClr>
+              </a:buClr>
+              <a:buSzPct val="90000"/>
+              <a:buFont typeface="Wingdings" pitchFamily="2" charset="2"/>
+              <a:buChar char="S"/>
+              <a:defRPr sz="1800" kern="1200">
+                <a:solidFill>
+                  <a:schemeClr val="tx1">
+                    <a:lumMod val="65000"/>
+                    <a:lumOff val="35000"/>
+                  </a:schemeClr>
+                </a:solidFill>
+                <a:latin typeface="+mn-lt"/>
+                <a:ea typeface="+mn-ea"/>
+                <a:cs typeface="+mn-cs"/>
+              </a:defRPr>
+            </a:lvl4pPr>
+            <a:lvl5pPr marL="1720850" indent="-349250" algn="l" defTabSz="914400" rtl="0" eaLnBrk="1" latinLnBrk="0" hangingPunct="1">
+              <a:spcBef>
+                <a:spcPts val="600"/>
+              </a:spcBef>
+              <a:buClr>
+                <a:schemeClr val="accent1"/>
+              </a:buClr>
+              <a:buSzPct val="90000"/>
+              <a:buFont typeface="Wingdings" pitchFamily="2" charset="2"/>
+              <a:buChar char="S"/>
+              <a:defRPr sz="1800" kern="1200">
+                <a:solidFill>
+                  <a:schemeClr val="tx1">
+                    <a:lumMod val="65000"/>
+                    <a:lumOff val="35000"/>
+                  </a:schemeClr>
+                </a:solidFill>
+                <a:latin typeface="+mn-lt"/>
+                <a:ea typeface="+mn-ea"/>
+                <a:cs typeface="+mn-cs"/>
+              </a:defRPr>
+            </a:lvl5pPr>
+            <a:lvl6pPr marL="2055813" indent="-344488" algn="l" defTabSz="914400" rtl="0" eaLnBrk="1" latinLnBrk="0" hangingPunct="1">
+              <a:spcBef>
+                <a:spcPct val="20000"/>
+              </a:spcBef>
+              <a:buClr>
+                <a:schemeClr val="accent1">
+                  <a:lumMod val="60000"/>
+                  <a:lumOff val="40000"/>
+                </a:schemeClr>
+              </a:buClr>
+              <a:buSzPct val="90000"/>
+              <a:buFont typeface="Wingdings" pitchFamily="2" charset="2"/>
+              <a:buChar char=""/>
+              <a:defRPr lang="en-US" sz="1800" kern="1200" dirty="0" smtClean="0">
+                <a:solidFill>
+                  <a:schemeClr val="tx1">
+                    <a:lumMod val="65000"/>
+                    <a:lumOff val="35000"/>
+                  </a:schemeClr>
+                </a:solidFill>
+                <a:latin typeface="+mn-lt"/>
+                <a:ea typeface="+mn-ea"/>
+                <a:cs typeface="+mn-cs"/>
+              </a:defRPr>
+            </a:lvl6pPr>
+            <a:lvl7pPr marL="2398713" indent="-344488" algn="l" defTabSz="914400" rtl="0" eaLnBrk="1" latinLnBrk="0" hangingPunct="1">
+              <a:spcBef>
+                <a:spcPct val="20000"/>
+              </a:spcBef>
+              <a:buClr>
+                <a:schemeClr val="accent1"/>
+              </a:buClr>
+              <a:buSzPct val="90000"/>
+              <a:buFont typeface="Wingdings" pitchFamily="2" charset="2"/>
+              <a:buChar char=""/>
+              <a:defRPr lang="en-US" sz="1800" kern="1200" dirty="0" smtClean="0">
+                <a:solidFill>
+                  <a:schemeClr val="tx1">
+                    <a:lumMod val="65000"/>
+                    <a:lumOff val="35000"/>
+                  </a:schemeClr>
+                </a:solidFill>
+                <a:latin typeface="+mn-lt"/>
+                <a:ea typeface="+mn-ea"/>
+                <a:cs typeface="+mn-cs"/>
+              </a:defRPr>
+            </a:lvl7pPr>
+            <a:lvl8pPr marL="2743200" indent="-344488" algn="l" defTabSz="914400" rtl="0" eaLnBrk="1" latinLnBrk="0" hangingPunct="1">
+              <a:spcBef>
+                <a:spcPct val="20000"/>
+              </a:spcBef>
+              <a:buClr>
+                <a:schemeClr val="accent1">
+                  <a:lumMod val="60000"/>
+                  <a:lumOff val="40000"/>
+                </a:schemeClr>
+              </a:buClr>
+              <a:buSzPct val="90000"/>
+              <a:buFont typeface="Wingdings" pitchFamily="2" charset="2"/>
+              <a:buChar char=""/>
+              <a:defRPr lang="en-US" sz="1800" kern="1200" dirty="0" smtClean="0">
+                <a:solidFill>
+                  <a:schemeClr val="tx1">
+                    <a:lumMod val="65000"/>
+                    <a:lumOff val="35000"/>
+                  </a:schemeClr>
+                </a:solidFill>
+                <a:latin typeface="+mn-lt"/>
+                <a:ea typeface="+mn-ea"/>
+                <a:cs typeface="+mn-cs"/>
+              </a:defRPr>
+            </a:lvl8pPr>
+            <a:lvl9pPr marL="3087688" indent="-344488" algn="l" defTabSz="914400" rtl="0" eaLnBrk="1" latinLnBrk="0" hangingPunct="1">
+              <a:spcBef>
+                <a:spcPct val="20000"/>
+              </a:spcBef>
+              <a:buClr>
+                <a:schemeClr val="accent1"/>
+              </a:buClr>
+              <a:buSzPct val="90000"/>
+              <a:buFont typeface="Wingdings" pitchFamily="2" charset="2"/>
+              <a:buChar char=""/>
+              <a:defRPr lang="en-US" sz="1800" kern="1200" dirty="0">
+                <a:solidFill>
+                  <a:schemeClr val="tx1">
+                    <a:lumMod val="65000"/>
+                    <a:lumOff val="35000"/>
+                  </a:schemeClr>
+                </a:solidFill>
+                <a:latin typeface="+mn-lt"/>
+                <a:ea typeface="+mn-ea"/>
+                <a:cs typeface="+mn-cs"/>
+              </a:defRPr>
+            </a:lvl9pPr>
+          </a:lstStyle>
+          <a:p>
+            <a:pPr marL="0" indent="0" algn="ctr">
+              <a:buFont typeface="Wingdings" pitchFamily="2" charset="2"/>
+              <a:buNone/>
+            </a:pPr>
+            <a:endParaRPr lang="en-US" dirty="0" smtClean="0"/>
+          </a:p>
+          <a:p>
+            <a:pPr marL="0" indent="0" algn="ctr">
+              <a:buFont typeface="Wingdings" pitchFamily="2" charset="2"/>
+              <a:buNone/>
+            </a:pPr>
+            <a:r>
+              <a:rPr lang="en-US" sz="13800" dirty="0" smtClean="0"/>
+              <a:t>?</a:t>
+            </a:r>
+            <a:endParaRPr lang="en-US" sz="13800" dirty="0"/>
+          </a:p>
+        </p:txBody>
+      </p:sp>
+    </p:spTree>
+    <p:extLst>
+      <p:ext uri="{BB962C8B-B14F-4D97-AF65-F5344CB8AC3E}">
+        <p14:creationId xmlns:p14="http://schemas.microsoft.com/office/powerpoint/2010/main" val="4080678011"/>
+      </p:ext>
+    </p:extLst>
+  </p:cSld>
+  <p:clrMapOvr>
+    <a:masterClrMapping/>
+  </p:clrMapOvr>
+  <p:timing>
+    <p:tnLst>
+      <p:par>
+        <p:cTn xmlns:p14="http://schemas.microsoft.com/office/powerpoint/2010/main" id="1" dur="indefinite" restart="never" nodeType="tmRoot"/>
+      </p:par>
+    </p:tnLst>
+  </p:timing>
+</p:sld>
+</file>
+
+<file path=ppt/slides/slide30.xml><?xml version="1.0" encoding="utf-8"?>
+<p:sld xmlns:a="http://schemas.openxmlformats.org/drawingml/2006/main" xmlns:r="http://schemas.openxmlformats.org/officeDocument/2006/relationships" xmlns:p="http://schemas.openxmlformats.org/presentationml/2006/main">
+  <p:cSld>
+    <p:spTree>
+      <p:nvGrpSpPr>
+        <p:cNvPr id="1" name=""/>
+        <p:cNvGrpSpPr/>
+        <p:nvPr/>
+      </p:nvGrpSpPr>
+      <p:grpSpPr>
+        <a:xfrm>
+          <a:off x="0" y="0"/>
+          <a:ext cx="0" cy="0"/>
+          <a:chOff x="0" y="0"/>
+          <a:chExt cx="0" cy="0"/>
+        </a:xfrm>
+      </p:grpSpPr>
+      <p:sp>
+        <p:nvSpPr>
+          <p:cNvPr id="2" name="Title 1"/>
+          <p:cNvSpPr>
+            <a:spLocks noGrp="1"/>
+          </p:cNvSpPr>
+          <p:nvPr>
+            <p:ph type="title"/>
+          </p:nvPr>
+        </p:nvSpPr>
+        <p:spPr/>
+        <p:txBody>
+          <a:bodyPr/>
+          <a:lstStyle/>
+          <a:p>
+            <a:r>
+              <a:rPr lang="en-US" dirty="0" smtClean="0"/>
+              <a:t>Findings</a:t>
+            </a:r>
+            <a:endParaRPr lang="en-US" dirty="0"/>
+          </a:p>
+        </p:txBody>
+      </p:sp>
+      <p:pic>
+        <p:nvPicPr>
+          <p:cNvPr id="5" name="Picture 4" descr="GradesVsComplexityScores.png"/>
+          <p:cNvPicPr>
+            <a:picLocks noChangeAspect="1"/>
+          </p:cNvPicPr>
+          <p:nvPr/>
+        </p:nvPicPr>
+        <p:blipFill>
+          <a:blip r:embed="rId2">
+            <a:extLst>
+              <a:ext uri="{28A0092B-C50C-407E-A947-70E740481C1C}">
+                <a14:useLocalDpi xmlns:a14="http://schemas.microsoft.com/office/drawing/2010/main" val="0"/>
+              </a:ext>
+            </a:extLst>
+          </a:blip>
+          <a:stretch>
+            <a:fillRect/>
+          </a:stretch>
+        </p:blipFill>
+        <p:spPr>
+          <a:xfrm>
+            <a:off x="1418650" y="2300501"/>
+            <a:ext cx="6318868" cy="4305777"/>
+          </a:xfrm>
+          <a:prstGeom prst="rect">
+            <a:avLst/>
+          </a:prstGeom>
+        </p:spPr>
+      </p:pic>
+      <p:sp>
+        <p:nvSpPr>
+          <p:cNvPr id="6" name="TextBox 5"/>
+          <p:cNvSpPr txBox="1"/>
+          <p:nvPr/>
+        </p:nvSpPr>
+        <p:spPr>
+          <a:xfrm>
+            <a:off x="2642807" y="6488668"/>
+            <a:ext cx="4760288" cy="369332"/>
+          </a:xfrm>
+          <a:prstGeom prst="rect">
+            <a:avLst/>
+          </a:prstGeom>
+          <a:noFill/>
+        </p:spPr>
+        <p:txBody>
+          <a:bodyPr wrap="none" rtlCol="0">
+            <a:spAutoFit/>
+          </a:bodyPr>
+          <a:lstStyle/>
+          <a:p>
+            <a:r>
+              <a:rPr lang="en-US" dirty="0" smtClean="0">
+                <a:solidFill>
+                  <a:schemeClr val="tx1">
+                    <a:lumMod val="65000"/>
+                    <a:lumOff val="35000"/>
+                  </a:schemeClr>
+                </a:solidFill>
+              </a:rPr>
+              <a:t>Pieces by Manual Scores (Royal Conservatory)</a:t>
+            </a:r>
+          </a:p>
+        </p:txBody>
+      </p:sp>
+      <p:sp>
+        <p:nvSpPr>
+          <p:cNvPr id="7" name="TextBox 6"/>
+          <p:cNvSpPr txBox="1"/>
+          <p:nvPr/>
+        </p:nvSpPr>
+        <p:spPr>
+          <a:xfrm>
+            <a:off x="88050" y="3169412"/>
+            <a:ext cx="1330600" cy="646331"/>
+          </a:xfrm>
+          <a:prstGeom prst="rect">
+            <a:avLst/>
+          </a:prstGeom>
+          <a:noFill/>
+        </p:spPr>
+        <p:txBody>
+          <a:bodyPr wrap="none" rtlCol="0">
+            <a:spAutoFit/>
+          </a:bodyPr>
+          <a:lstStyle/>
+          <a:p>
+            <a:pPr algn="ctr"/>
+            <a:r>
+              <a:rPr lang="en-US" dirty="0" smtClean="0">
+                <a:solidFill>
+                  <a:srgbClr val="595959"/>
+                </a:solidFill>
+              </a:rPr>
+              <a:t>Complexity</a:t>
+            </a:r>
+          </a:p>
+          <a:p>
+            <a:pPr algn="ctr"/>
+            <a:r>
+              <a:rPr lang="en-US" dirty="0" smtClean="0">
+                <a:solidFill>
+                  <a:srgbClr val="595959"/>
+                </a:solidFill>
+              </a:rPr>
+              <a:t>Scores</a:t>
+            </a:r>
+            <a:endParaRPr lang="en-US" dirty="0">
+              <a:solidFill>
+                <a:srgbClr val="595959"/>
+              </a:solidFill>
+            </a:endParaRPr>
+          </a:p>
+        </p:txBody>
+      </p:sp>
+    </p:spTree>
+    <p:extLst>
+      <p:ext uri="{BB962C8B-B14F-4D97-AF65-F5344CB8AC3E}">
+        <p14:creationId xmlns:p14="http://schemas.microsoft.com/office/powerpoint/2010/main" val="881071106"/>
+      </p:ext>
+    </p:extLst>
+  </p:cSld>
+  <p:clrMapOvr>
+    <a:masterClrMapping/>
+  </p:clrMapOvr>
+</p:sld>
+</file>
+
+<file path=ppt/slides/slide31.xml><?xml version="1.0" encoding="utf-8"?>
+<p:sld xmlns:a="http://schemas.openxmlformats.org/drawingml/2006/main" xmlns:r="http://schemas.openxmlformats.org/officeDocument/2006/relationships" xmlns:p="http://schemas.openxmlformats.org/presentationml/2006/main">
+  <p:cSld>
+    <p:spTree>
+      <p:nvGrpSpPr>
+        <p:cNvPr id="1" name=""/>
+        <p:cNvGrpSpPr/>
+        <p:nvPr/>
+      </p:nvGrpSpPr>
+      <p:grpSpPr>
+        <a:xfrm>
+          <a:off x="0" y="0"/>
+          <a:ext cx="0" cy="0"/>
+          <a:chOff x="0" y="0"/>
+          <a:chExt cx="0" cy="0"/>
+        </a:xfrm>
+      </p:grpSpPr>
+      <p:sp>
+        <p:nvSpPr>
+          <p:cNvPr id="2" name="Title 1"/>
+          <p:cNvSpPr>
+            <a:spLocks noGrp="1"/>
+          </p:cNvSpPr>
+          <p:nvPr>
+            <p:ph type="title"/>
+          </p:nvPr>
+        </p:nvSpPr>
+        <p:spPr/>
+        <p:txBody>
+          <a:bodyPr/>
+          <a:lstStyle/>
+          <a:p>
+            <a:r>
+              <a:rPr lang="en-US" dirty="0" smtClean="0"/>
+              <a:t>Findings</a:t>
+            </a:r>
+            <a:endParaRPr lang="en-US" dirty="0"/>
+          </a:p>
+        </p:txBody>
+      </p:sp>
+      <p:pic>
+        <p:nvPicPr>
+          <p:cNvPr id="4" name="Picture 3" descr="GradesVsAverageComplexityScoresSTD.png"/>
+          <p:cNvPicPr>
+            <a:picLocks noChangeAspect="1"/>
+          </p:cNvPicPr>
+          <p:nvPr/>
+        </p:nvPicPr>
+        <p:blipFill>
+          <a:blip r:embed="rId2">
+            <a:extLst>
+              <a:ext uri="{28A0092B-C50C-407E-A947-70E740481C1C}">
+                <a14:useLocalDpi xmlns:a14="http://schemas.microsoft.com/office/drawing/2010/main" val="0"/>
+              </a:ext>
+            </a:extLst>
+          </a:blip>
+          <a:stretch>
+            <a:fillRect/>
+          </a:stretch>
+        </p:blipFill>
+        <p:spPr>
+          <a:xfrm>
+            <a:off x="1510839" y="2308078"/>
+            <a:ext cx="6135151" cy="4180590"/>
+          </a:xfrm>
+          <a:prstGeom prst="rect">
+            <a:avLst/>
+          </a:prstGeom>
+        </p:spPr>
+      </p:pic>
+      <p:sp>
+        <p:nvSpPr>
+          <p:cNvPr id="5" name="TextBox 4"/>
+          <p:cNvSpPr txBox="1"/>
+          <p:nvPr/>
+        </p:nvSpPr>
+        <p:spPr>
+          <a:xfrm>
+            <a:off x="88050" y="3169412"/>
+            <a:ext cx="1330600" cy="923330"/>
+          </a:xfrm>
+          <a:prstGeom prst="rect">
+            <a:avLst/>
+          </a:prstGeom>
+          <a:noFill/>
+        </p:spPr>
+        <p:txBody>
+          <a:bodyPr wrap="none" rtlCol="0">
+            <a:spAutoFit/>
+          </a:bodyPr>
+          <a:lstStyle/>
+          <a:p>
+            <a:pPr algn="ctr"/>
+            <a:r>
+              <a:rPr lang="en-US" dirty="0" smtClean="0">
+                <a:solidFill>
+                  <a:srgbClr val="595959"/>
+                </a:solidFill>
+              </a:rPr>
+              <a:t>Average</a:t>
+            </a:r>
+          </a:p>
+          <a:p>
+            <a:pPr algn="ctr"/>
+            <a:r>
+              <a:rPr lang="en-US" dirty="0" smtClean="0">
+                <a:solidFill>
+                  <a:srgbClr val="595959"/>
+                </a:solidFill>
+              </a:rPr>
+              <a:t>Complexity</a:t>
+            </a:r>
+          </a:p>
+          <a:p>
+            <a:pPr algn="ctr"/>
+            <a:r>
+              <a:rPr lang="en-US" dirty="0" smtClean="0">
+                <a:solidFill>
+                  <a:srgbClr val="595959"/>
+                </a:solidFill>
+              </a:rPr>
+              <a:t>Scores</a:t>
+            </a:r>
+            <a:endParaRPr lang="en-US" dirty="0">
+              <a:solidFill>
+                <a:srgbClr val="595959"/>
+              </a:solidFill>
+            </a:endParaRPr>
+          </a:p>
+        </p:txBody>
+      </p:sp>
+      <p:sp>
+        <p:nvSpPr>
+          <p:cNvPr id="6" name="TextBox 5"/>
+          <p:cNvSpPr txBox="1"/>
+          <p:nvPr/>
+        </p:nvSpPr>
+        <p:spPr>
+          <a:xfrm>
+            <a:off x="2642807" y="6488668"/>
+            <a:ext cx="4760288" cy="369332"/>
+          </a:xfrm>
+          <a:prstGeom prst="rect">
+            <a:avLst/>
+          </a:prstGeom>
+          <a:noFill/>
+        </p:spPr>
+        <p:txBody>
+          <a:bodyPr wrap="none" rtlCol="0">
+            <a:spAutoFit/>
+          </a:bodyPr>
+          <a:lstStyle/>
+          <a:p>
+            <a:r>
+              <a:rPr lang="en-US" dirty="0" smtClean="0">
+                <a:solidFill>
+                  <a:schemeClr val="tx1">
+                    <a:lumMod val="65000"/>
+                    <a:lumOff val="35000"/>
+                  </a:schemeClr>
+                </a:solidFill>
+              </a:rPr>
+              <a:t>Pieces by Manual Scores (Royal Conservatory)</a:t>
+            </a:r>
+          </a:p>
+        </p:txBody>
+      </p:sp>
+    </p:spTree>
+    <p:extLst>
+      <p:ext uri="{BB962C8B-B14F-4D97-AF65-F5344CB8AC3E}">
+        <p14:creationId xmlns:p14="http://schemas.microsoft.com/office/powerpoint/2010/main" val="3377909639"/>
+      </p:ext>
+    </p:extLst>
+  </p:cSld>
+  <p:clrMapOvr>
+    <a:masterClrMapping/>
+  </p:clrMapOvr>
+</p:sld>
+</file>
+
+<file path=ppt/slides/slide32.xml><?xml version="1.0" encoding="utf-8"?>
+<p:sld xmlns:a="http://schemas.openxmlformats.org/drawingml/2006/main" xmlns:r="http://schemas.openxmlformats.org/officeDocument/2006/relationships" xmlns:p="http://schemas.openxmlformats.org/presentationml/2006/main">
+  <p:cSld>
+    <p:spTree>
+      <p:nvGrpSpPr>
+        <p:cNvPr id="1" name=""/>
+        <p:cNvGrpSpPr/>
+        <p:nvPr/>
+      </p:nvGrpSpPr>
+      <p:grpSpPr>
+        <a:xfrm>
+          <a:off x="0" y="0"/>
+          <a:ext cx="0" cy="0"/>
+          <a:chOff x="0" y="0"/>
+          <a:chExt cx="0" cy="0"/>
+        </a:xfrm>
+      </p:grpSpPr>
+      <p:sp>
+        <p:nvSpPr>
+          <p:cNvPr id="2" name="Title 1"/>
+          <p:cNvSpPr>
+            <a:spLocks noGrp="1"/>
+          </p:cNvSpPr>
+          <p:nvPr>
+            <p:ph type="title"/>
+          </p:nvPr>
+        </p:nvSpPr>
+        <p:spPr/>
+        <p:txBody>
+          <a:bodyPr/>
+          <a:lstStyle/>
+          <a:p>
+            <a:r>
+              <a:rPr lang="en-US" dirty="0" smtClean="0"/>
               <a:t>Contributions</a:t>
             </a:r>
             <a:endParaRPr lang="en-US" dirty="0"/>
@@ -10297,7 +12301,7 @@
           <a:p>
             <a:r>
               <a:rPr lang="en-US" dirty="0" smtClean="0"/>
-              <a:t>We submitted our results so far to ONWARD’15 for publication.</a:t>
+              <a:t>The initial results have been submitted to ONWARD’15 for publication.</a:t>
             </a:r>
             <a:endParaRPr lang="en-US" dirty="0"/>
           </a:p>
@@ -10353,7 +12357,7 @@
 </p:sld>
 </file>
 
-<file path=ppt/slides/slide23.xml><?xml version="1.0" encoding="utf-8"?>
+<file path=ppt/slides/slide33.xml><?xml version="1.0" encoding="utf-8"?>
 <p:sld xmlns:a="http://schemas.openxmlformats.org/drawingml/2006/main" xmlns:r="http://schemas.openxmlformats.org/officeDocument/2006/relationships" xmlns:p="http://schemas.openxmlformats.org/presentationml/2006/main">
   <p:cSld>
     <p:spTree>
@@ -10447,7 +12451,7 @@
 </p:sld>
 </file>
 
-<file path=ppt/slides/slide24.xml><?xml version="1.0" encoding="utf-8"?>
+<file path=ppt/slides/slide34.xml><?xml version="1.0" encoding="utf-8"?>
 <p:sld xmlns:a="http://schemas.openxmlformats.org/drawingml/2006/main" xmlns:r="http://schemas.openxmlformats.org/officeDocument/2006/relationships" xmlns:p="http://schemas.openxmlformats.org/presentationml/2006/main">
   <p:cSld>
     <p:spTree>
@@ -10544,6 +12548,32 @@
               <a:buFont typeface="+mj-lt"/>
               <a:buAutoNum type="arabicPeriod"/>
             </a:pPr>
+            <a:r>
+              <a:rPr lang="en-US" dirty="0">
+                <a:hlinkClick r:id="rId4"/>
+              </a:rPr>
+              <a:t>https://s-media-cache-ak0.pinimg.com/originals/49/0a/eb/490aeb9159c5b3044035cfbf7e4a19f3.</a:t>
+            </a:r>
+            <a:r>
+              <a:rPr lang="en-US" dirty="0" smtClean="0">
+                <a:hlinkClick r:id="rId4"/>
+              </a:rPr>
+              <a:t>jpg</a:t>
+            </a:r>
+            <a:endParaRPr lang="en-US" dirty="0" smtClean="0"/>
+          </a:p>
+          <a:p>
+            <a:pPr marL="457200" indent="-457200">
+              <a:buFont typeface="+mj-lt"/>
+              <a:buAutoNum type="arabicPeriod"/>
+            </a:pPr>
+            <a:endParaRPr lang="en-US" dirty="0" smtClean="0"/>
+          </a:p>
+          <a:p>
+            <a:pPr marL="457200" indent="-457200">
+              <a:buFont typeface="+mj-lt"/>
+              <a:buAutoNum type="arabicPeriod"/>
+            </a:pPr>
             <a:endParaRPr lang="en-US" dirty="0" smtClean="0"/>
           </a:p>
           <a:p>
@@ -10568,7 +12598,7 @@
 </p:sld>
 </file>
 
-<file path=ppt/slides/slide25.xml><?xml version="1.0" encoding="utf-8"?>
+<file path=ppt/slides/slide35.xml><?xml version="1.0" encoding="utf-8"?>
 <p:sld xmlns:a="http://schemas.openxmlformats.org/drawingml/2006/main" xmlns:r="http://schemas.openxmlformats.org/officeDocument/2006/relationships" xmlns:p="http://schemas.openxmlformats.org/presentationml/2006/main">
   <p:cSld>
     <p:spTree>
@@ -10714,7 +12744,7 @@
 </p:sld>
 </file>
 
-<file path=ppt/slides/slide26.xml><?xml version="1.0" encoding="utf-8"?>
+<file path=ppt/slides/slide36.xml><?xml version="1.0" encoding="utf-8"?>
 <p:sld xmlns:a="http://schemas.openxmlformats.org/drawingml/2006/main" xmlns:r="http://schemas.openxmlformats.org/officeDocument/2006/relationships" xmlns:p="http://schemas.openxmlformats.org/presentationml/2006/main">
   <p:cSld>
     <p:spTree>
@@ -10830,7 +12860,7 @@
 </p:sld>
 </file>
 
-<file path=ppt/slides/slide27.xml><?xml version="1.0" encoding="utf-8"?>
+<file path=ppt/slides/slide37.xml><?xml version="1.0" encoding="utf-8"?>
 <p:sld xmlns:a="http://schemas.openxmlformats.org/drawingml/2006/main" xmlns:r="http://schemas.openxmlformats.org/officeDocument/2006/relationships" xmlns:p="http://schemas.openxmlformats.org/presentationml/2006/main">
   <p:cSld>
     <p:spTree>
@@ -10971,7 +13001,7 @@
 </p:sld>
 </file>
 
-<file path=ppt/slides/slide28.xml><?xml version="1.0" encoding="utf-8"?>
+<file path=ppt/slides/slide38.xml><?xml version="1.0" encoding="utf-8"?>
 <p:sld xmlns:a="http://schemas.openxmlformats.org/drawingml/2006/main" xmlns:r="http://schemas.openxmlformats.org/officeDocument/2006/relationships" xmlns:p="http://schemas.openxmlformats.org/presentationml/2006/main">
   <p:cSld>
     <p:spTree>
@@ -11169,7 +13199,7 @@
 </p:sld>
 </file>
 
-<file path=ppt/slides/slide3.xml><?xml version="1.0" encoding="utf-8"?>
+<file path=ppt/slides/slide39.xml><?xml version="1.0" encoding="utf-8"?>
 <p:sld xmlns:a="http://schemas.openxmlformats.org/drawingml/2006/main" xmlns:r="http://schemas.openxmlformats.org/officeDocument/2006/relationships" xmlns:p="http://schemas.openxmlformats.org/presentationml/2006/main">
   <p:cSld>
     <p:spTree>
@@ -11203,43 +13233,7 @@
           <a:p>
             <a:r>
               <a:rPr lang="en-US" dirty="0" smtClean="0"/>
-              <a:t>Insights</a:t>
-            </a:r>
-            <a:endParaRPr lang="en-US" dirty="0"/>
-          </a:p>
-        </p:txBody>
-      </p:sp>
-      <p:sp>
-        <p:nvSpPr>
-          <p:cNvPr id="3" name="Content Placeholder 2"/>
-          <p:cNvSpPr>
-            <a:spLocks noGrp="1"/>
-          </p:cNvSpPr>
-          <p:nvPr>
-            <p:ph idx="1"/>
-          </p:nvPr>
-        </p:nvSpPr>
-        <p:spPr>
-          <a:xfrm>
-            <a:off x="739775" y="2770094"/>
-            <a:ext cx="7662864" cy="4087906"/>
-          </a:xfrm>
-        </p:spPr>
-        <p:txBody>
-          <a:bodyPr>
-            <a:normAutofit/>
-          </a:bodyPr>
-          <a:lstStyle/>
-          <a:p>
-            <a:endParaRPr lang="en-US" dirty="0" smtClean="0"/>
-          </a:p>
-          <a:p>
-            <a:endParaRPr lang="en-US" dirty="0"/>
-          </a:p>
-          <a:p>
-            <a:r>
-              <a:rPr lang="en-US" dirty="0" smtClean="0"/>
-              <a:t>Musicians can agree that notes in different registers pose different difficulties on wind instruments, although they may not agree on the magnitude of the difference.</a:t>
+              <a:t>Reliability of Music OCR</a:t>
             </a:r>
             <a:endParaRPr lang="en-US" dirty="0"/>
           </a:p>
@@ -11247,68 +13241,14 @@
       </p:sp>
       <p:pic>
         <p:nvPicPr>
-          <p:cNvPr id="4" name="Picture 3"/>
+          <p:cNvPr id="4" name="Picture 3" descr="PercentageOCR.png"/>
           <p:cNvPicPr>
             <a:picLocks noChangeAspect="1"/>
           </p:cNvPicPr>
           <p:nvPr/>
         </p:nvPicPr>
         <p:blipFill>
-          <a:blip r:embed="rId2"/>
-          <a:stretch>
-            <a:fillRect/>
-          </a:stretch>
-        </p:blipFill>
-        <p:spPr>
-          <a:xfrm>
-            <a:off x="2940267" y="1658291"/>
-            <a:ext cx="3343552" cy="2223605"/>
-          </a:xfrm>
-          <a:prstGeom prst="rect">
-            <a:avLst/>
-          </a:prstGeom>
-        </p:spPr>
-      </p:pic>
-      <p:sp>
-        <p:nvSpPr>
-          <p:cNvPr id="5" name="TextBox 4"/>
-          <p:cNvSpPr txBox="1"/>
-          <p:nvPr/>
-        </p:nvSpPr>
-        <p:spPr>
-          <a:xfrm>
-            <a:off x="6406806" y="2770094"/>
-            <a:ext cx="377544" cy="253916"/>
-          </a:xfrm>
-          <a:prstGeom prst="rect">
-            <a:avLst/>
-          </a:prstGeom>
-          <a:noFill/>
-        </p:spPr>
-        <p:txBody>
-          <a:bodyPr wrap="square" rtlCol="0">
-            <a:spAutoFit/>
-          </a:bodyPr>
-          <a:lstStyle/>
-          <a:p>
-            <a:r>
-              <a:rPr lang="en-US" sz="1050" dirty="0" smtClean="0"/>
-              <a:t>[1]</a:t>
-            </a:r>
-            <a:endParaRPr lang="en-US" sz="1050" dirty="0"/>
-          </a:p>
-        </p:txBody>
-      </p:sp>
-      <p:pic>
-        <p:nvPicPr>
-          <p:cNvPr id="6" name="Picture 5" descr="BGExampleText.png"/>
-          <p:cNvPicPr>
-            <a:picLocks noChangeAspect="1"/>
-          </p:cNvPicPr>
-          <p:nvPr/>
-        </p:nvPicPr>
-        <p:blipFill>
-          <a:blip r:embed="rId3">
+          <a:blip r:embed="rId2">
             <a:extLst>
               <a:ext uri="{28A0092B-C50C-407E-A947-70E740481C1C}">
                 <a14:useLocalDpi xmlns:a14="http://schemas.microsoft.com/office/drawing/2010/main" val="0"/>
@@ -11321,8 +13261,8 @@
         </p:blipFill>
         <p:spPr>
           <a:xfrm>
-            <a:off x="1267319" y="5598090"/>
-            <a:ext cx="5016500" cy="863600"/>
+            <a:off x="1510175" y="2440210"/>
+            <a:ext cx="5937737" cy="4048458"/>
           </a:xfrm>
           <a:prstGeom prst="rect">
             <a:avLst/>
@@ -11331,274 +13271,133 @@
       </p:pic>
       <p:sp>
         <p:nvSpPr>
-          <p:cNvPr id="7" name="Content Placeholder 2"/>
-          <p:cNvSpPr txBox="1">
-            <a:spLocks/>
-          </p:cNvSpPr>
+          <p:cNvPr id="5" name="TextBox 4"/>
+          <p:cNvSpPr txBox="1"/>
           <p:nvPr/>
         </p:nvSpPr>
         <p:spPr>
           <a:xfrm>
-            <a:off x="5609102" y="4980921"/>
-            <a:ext cx="2350495" cy="1792311"/>
+            <a:off x="1784752" y="6501210"/>
+            <a:ext cx="5566623" cy="369332"/>
           </a:xfrm>
           <a:prstGeom prst="rect">
             <a:avLst/>
           </a:prstGeom>
+          <a:noFill/>
         </p:spPr>
         <p:txBody>
-          <a:bodyPr vert="horz" lIns="91440" tIns="45720" rIns="91440" bIns="45720" rtlCol="0">
-            <a:normAutofit fontScale="70000" lnSpcReduction="20000"/>
+          <a:bodyPr wrap="none" rtlCol="0">
+            <a:spAutoFit/>
           </a:bodyPr>
-          <a:lstStyle>
-            <a:lvl1pPr marL="342900" indent="-342900" algn="l" defTabSz="914400" rtl="0" eaLnBrk="1" latinLnBrk="0" hangingPunct="1">
-              <a:spcBef>
-                <a:spcPts val="2000"/>
-              </a:spcBef>
-              <a:buClr>
-                <a:schemeClr val="accent1"/>
-              </a:buClr>
-              <a:buSzPct val="90000"/>
-              <a:buFont typeface="Wingdings" pitchFamily="2" charset="2"/>
-              <a:buChar char="S"/>
-              <a:defRPr sz="2200" kern="1200">
+          <a:lstStyle/>
+          <a:p>
+            <a:r>
+              <a:rPr lang="en-US" dirty="0" smtClean="0">
                 <a:solidFill>
                   <a:schemeClr val="tx1">
                     <a:lumMod val="65000"/>
                     <a:lumOff val="35000"/>
                   </a:schemeClr>
                 </a:solidFill>
-                <a:latin typeface="+mn-lt"/>
-                <a:ea typeface="+mn-ea"/>
-                <a:cs typeface="+mn-cs"/>
-              </a:defRPr>
-            </a:lvl1pPr>
-            <a:lvl2pPr marL="685800" indent="-336550" algn="l" defTabSz="914400" rtl="0" eaLnBrk="1" latinLnBrk="0" hangingPunct="1">
-              <a:spcBef>
-                <a:spcPts val="600"/>
-              </a:spcBef>
-              <a:buClr>
-                <a:schemeClr val="accent1">
-                  <a:lumMod val="60000"/>
-                  <a:lumOff val="40000"/>
-                </a:schemeClr>
-              </a:buClr>
-              <a:buSzPct val="90000"/>
-              <a:buFont typeface="Wingdings" pitchFamily="2" charset="2"/>
-              <a:buChar char="S"/>
-              <a:defRPr sz="2000" kern="1200">
+              </a:rPr>
+              <a:t>Music Pieces Converted with Music OCR (</a:t>
+            </a:r>
+            <a:r>
+              <a:rPr lang="en-US" dirty="0" err="1" smtClean="0">
                 <a:solidFill>
                   <a:schemeClr val="tx1">
                     <a:lumMod val="65000"/>
                     <a:lumOff val="35000"/>
                   </a:schemeClr>
                 </a:solidFill>
-                <a:latin typeface="+mn-lt"/>
-                <a:ea typeface="+mn-ea"/>
-                <a:cs typeface="+mn-cs"/>
-              </a:defRPr>
-            </a:lvl2pPr>
-            <a:lvl3pPr marL="1035050" indent="-349250" algn="l" defTabSz="914400" rtl="0" eaLnBrk="1" latinLnBrk="0" hangingPunct="1">
-              <a:spcBef>
-                <a:spcPts val="600"/>
-              </a:spcBef>
-              <a:buClr>
-                <a:schemeClr val="accent1"/>
-              </a:buClr>
-              <a:buSzPct val="90000"/>
-              <a:buFont typeface="Wingdings" pitchFamily="2" charset="2"/>
-              <a:buChar char="S"/>
-              <a:defRPr sz="1800" kern="1200">
+              </a:rPr>
+              <a:t>MuseScore</a:t>
+            </a:r>
+            <a:r>
+              <a:rPr lang="en-US" dirty="0" smtClean="0">
                 <a:solidFill>
                   <a:schemeClr val="tx1">
                     <a:lumMod val="65000"/>
                     <a:lumOff val="35000"/>
                   </a:schemeClr>
                 </a:solidFill>
-                <a:latin typeface="+mn-lt"/>
-                <a:ea typeface="+mn-ea"/>
-                <a:cs typeface="+mn-cs"/>
-              </a:defRPr>
-            </a:lvl3pPr>
-            <a:lvl4pPr marL="1371600" indent="-336550" algn="l" defTabSz="914400" rtl="0" eaLnBrk="1" latinLnBrk="0" hangingPunct="1">
-              <a:spcBef>
-                <a:spcPts val="600"/>
-              </a:spcBef>
-              <a:buClr>
-                <a:schemeClr val="accent1">
-                  <a:lumMod val="60000"/>
-                  <a:lumOff val="40000"/>
-                </a:schemeClr>
-              </a:buClr>
-              <a:buSzPct val="90000"/>
-              <a:buFont typeface="Wingdings" pitchFamily="2" charset="2"/>
-              <a:buChar char="S"/>
-              <a:defRPr sz="1800" kern="1200">
-                <a:solidFill>
-                  <a:schemeClr val="tx1">
-                    <a:lumMod val="65000"/>
-                    <a:lumOff val="35000"/>
-                  </a:schemeClr>
-                </a:solidFill>
-                <a:latin typeface="+mn-lt"/>
-                <a:ea typeface="+mn-ea"/>
-                <a:cs typeface="+mn-cs"/>
-              </a:defRPr>
-            </a:lvl4pPr>
-            <a:lvl5pPr marL="1720850" indent="-349250" algn="l" defTabSz="914400" rtl="0" eaLnBrk="1" latinLnBrk="0" hangingPunct="1">
-              <a:spcBef>
-                <a:spcPts val="600"/>
-              </a:spcBef>
-              <a:buClr>
-                <a:schemeClr val="accent1"/>
-              </a:buClr>
-              <a:buSzPct val="90000"/>
-              <a:buFont typeface="Wingdings" pitchFamily="2" charset="2"/>
-              <a:buChar char="S"/>
-              <a:defRPr sz="1800" kern="1200">
-                <a:solidFill>
-                  <a:schemeClr val="tx1">
-                    <a:lumMod val="65000"/>
-                    <a:lumOff val="35000"/>
-                  </a:schemeClr>
-                </a:solidFill>
-                <a:latin typeface="+mn-lt"/>
-                <a:ea typeface="+mn-ea"/>
-                <a:cs typeface="+mn-cs"/>
-              </a:defRPr>
-            </a:lvl5pPr>
-            <a:lvl6pPr marL="2055813" indent="-344488" algn="l" defTabSz="914400" rtl="0" eaLnBrk="1" latinLnBrk="0" hangingPunct="1">
-              <a:spcBef>
-                <a:spcPct val="20000"/>
-              </a:spcBef>
-              <a:buClr>
-                <a:schemeClr val="accent1">
-                  <a:lumMod val="60000"/>
-                  <a:lumOff val="40000"/>
-                </a:schemeClr>
-              </a:buClr>
-              <a:buSzPct val="90000"/>
-              <a:buFont typeface="Wingdings" pitchFamily="2" charset="2"/>
-              <a:buChar char=""/>
-              <a:defRPr lang="en-US" sz="1800" kern="1200" dirty="0" smtClean="0">
-                <a:solidFill>
-                  <a:schemeClr val="tx1">
-                    <a:lumMod val="65000"/>
-                    <a:lumOff val="35000"/>
-                  </a:schemeClr>
-                </a:solidFill>
-                <a:latin typeface="+mn-lt"/>
-                <a:ea typeface="+mn-ea"/>
-                <a:cs typeface="+mn-cs"/>
-              </a:defRPr>
-            </a:lvl6pPr>
-            <a:lvl7pPr marL="2398713" indent="-344488" algn="l" defTabSz="914400" rtl="0" eaLnBrk="1" latinLnBrk="0" hangingPunct="1">
-              <a:spcBef>
-                <a:spcPct val="20000"/>
-              </a:spcBef>
-              <a:buClr>
-                <a:schemeClr val="accent1"/>
-              </a:buClr>
-              <a:buSzPct val="90000"/>
-              <a:buFont typeface="Wingdings" pitchFamily="2" charset="2"/>
-              <a:buChar char=""/>
-              <a:defRPr lang="en-US" sz="1800" kern="1200" dirty="0" smtClean="0">
-                <a:solidFill>
-                  <a:schemeClr val="tx1">
-                    <a:lumMod val="65000"/>
-                    <a:lumOff val="35000"/>
-                  </a:schemeClr>
-                </a:solidFill>
-                <a:latin typeface="+mn-lt"/>
-                <a:ea typeface="+mn-ea"/>
-                <a:cs typeface="+mn-cs"/>
-              </a:defRPr>
-            </a:lvl7pPr>
-            <a:lvl8pPr marL="2743200" indent="-344488" algn="l" defTabSz="914400" rtl="0" eaLnBrk="1" latinLnBrk="0" hangingPunct="1">
-              <a:spcBef>
-                <a:spcPct val="20000"/>
-              </a:spcBef>
-              <a:buClr>
-                <a:schemeClr val="accent1">
-                  <a:lumMod val="60000"/>
-                  <a:lumOff val="40000"/>
-                </a:schemeClr>
-              </a:buClr>
-              <a:buSzPct val="90000"/>
-              <a:buFont typeface="Wingdings" pitchFamily="2" charset="2"/>
-              <a:buChar char=""/>
-              <a:defRPr lang="en-US" sz="1800" kern="1200" dirty="0" smtClean="0">
-                <a:solidFill>
-                  <a:schemeClr val="tx1">
-                    <a:lumMod val="65000"/>
-                    <a:lumOff val="35000"/>
-                  </a:schemeClr>
-                </a:solidFill>
-                <a:latin typeface="+mn-lt"/>
-                <a:ea typeface="+mn-ea"/>
-                <a:cs typeface="+mn-cs"/>
-              </a:defRPr>
-            </a:lvl8pPr>
-            <a:lvl9pPr marL="3087688" indent="-344488" algn="l" defTabSz="914400" rtl="0" eaLnBrk="1" latinLnBrk="0" hangingPunct="1">
-              <a:spcBef>
-                <a:spcPct val="20000"/>
-              </a:spcBef>
-              <a:buClr>
-                <a:schemeClr val="accent1"/>
-              </a:buClr>
-              <a:buSzPct val="90000"/>
-              <a:buFont typeface="Wingdings" pitchFamily="2" charset="2"/>
-              <a:buChar char=""/>
-              <a:defRPr lang="en-US" sz="1800" kern="1200" dirty="0">
-                <a:solidFill>
-                  <a:schemeClr val="tx1">
-                    <a:lumMod val="65000"/>
-                    <a:lumOff val="35000"/>
-                  </a:schemeClr>
-                </a:solidFill>
-                <a:latin typeface="+mn-lt"/>
-                <a:ea typeface="+mn-ea"/>
-                <a:cs typeface="+mn-cs"/>
-              </a:defRPr>
-            </a:lvl9pPr>
-          </a:lstStyle>
-          <a:p>
-            <a:pPr marL="0" indent="0" algn="ctr">
-              <a:buFont typeface="Wingdings" pitchFamily="2" charset="2"/>
-              <a:buNone/>
-            </a:pPr>
-            <a:endParaRPr lang="en-US" dirty="0" smtClean="0"/>
-          </a:p>
-          <a:p>
-            <a:pPr marL="0" indent="0" algn="ctr">
-              <a:buFont typeface="Wingdings" pitchFamily="2" charset="2"/>
-              <a:buNone/>
-            </a:pPr>
-            <a:r>
-              <a:rPr lang="en-US" sz="13800" dirty="0" smtClean="0"/>
-              <a:t>?</a:t>
-            </a:r>
-            <a:endParaRPr lang="en-US" sz="13800" dirty="0"/>
+              </a:rPr>
+              <a:t>)</a:t>
+            </a:r>
+          </a:p>
+        </p:txBody>
+      </p:sp>
+      <p:sp>
+        <p:nvSpPr>
+          <p:cNvPr id="6" name="TextBox 5"/>
+          <p:cNvSpPr txBox="1"/>
+          <p:nvPr/>
+        </p:nvSpPr>
+        <p:spPr>
+          <a:xfrm>
+            <a:off x="48886" y="3169412"/>
+            <a:ext cx="1408934" cy="923330"/>
+          </a:xfrm>
+          <a:prstGeom prst="rect">
+            <a:avLst/>
+          </a:prstGeom>
+          <a:noFill/>
+        </p:spPr>
+        <p:txBody>
+          <a:bodyPr wrap="none" rtlCol="0">
+            <a:spAutoFit/>
+          </a:bodyPr>
+          <a:lstStyle/>
+          <a:p>
+            <a:pPr algn="ctr"/>
+            <a:r>
+              <a:rPr lang="en-US" dirty="0" smtClean="0">
+                <a:solidFill>
+                  <a:srgbClr val="595959"/>
+                </a:solidFill>
+              </a:rPr>
+              <a:t>Percentage</a:t>
+            </a:r>
+          </a:p>
+          <a:p>
+            <a:pPr algn="ctr"/>
+            <a:r>
+              <a:rPr lang="en-US" dirty="0" smtClean="0">
+                <a:solidFill>
+                  <a:srgbClr val="595959"/>
+                </a:solidFill>
+              </a:rPr>
+              <a:t>Difference</a:t>
+            </a:r>
+          </a:p>
+          <a:p>
+            <a:pPr algn="ctr"/>
+            <a:r>
+              <a:rPr lang="en-US" dirty="0" smtClean="0">
+                <a:solidFill>
+                  <a:srgbClr val="595959"/>
+                </a:solidFill>
+              </a:rPr>
+              <a:t>By Category</a:t>
+            </a:r>
+            <a:endParaRPr lang="en-US" dirty="0">
+              <a:solidFill>
+                <a:srgbClr val="595959"/>
+              </a:solidFill>
+            </a:endParaRPr>
           </a:p>
         </p:txBody>
       </p:sp>
     </p:spTree>
     <p:extLst>
       <p:ext uri="{BB962C8B-B14F-4D97-AF65-F5344CB8AC3E}">
-        <p14:creationId xmlns:p14="http://schemas.microsoft.com/office/powerpoint/2010/main" val="4080678011"/>
+        <p14:creationId xmlns:p14="http://schemas.microsoft.com/office/powerpoint/2010/main" val="3899374554"/>
       </p:ext>
     </p:extLst>
   </p:cSld>
   <p:clrMapOvr>
     <a:masterClrMapping/>
   </p:clrMapOvr>
-  <p:timing>
-    <p:tnLst>
-      <p:par>
-        <p:cTn xmlns:p14="http://schemas.microsoft.com/office/powerpoint/2010/main" id="1" dur="indefinite" restart="never" nodeType="tmRoot"/>
-      </p:par>
-    </p:tnLst>
-  </p:timing>
 </p:sld>
 </file>
 
@@ -12191,6 +13990,60 @@
           </a:p>
         </p:txBody>
       </p:sp>
+      <p:pic>
+        <p:nvPicPr>
+          <p:cNvPr id="4" name="Picture 3"/>
+          <p:cNvPicPr>
+            <a:picLocks noChangeAspect="1"/>
+          </p:cNvPicPr>
+          <p:nvPr/>
+        </p:nvPicPr>
+        <p:blipFill>
+          <a:blip r:embed="rId2"/>
+          <a:stretch>
+            <a:fillRect/>
+          </a:stretch>
+        </p:blipFill>
+        <p:spPr>
+          <a:xfrm>
+            <a:off x="2688571" y="3892692"/>
+            <a:ext cx="3755417" cy="2816563"/>
+          </a:xfrm>
+          <a:prstGeom prst="rect">
+            <a:avLst/>
+          </a:prstGeom>
+        </p:spPr>
+      </p:pic>
+      <p:sp>
+        <p:nvSpPr>
+          <p:cNvPr id="5" name="TextBox 4"/>
+          <p:cNvSpPr txBox="1"/>
+          <p:nvPr/>
+        </p:nvSpPr>
+        <p:spPr>
+          <a:xfrm>
+            <a:off x="7157119" y="6428576"/>
+            <a:ext cx="377544" cy="253916"/>
+          </a:xfrm>
+          <a:prstGeom prst="rect">
+            <a:avLst/>
+          </a:prstGeom>
+          <a:noFill/>
+        </p:spPr>
+        <p:txBody>
+          <a:bodyPr wrap="square" rtlCol="0">
+            <a:spAutoFit/>
+          </a:bodyPr>
+          <a:lstStyle/>
+          <a:p>
+            <a:r>
+              <a:rPr lang="en-US" sz="1050" dirty="0" smtClean="0"/>
+              <a:t>[3]</a:t>
+            </a:r>
+            <a:endParaRPr lang="en-US" sz="1050" dirty="0"/>
+          </a:p>
+        </p:txBody>
+      </p:sp>
     </p:spTree>
     <p:extLst>
       <p:ext uri="{BB962C8B-B14F-4D97-AF65-F5344CB8AC3E}">
@@ -12301,24 +14154,6 @@
             </a:r>
           </a:p>
           <a:p>
-            <a:r>
-              <a:rPr lang="en-US" sz="1800" dirty="0" smtClean="0"/>
-              <a:t>Leverage experts to determine</a:t>
-            </a:r>
-            <a:br>
-              <a:rPr lang="en-US" sz="1800" dirty="0" smtClean="0"/>
-            </a:br>
-            <a:r>
-              <a:rPr lang="en-US" sz="1800" dirty="0" smtClean="0"/>
-              <a:t>weights for individual musical</a:t>
-            </a:r>
-            <a:br>
-              <a:rPr lang="en-US" sz="1800" dirty="0" smtClean="0"/>
-            </a:br>
-            <a:r>
-              <a:rPr lang="en-US" sz="1800" dirty="0" smtClean="0"/>
-              <a:t>elements on each instrument.</a:t>
-            </a:r>
             <a:endParaRPr lang="en-US" sz="1800" dirty="0"/>
           </a:p>
           <a:p>
@@ -12348,7 +14183,7 @@
         </p:blipFill>
         <p:spPr>
           <a:xfrm>
-            <a:off x="4559029" y="3999091"/>
+            <a:off x="2395891" y="4104915"/>
             <a:ext cx="4326276" cy="2753085"/>
           </a:xfrm>
           <a:prstGeom prst="rect">
@@ -12410,46 +14245,100 @@
           <a:p>
             <a:r>
               <a:rPr lang="en-US" dirty="0" smtClean="0"/>
-              <a:t>Example</a:t>
+              <a:t>Overview</a:t>
             </a:r>
             <a:endParaRPr lang="en-US" dirty="0"/>
           </a:p>
         </p:txBody>
       </p:sp>
-      <p:pic>
-        <p:nvPicPr>
-          <p:cNvPr id="6" name="Picture 5" descr="TwinkleTwinkleLittleStar.png"/>
-          <p:cNvPicPr>
-            <a:picLocks noChangeAspect="1"/>
-          </p:cNvPicPr>
-          <p:nvPr/>
-        </p:nvPicPr>
-        <p:blipFill>
-          <a:blip r:embed="rId2">
-            <a:extLst>
-              <a:ext uri="{28A0092B-C50C-407E-A947-70E740481C1C}">
-                <a14:useLocalDpi xmlns:a14="http://schemas.microsoft.com/office/drawing/2010/main" val="0"/>
-              </a:ext>
-            </a:extLst>
-          </a:blip>
-          <a:stretch>
-            <a:fillRect/>
-          </a:stretch>
-        </p:blipFill>
-        <p:spPr>
-          <a:xfrm>
-            <a:off x="837400" y="3009900"/>
-            <a:ext cx="7454900" cy="3848100"/>
-          </a:xfrm>
-          <a:prstGeom prst="rect">
-            <a:avLst/>
-          </a:prstGeom>
-        </p:spPr>
-      </p:pic>
+      <p:sp>
+        <p:nvSpPr>
+          <p:cNvPr id="3" name="Content Placeholder 2"/>
+          <p:cNvSpPr>
+            <a:spLocks noGrp="1"/>
+          </p:cNvSpPr>
+          <p:nvPr>
+            <p:ph idx="1"/>
+          </p:nvPr>
+        </p:nvSpPr>
+        <p:spPr/>
+        <p:txBody>
+          <a:bodyPr>
+            <a:noAutofit/>
+          </a:bodyPr>
+          <a:lstStyle/>
+          <a:p>
+            <a:r>
+              <a:rPr lang="en-US" sz="2400" dirty="0"/>
+              <a:t>Complexity parameters</a:t>
+            </a:r>
+          </a:p>
+          <a:p>
+            <a:pPr lvl="1"/>
+            <a:r>
+              <a:rPr lang="en-US" sz="2400" dirty="0"/>
+              <a:t>“What” (i.e., is being played)</a:t>
+            </a:r>
+          </a:p>
+          <a:p>
+            <a:pPr lvl="2"/>
+            <a:r>
+              <a:rPr lang="en-US" sz="2000" dirty="0"/>
+              <a:t>Individual notes</a:t>
+            </a:r>
+          </a:p>
+          <a:p>
+            <a:pPr lvl="2"/>
+            <a:r>
+              <a:rPr lang="en-US" sz="2000" dirty="0"/>
+              <a:t>Intervals</a:t>
+            </a:r>
+          </a:p>
+          <a:p>
+            <a:pPr lvl="1"/>
+            <a:r>
+              <a:rPr lang="en-US" sz="2400" dirty="0"/>
+              <a:t>“How” (i.e., how “what” components are played)</a:t>
+            </a:r>
+          </a:p>
+          <a:p>
+            <a:pPr lvl="2"/>
+            <a:r>
+              <a:rPr lang="en-US" sz="2000" dirty="0"/>
+              <a:t>Key signature</a:t>
+            </a:r>
+          </a:p>
+          <a:p>
+            <a:pPr lvl="2"/>
+            <a:r>
+              <a:rPr lang="en-US" sz="2000" dirty="0"/>
+              <a:t>Dynamics</a:t>
+            </a:r>
+          </a:p>
+          <a:p>
+            <a:pPr lvl="2"/>
+            <a:r>
+              <a:rPr lang="en-US" sz="2000" dirty="0" smtClean="0"/>
+              <a:t>Tempo/Duration</a:t>
+            </a:r>
+            <a:endParaRPr lang="en-US" sz="2000" dirty="0"/>
+          </a:p>
+          <a:p>
+            <a:pPr lvl="2"/>
+            <a:r>
+              <a:rPr lang="en-US" sz="2000" dirty="0"/>
+              <a:t>Articulation: Slurred/Separated (i.e., legato/staccato)</a:t>
+            </a:r>
+          </a:p>
+          <a:p>
+            <a:endParaRPr lang="en-US" sz="2400" dirty="0"/>
+          </a:p>
+        </p:txBody>
+      </p:sp>
     </p:spTree>
     <p:extLst>
       <p:ext uri="{BB962C8B-B14F-4D97-AF65-F5344CB8AC3E}">
-        <p14:creationId xmlns:p14="http://schemas.microsoft.com/office/powerpoint/2010/main" val="1083142572"/>
+        <p14:creationId xmlns:p14="http://schemas.microsoft.com/office/powerpoint/2010/main" val="3707948917"/>
       </p:ext>
     </p:extLst>
   </p:cSld>
@@ -12493,211 +14382,82 @@
           <a:p>
             <a:r>
               <a:rPr lang="en-US" dirty="0" smtClean="0"/>
-              <a:t>Example</a:t>
+              <a:t>Overview</a:t>
             </a:r>
             <a:endParaRPr lang="en-US" dirty="0"/>
           </a:p>
         </p:txBody>
       </p:sp>
-      <p:pic>
-        <p:nvPicPr>
-          <p:cNvPr id="6" name="Picture 5" descr="TwinkleTwinkleLittleStar.png"/>
-          <p:cNvPicPr>
-            <a:picLocks noChangeAspect="1"/>
-          </p:cNvPicPr>
-          <p:nvPr/>
-        </p:nvPicPr>
-        <p:blipFill>
-          <a:blip r:embed="rId2">
-            <a:extLst>
-              <a:ext uri="{28A0092B-C50C-407E-A947-70E740481C1C}">
-                <a14:useLocalDpi xmlns:a14="http://schemas.microsoft.com/office/drawing/2010/main" val="0"/>
-              </a:ext>
-            </a:extLst>
-          </a:blip>
-          <a:stretch>
-            <a:fillRect/>
-          </a:stretch>
-        </p:blipFill>
-        <p:spPr>
-          <a:xfrm>
-            <a:off x="837400" y="3009900"/>
-            <a:ext cx="7454900" cy="3848100"/>
-          </a:xfrm>
-          <a:prstGeom prst="rect">
-            <a:avLst/>
-          </a:prstGeom>
-        </p:spPr>
-      </p:pic>
-      <p:sp>
-        <p:nvSpPr>
-          <p:cNvPr id="7" name="TextBox 6"/>
-          <p:cNvSpPr txBox="1"/>
-          <p:nvPr/>
-        </p:nvSpPr>
-        <p:spPr>
-          <a:xfrm>
-            <a:off x="837400" y="2527069"/>
-            <a:ext cx="761634" cy="369332"/>
-          </a:xfrm>
-          <a:prstGeom prst="rect">
-            <a:avLst/>
-          </a:prstGeom>
-          <a:noFill/>
-        </p:spPr>
-        <p:txBody>
-          <a:bodyPr wrap="none" rtlCol="0">
-            <a:spAutoFit/>
+      <p:sp>
+        <p:nvSpPr>
+          <p:cNvPr id="3" name="Content Placeholder 2"/>
+          <p:cNvSpPr>
+            <a:spLocks noGrp="1"/>
+          </p:cNvSpPr>
+          <p:nvPr>
+            <p:ph idx="1"/>
+          </p:nvPr>
+        </p:nvSpPr>
+        <p:spPr/>
+        <p:txBody>
+          <a:bodyPr>
+            <a:normAutofit/>
           </a:bodyPr>
           <a:lstStyle/>
           <a:p>
             <a:r>
-              <a:rPr lang="en-US" dirty="0" smtClean="0">
-                <a:solidFill>
-                  <a:schemeClr val="tx1">
-                    <a:lumMod val="65000"/>
-                    <a:lumOff val="35000"/>
-                  </a:schemeClr>
-                </a:solidFill>
-              </a:rPr>
-              <a:t>Notes</a:t>
-            </a:r>
-            <a:endParaRPr lang="en-US" dirty="0">
-              <a:solidFill>
-                <a:schemeClr val="tx1">
-                  <a:lumMod val="65000"/>
-                  <a:lumOff val="35000"/>
-                </a:schemeClr>
-              </a:solidFill>
-            </a:endParaRPr>
-          </a:p>
-        </p:txBody>
-      </p:sp>
-      <p:sp>
-        <p:nvSpPr>
-          <p:cNvPr id="8" name="TextBox 7"/>
-          <p:cNvSpPr txBox="1"/>
-          <p:nvPr/>
-        </p:nvSpPr>
-        <p:spPr>
-          <a:xfrm>
-            <a:off x="1599034" y="4127341"/>
-            <a:ext cx="6263253" cy="2123658"/>
-          </a:xfrm>
-          <a:prstGeom prst="rect">
-            <a:avLst/>
-          </a:prstGeom>
-          <a:noFill/>
-        </p:spPr>
-        <p:txBody>
-          <a:bodyPr wrap="none" rtlCol="0">
-            <a:spAutoFit/>
-          </a:bodyPr>
-          <a:lstStyle/>
-          <a:p>
-            <a:r>
-              <a:rPr lang="en-US" dirty="0" smtClean="0"/>
-              <a:t>            </a:t>
-            </a:r>
-            <a:r>
-              <a:rPr lang="en-US" sz="1600" dirty="0" smtClean="0">
-                <a:solidFill>
-                  <a:srgbClr val="FF0000"/>
-                </a:solidFill>
-              </a:rPr>
-              <a:t>C4  C4  G4  G4   A4  A4  G4      F4  F4  E4  E4     D4  D4  C4</a:t>
-            </a:r>
-          </a:p>
-          <a:p>
-            <a:endParaRPr lang="en-US" dirty="0">
-              <a:solidFill>
-                <a:srgbClr val="FF0000"/>
-              </a:solidFill>
-            </a:endParaRPr>
-          </a:p>
-          <a:p>
-            <a:endParaRPr lang="en-US" dirty="0" smtClean="0">
-              <a:solidFill>
-                <a:srgbClr val="FF0000"/>
-              </a:solidFill>
-            </a:endParaRPr>
-          </a:p>
-          <a:p>
-            <a:r>
-              <a:rPr lang="en-US" dirty="0" smtClean="0">
-                <a:solidFill>
-                  <a:srgbClr val="FF0000"/>
-                </a:solidFill>
-              </a:rPr>
-              <a:t>   </a:t>
-            </a:r>
-            <a:r>
-              <a:rPr lang="en-US" sz="1600" dirty="0" smtClean="0">
-                <a:solidFill>
-                  <a:srgbClr val="FF0000"/>
-                </a:solidFill>
-              </a:rPr>
-              <a:t>G4  G4  F4  F4      E4  E4  D4          G4  G4  F4  F4     E4  E4   D4</a:t>
-            </a:r>
-          </a:p>
-          <a:p>
-            <a:endParaRPr lang="en-US" sz="1600" dirty="0">
-              <a:solidFill>
-                <a:srgbClr val="FF0000"/>
-              </a:solidFill>
-            </a:endParaRPr>
-          </a:p>
-          <a:p>
-            <a:endParaRPr lang="en-US" sz="1200" dirty="0" smtClean="0">
-              <a:solidFill>
-                <a:srgbClr val="FF0000"/>
-              </a:solidFill>
-            </a:endParaRPr>
-          </a:p>
-          <a:p>
-            <a:r>
-              <a:rPr lang="en-US" sz="1200" dirty="0" smtClean="0">
-                <a:solidFill>
-                  <a:srgbClr val="FF0000"/>
-                </a:solidFill>
-              </a:rPr>
-              <a:t>  </a:t>
-            </a:r>
-            <a:endParaRPr lang="en-US" sz="1000" dirty="0" smtClean="0">
-              <a:solidFill>
-                <a:srgbClr val="FF0000"/>
-              </a:solidFill>
-            </a:endParaRPr>
-          </a:p>
-          <a:p>
-            <a:r>
-              <a:rPr lang="en-US" sz="1600" dirty="0">
-                <a:solidFill>
-                  <a:srgbClr val="FF0000"/>
-                </a:solidFill>
-              </a:rPr>
-              <a:t> </a:t>
-            </a:r>
-            <a:r>
-              <a:rPr lang="en-US" sz="1600" dirty="0" smtClean="0">
-                <a:solidFill>
-                  <a:srgbClr val="FF0000"/>
-                </a:solidFill>
-              </a:rPr>
-              <a:t>   C4  C4  G4  G4     A4  A4  G4        F4   F4   E4  E4     D4  D4  C4</a:t>
-            </a:r>
-            <a:endParaRPr lang="en-US" sz="1600" dirty="0">
-              <a:solidFill>
-                <a:srgbClr val="FF0000"/>
-              </a:solidFill>
-            </a:endParaRPr>
+              <a:rPr lang="en-US" sz="2400" dirty="0" smtClean="0"/>
+              <a:t>Rank </a:t>
+            </a:r>
+            <a:r>
+              <a:rPr lang="en-US" sz="2400" dirty="0"/>
+              <a:t>each of the predefined complexity </a:t>
+            </a:r>
+            <a:r>
+              <a:rPr lang="en-US" sz="2400" dirty="0" smtClean="0"/>
+              <a:t>parameters.</a:t>
+            </a:r>
+            <a:endParaRPr lang="en-US" sz="2400" dirty="0"/>
+          </a:p>
+          <a:p>
+            <a:r>
+              <a:rPr lang="en-US" sz="2400" dirty="0"/>
+              <a:t>Use default values for unranked </a:t>
+            </a:r>
+            <a:r>
+              <a:rPr lang="en-US" sz="2400" dirty="0" smtClean="0"/>
+              <a:t>parameters.</a:t>
+            </a:r>
+            <a:endParaRPr lang="en-US" sz="2400" dirty="0"/>
+          </a:p>
+          <a:p>
+            <a:r>
+              <a:rPr lang="en-US" sz="2400" dirty="0"/>
+              <a:t>The “what” components get specific </a:t>
+            </a:r>
+            <a:r>
+              <a:rPr lang="en-US" sz="2400" dirty="0" smtClean="0"/>
+              <a:t>values.</a:t>
+            </a:r>
+            <a:endParaRPr lang="en-US" sz="2400" dirty="0"/>
+          </a:p>
+          <a:p>
+            <a:r>
+              <a:rPr lang="en-US" sz="2400" dirty="0"/>
+              <a:t>The “how” parameters become multipliers for “what” </a:t>
+            </a:r>
+            <a:r>
+              <a:rPr lang="en-US" sz="2400" dirty="0" smtClean="0"/>
+              <a:t>components.</a:t>
+            </a:r>
+            <a:endParaRPr lang="en-US" sz="2400" dirty="0"/>
           </a:p>
         </p:txBody>
       </p:sp>
     </p:spTree>
     <p:extLst>
       <p:ext uri="{BB962C8B-B14F-4D97-AF65-F5344CB8AC3E}">
-        <p14:creationId xmlns:p14="http://schemas.microsoft.com/office/powerpoint/2010/main" val="653559424"/>
+        <p14:creationId xmlns:p14="http://schemas.microsoft.com/office/powerpoint/2010/main" val="1293174087"/>
       </p:ext>
     </p:extLst>
   </p:cSld>

</xml_diff>

<commit_message>
Updating slides with related work section at the end and more in depth proof of concept slides to cover the implementation.
Related to xwsxethan/MusicScoring#103
</commit_message>
<xml_diff>
--- a/Documents/Thesis/ThesisDissertation.pptx
+++ b/Documents/Thesis/ThesisDissertation.pptx
@@ -5,7 +5,7 @@
     <p:sldMasterId id="2147484115" r:id="rId1"/>
   </p:sldMasterIdLst>
   <p:notesMasterIdLst>
-    <p:notesMasterId r:id="rId41"/>
+    <p:notesMasterId r:id="rId48"/>
   </p:notesMasterIdLst>
   <p:sldIdLst>
     <p:sldId id="256" r:id="rId2"/>
@@ -33,20 +33,27 @@
     <p:sldId id="289" r:id="rId24"/>
     <p:sldId id="288" r:id="rId25"/>
     <p:sldId id="271" r:id="rId26"/>
-    <p:sldId id="291" r:id="rId27"/>
-    <p:sldId id="292" r:id="rId28"/>
-    <p:sldId id="293" r:id="rId29"/>
-    <p:sldId id="294" r:id="rId30"/>
-    <p:sldId id="298" r:id="rId31"/>
-    <p:sldId id="299" r:id="rId32"/>
-    <p:sldId id="300" r:id="rId33"/>
-    <p:sldId id="266" r:id="rId34"/>
-    <p:sldId id="270" r:id="rId35"/>
-    <p:sldId id="268" r:id="rId36"/>
-    <p:sldId id="273" r:id="rId37"/>
-    <p:sldId id="258" r:id="rId38"/>
-    <p:sldId id="301" r:id="rId39"/>
-    <p:sldId id="303" r:id="rId40"/>
+    <p:sldId id="307" r:id="rId27"/>
+    <p:sldId id="308" r:id="rId28"/>
+    <p:sldId id="309" r:id="rId29"/>
+    <p:sldId id="310" r:id="rId30"/>
+    <p:sldId id="291" r:id="rId31"/>
+    <p:sldId id="292" r:id="rId32"/>
+    <p:sldId id="293" r:id="rId33"/>
+    <p:sldId id="294" r:id="rId34"/>
+    <p:sldId id="298" r:id="rId35"/>
+    <p:sldId id="299" r:id="rId36"/>
+    <p:sldId id="300" r:id="rId37"/>
+    <p:sldId id="266" r:id="rId38"/>
+    <p:sldId id="270" r:id="rId39"/>
+    <p:sldId id="268" r:id="rId40"/>
+    <p:sldId id="273" r:id="rId41"/>
+    <p:sldId id="258" r:id="rId42"/>
+    <p:sldId id="301" r:id="rId43"/>
+    <p:sldId id="304" r:id="rId44"/>
+    <p:sldId id="305" r:id="rId45"/>
+    <p:sldId id="306" r:id="rId46"/>
+    <p:sldId id="303" r:id="rId47"/>
   </p:sldIdLst>
   <p:sldSz cx="9144000" cy="6858000" type="screen4x3"/>
   <p:notesSz cx="6858000" cy="9144000"/>
@@ -147,7 +154,7 @@
   </p:defaultTextStyle>
   <p:extLst>
     <p:ext uri="{EFAFB233-063F-42B5-8137-9DF3F51BA10A}">
-      <p15:sldGuideLst xmlns:p15="http://schemas.microsoft.com/office/powerpoint/2012/main" xmlns="">
+      <p15:sldGuideLst xmlns="" xmlns:p15="http://schemas.microsoft.com/office/powerpoint/2012/main">
         <p15:guide id="1" orient="horz" pos="2160">
           <p15:clr>
             <a:srgbClr val="A4A3A4"/>
@@ -246,7 +253,7 @@
           <a:p>
             <a:fld id="{82735310-D129-BD41-ADEC-F3DCA2ABEF1F}" type="datetimeFigureOut">
               <a:rPr lang="en-US" smtClean="0"/>
-              <a:t>4/16/15</a:t>
+              <a:t>4/20/15</a:t>
             </a:fld>
             <a:endParaRPr lang="en-US"/>
           </a:p>
@@ -1380,7 +1387,7 @@
           <a:p>
             <a:fld id="{B66F6299-F0EF-6645-AA6C-74C7849A8B5F}" type="datetimeFigureOut">
               <a:rPr lang="en-US" smtClean="0"/>
-              <a:t>4/16/15</a:t>
+              <a:t>4/20/15</a:t>
             </a:fld>
             <a:endParaRPr lang="en-US"/>
           </a:p>
@@ -1478,7 +1485,7 @@
   </p:clrMapOvr>
   <p:extLst>
     <p:ext uri="{DCECCB84-F9BA-43D5-87BE-67443E8EF086}">
-      <p15:sldGuideLst xmlns:p15="http://schemas.microsoft.com/office/powerpoint/2012/main" xmlns=""/>
+      <p15:sldGuideLst xmlns="" xmlns:p15="http://schemas.microsoft.com/office/powerpoint/2012/main"/>
     </p:ext>
   </p:extLst>
 </p:sldLayout>
@@ -1593,7 +1600,7 @@
           <a:p>
             <a:fld id="{B66F6299-F0EF-6645-AA6C-74C7849A8B5F}" type="datetimeFigureOut">
               <a:rPr lang="en-US" smtClean="0"/>
-              <a:t>4/16/15</a:t>
+              <a:t>4/20/15</a:t>
             </a:fld>
             <a:endParaRPr lang="en-US"/>
           </a:p>
@@ -1849,7 +1856,7 @@
           <a:p>
             <a:fld id="{B66F6299-F0EF-6645-AA6C-74C7849A8B5F}" type="datetimeFigureOut">
               <a:rPr lang="en-US" smtClean="0"/>
-              <a:t>4/16/15</a:t>
+              <a:t>4/20/15</a:t>
             </a:fld>
             <a:endParaRPr lang="en-US"/>
           </a:p>
@@ -1909,7 +1916,7 @@
   </p:clrMapOvr>
   <p:extLst>
     <p:ext uri="{DCECCB84-F9BA-43D5-87BE-67443E8EF086}">
-      <p15:sldGuideLst xmlns:p15="http://schemas.microsoft.com/office/powerpoint/2012/main" xmlns=""/>
+      <p15:sldGuideLst xmlns="" xmlns:p15="http://schemas.microsoft.com/office/powerpoint/2012/main"/>
     </p:ext>
   </p:extLst>
 </p:sldLayout>
@@ -2024,7 +2031,7 @@
           <a:p>
             <a:fld id="{B66F6299-F0EF-6645-AA6C-74C7849A8B5F}" type="datetimeFigureOut">
               <a:rPr lang="en-US" smtClean="0"/>
-              <a:t>4/16/15</a:t>
+              <a:t>4/20/15</a:t>
             </a:fld>
             <a:endParaRPr lang="en-US"/>
           </a:p>
@@ -2367,7 +2374,7 @@
           <a:p>
             <a:fld id="{B66F6299-F0EF-6645-AA6C-74C7849A8B5F}" type="datetimeFigureOut">
               <a:rPr lang="en-US" smtClean="0"/>
-              <a:t>4/16/15</a:t>
+              <a:t>4/20/15</a:t>
             </a:fld>
             <a:endParaRPr lang="en-US"/>
           </a:p>
@@ -2465,7 +2472,7 @@
   </p:clrMapOvr>
   <p:extLst>
     <p:ext uri="{DCECCB84-F9BA-43D5-87BE-67443E8EF086}">
-      <p15:sldGuideLst xmlns:p15="http://schemas.microsoft.com/office/powerpoint/2012/main" xmlns=""/>
+      <p15:sldGuideLst xmlns="" xmlns:p15="http://schemas.microsoft.com/office/powerpoint/2012/main"/>
     </p:ext>
   </p:extLst>
 </p:sldLayout>
@@ -2647,7 +2654,7 @@
           <a:p>
             <a:fld id="{B66F6299-F0EF-6645-AA6C-74C7849A8B5F}" type="datetimeFigureOut">
               <a:rPr lang="en-US" smtClean="0"/>
-              <a:t>4/16/15</a:t>
+              <a:t>4/20/15</a:t>
             </a:fld>
             <a:endParaRPr lang="en-US"/>
           </a:p>
@@ -3026,7 +3033,7 @@
           <a:p>
             <a:fld id="{B66F6299-F0EF-6645-AA6C-74C7849A8B5F}" type="datetimeFigureOut">
               <a:rPr lang="en-US" smtClean="0"/>
-              <a:t>4/16/15</a:t>
+              <a:t>4/20/15</a:t>
             </a:fld>
             <a:endParaRPr lang="en-US"/>
           </a:p>
@@ -3144,7 +3151,7 @@
           <a:p>
             <a:fld id="{B66F6299-F0EF-6645-AA6C-74C7849A8B5F}" type="datetimeFigureOut">
               <a:rPr lang="en-US" smtClean="0"/>
-              <a:t>4/16/15</a:t>
+              <a:t>4/20/15</a:t>
             </a:fld>
             <a:endParaRPr lang="en-US"/>
           </a:p>
@@ -3315,7 +3322,7 @@
           <a:p>
             <a:fld id="{B66F6299-F0EF-6645-AA6C-74C7849A8B5F}" type="datetimeFigureOut">
               <a:rPr lang="en-US" smtClean="0"/>
-              <a:t>4/16/15</a:t>
+              <a:t>4/20/15</a:t>
             </a:fld>
             <a:endParaRPr lang="en-US"/>
           </a:p>
@@ -3669,7 +3676,7 @@
           <a:p>
             <a:fld id="{B66F6299-F0EF-6645-AA6C-74C7849A8B5F}" type="datetimeFigureOut">
               <a:rPr lang="en-US" smtClean="0"/>
-              <a:t>4/16/15</a:t>
+              <a:t>4/20/15</a:t>
             </a:fld>
             <a:endParaRPr lang="en-US"/>
           </a:p>
@@ -4051,7 +4058,7 @@
           <a:p>
             <a:fld id="{B66F6299-F0EF-6645-AA6C-74C7849A8B5F}" type="datetimeFigureOut">
               <a:rPr lang="en-US" smtClean="0"/>
-              <a:t>4/16/15</a:t>
+              <a:t>4/20/15</a:t>
             </a:fld>
             <a:endParaRPr lang="en-US"/>
           </a:p>
@@ -4338,7 +4345,7 @@
           <a:p>
             <a:fld id="{B66F6299-F0EF-6645-AA6C-74C7849A8B5F}" type="datetimeFigureOut">
               <a:rPr lang="en-US" smtClean="0"/>
-              <a:t>4/16/15</a:t>
+              <a:t>4/20/15</a:t>
             </a:fld>
             <a:endParaRPr lang="en-US"/>
           </a:p>
@@ -4844,7 +4851,7 @@
   </p:txStyles>
   <p:extLst>
     <p:ext uri="{27BBF7A9-308A-43DC-89C8-2F10F3537804}">
-      <p15:sldGuideLst xmlns:p15="http://schemas.microsoft.com/office/powerpoint/2012/main" xmlns=""/>
+      <p15:sldGuideLst xmlns="" xmlns:p15="http://schemas.microsoft.com/office/powerpoint/2012/main"/>
     </p:ext>
   </p:extLst>
 </p:sldMaster>
@@ -5457,39 +5464,7 @@
                   <a:srgbClr val="FF0000"/>
                 </a:solidFill>
               </a:rPr>
-              <a:t>C4  C4  G4  G4   </a:t>
-            </a:r>
-            <a:r>
-              <a:rPr lang="en-US" dirty="0" smtClean="0">
-                <a:solidFill>
-                  <a:srgbClr val="FF0000"/>
-                </a:solidFill>
-              </a:rPr>
-              <a:t> A4  </a:t>
-            </a:r>
-            <a:r>
-              <a:rPr lang="en-US" dirty="0" smtClean="0">
-                <a:solidFill>
-                  <a:srgbClr val="FF0000"/>
-                </a:solidFill>
-              </a:rPr>
-              <a:t>A4  G4     </a:t>
-            </a:r>
-            <a:r>
-              <a:rPr lang="en-US" dirty="0" smtClean="0">
-                <a:solidFill>
-                  <a:srgbClr val="FF0000"/>
-                </a:solidFill>
-              </a:rPr>
-              <a:t>  </a:t>
-            </a:r>
-            <a:r>
-              <a:rPr lang="en-US" dirty="0" smtClean="0">
-                <a:solidFill>
-                  <a:srgbClr val="FF0000"/>
-                </a:solidFill>
-              </a:rPr>
-              <a:t>F4  F4  E4  E4     D4  D4  C4</a:t>
+              <a:t>C4  C4  G4  G4    A4  A4  G4       F4  F4  E4  E4     D4  D4  C4</a:t>
             </a:r>
           </a:p>
           <a:p>
@@ -5521,39 +5496,7 @@
                   <a:srgbClr val="FF0000"/>
                 </a:solidFill>
               </a:rPr>
-              <a:t>G4  G4  F4  F4      </a:t>
-            </a:r>
-            <a:r>
-              <a:rPr lang="en-US" dirty="0" smtClean="0">
-                <a:solidFill>
-                  <a:srgbClr val="FF0000"/>
-                </a:solidFill>
-              </a:rPr>
-              <a:t> E4  </a:t>
-            </a:r>
-            <a:r>
-              <a:rPr lang="en-US" dirty="0" smtClean="0">
-                <a:solidFill>
-                  <a:srgbClr val="FF0000"/>
-                </a:solidFill>
-              </a:rPr>
-              <a:t>E4  D4          G4  G4  F4  F4     </a:t>
-            </a:r>
-            <a:r>
-              <a:rPr lang="en-US" dirty="0" smtClean="0">
-                <a:solidFill>
-                  <a:srgbClr val="FF0000"/>
-                </a:solidFill>
-              </a:rPr>
-              <a:t>  E4  </a:t>
-            </a:r>
-            <a:r>
-              <a:rPr lang="en-US" dirty="0" smtClean="0">
-                <a:solidFill>
-                  <a:srgbClr val="FF0000"/>
-                </a:solidFill>
-              </a:rPr>
-              <a:t>E4   D4</a:t>
+              <a:t>G4  G4  F4  F4       E4  E4  D4          G4  G4  F4  F4       E4  E4   D4</a:t>
             </a:r>
           </a:p>
           <a:p>
@@ -5600,55 +5543,7 @@
                   <a:srgbClr val="FF0000"/>
                 </a:solidFill>
               </a:rPr>
-              <a:t>   C4  C4  G4  G4   </a:t>
-            </a:r>
-            <a:r>
-              <a:rPr lang="en-US" dirty="0" smtClean="0">
-                <a:solidFill>
-                  <a:srgbClr val="FF0000"/>
-                </a:solidFill>
-              </a:rPr>
-              <a:t>   </a:t>
-            </a:r>
-            <a:r>
-              <a:rPr lang="en-US" dirty="0" smtClean="0">
-                <a:solidFill>
-                  <a:srgbClr val="FF0000"/>
-                </a:solidFill>
-              </a:rPr>
-              <a:t>A4  A4  G4      </a:t>
-            </a:r>
-            <a:r>
-              <a:rPr lang="en-US" dirty="0" smtClean="0">
-                <a:solidFill>
-                  <a:srgbClr val="FF0000"/>
-                </a:solidFill>
-              </a:rPr>
-              <a:t>   </a:t>
-            </a:r>
-            <a:r>
-              <a:rPr lang="en-US" dirty="0" smtClean="0">
-                <a:solidFill>
-                  <a:srgbClr val="FF0000"/>
-                </a:solidFill>
-              </a:rPr>
-              <a:t>F4   F4   E4  E4     </a:t>
-            </a:r>
-            <a:r>
-              <a:rPr lang="en-US" dirty="0" smtClean="0">
-                <a:solidFill>
-                  <a:srgbClr val="FF0000"/>
-                </a:solidFill>
-              </a:rPr>
-              <a:t> D4  </a:t>
-            </a:r>
-            <a:r>
-              <a:rPr lang="en-US" dirty="0" smtClean="0">
-                <a:solidFill>
-                  <a:srgbClr val="FF0000"/>
-                </a:solidFill>
-              </a:rPr>
-              <a:t>D4  C4</a:t>
+              <a:t>   C4  C4  G4  G4      A4  A4  G4         F4   F4   E4  E4      D4  D4  C4</a:t>
             </a:r>
             <a:endParaRPr lang="en-US" dirty="0">
               <a:solidFill>
@@ -5853,23 +5748,7 @@
                   <a:srgbClr val="FF0000"/>
                 </a:solidFill>
               </a:rPr>
-              <a:t>1      1     1     1       1     1      1           1      1     1     1     </a:t>
-            </a:r>
-            <a:r>
-              <a:rPr lang="en-US" dirty="0" smtClean="0">
-                <a:solidFill>
-                  <a:srgbClr val="FF0000"/>
-                </a:solidFill>
-              </a:rPr>
-              <a:t> </a:t>
-            </a:r>
-            <a:r>
-              <a:rPr lang="en-US" dirty="0" smtClean="0">
-                <a:solidFill>
-                  <a:srgbClr val="FF0000"/>
-                </a:solidFill>
-              </a:rPr>
-              <a:t>1      1     1</a:t>
+              <a:t>1      1     1     1       1     1      1           1      1     1     1      1      1     1</a:t>
             </a:r>
           </a:p>
           <a:p>
@@ -6121,23 +6000,7 @@
                   <a:srgbClr val="FF0000"/>
                 </a:solidFill>
               </a:rPr>
-              <a:t>1      1     1     1       1     1      1           1      1     1     1     </a:t>
-            </a:r>
-            <a:r>
-              <a:rPr lang="en-US" dirty="0" smtClean="0">
-                <a:solidFill>
-                  <a:srgbClr val="FF0000"/>
-                </a:solidFill>
-              </a:rPr>
-              <a:t> </a:t>
-            </a:r>
-            <a:r>
-              <a:rPr lang="en-US" dirty="0" smtClean="0">
-                <a:solidFill>
-                  <a:srgbClr val="FF0000"/>
-                </a:solidFill>
-              </a:rPr>
-              <a:t>1      1     1</a:t>
+              <a:t>1      1     1     1       1     1      1           1      1     1     1      1      1     1</a:t>
             </a:r>
           </a:p>
           <a:p>
@@ -6369,23 +6232,7 @@
                   <a:srgbClr val="FF0000"/>
                 </a:solidFill>
               </a:rPr>
-              <a:t>   1.5  </a:t>
-            </a:r>
-            <a:r>
-              <a:rPr lang="en-US" dirty="0" smtClean="0">
-                <a:solidFill>
-                  <a:srgbClr val="FF0000"/>
-                </a:solidFill>
-              </a:rPr>
-              <a:t> </a:t>
-            </a:r>
-            <a:r>
-              <a:rPr lang="en-US" dirty="0" smtClean="0">
-                <a:solidFill>
-                  <a:srgbClr val="FF0000"/>
-                </a:solidFill>
-              </a:rPr>
-              <a:t>1.5  1.5  1.5  1.5   1.5  1.5  1.5 </a:t>
+              <a:t>   1.5   1.5  1.5  1.5  1.5   1.5  1.5  1.5 </a:t>
             </a:r>
           </a:p>
           <a:p>
@@ -6417,23 +6264,7 @@
                   <a:srgbClr val="FF0000"/>
                 </a:solidFill>
               </a:rPr>
-              <a:t>1.5  1.5  1.5   1.5   1.5  1.5   1.5    </a:t>
-            </a:r>
-            <a:r>
-              <a:rPr lang="en-US" dirty="0" smtClean="0">
-                <a:solidFill>
-                  <a:srgbClr val="FF0000"/>
-                </a:solidFill>
-              </a:rPr>
-              <a:t>1.5   </a:t>
-            </a:r>
-            <a:r>
-              <a:rPr lang="en-US" dirty="0" smtClean="0">
-                <a:solidFill>
-                  <a:srgbClr val="FF0000"/>
-                </a:solidFill>
-              </a:rPr>
-              <a:t>1.5  1.5   1.5   1.5  1.5  1.5</a:t>
+              <a:t>1.5  1.5  1.5   1.5   1.5  1.5   1.5    1.5   1.5  1.5   1.5   1.5  1.5  1.5</a:t>
             </a:r>
           </a:p>
           <a:p>
@@ -6512,15 +6343,7 @@
                   <a:srgbClr val="FF0000"/>
                 </a:solidFill>
               </a:rPr>
-              <a:t> 1.5     </a:t>
-            </a:r>
-            <a:r>
-              <a:rPr lang="en-US" dirty="0" smtClean="0">
-                <a:solidFill>
-                  <a:srgbClr val="FF0000"/>
-                </a:solidFill>
-              </a:rPr>
-              <a:t>1.5  </a:t>
+              <a:t> 1.5     1.5  </a:t>
             </a:r>
             <a:r>
               <a:rPr lang="en-US" dirty="0">
@@ -6873,23 +6696,7 @@
                   <a:srgbClr val="FF0000"/>
                 </a:solidFill>
               </a:rPr>
-              <a:t>   1.5  </a:t>
-            </a:r>
-            <a:r>
-              <a:rPr lang="en-US" dirty="0" smtClean="0">
-                <a:solidFill>
-                  <a:srgbClr val="FF0000"/>
-                </a:solidFill>
-              </a:rPr>
-              <a:t> </a:t>
-            </a:r>
-            <a:r>
-              <a:rPr lang="en-US" dirty="0" smtClean="0">
-                <a:solidFill>
-                  <a:srgbClr val="FF0000"/>
-                </a:solidFill>
-              </a:rPr>
-              <a:t>1.5  1.5  1.5  1.5   1.5  1.5  1.5 </a:t>
+              <a:t>   1.5   1.5  1.5  1.5  1.5   1.5  1.5  1.5 </a:t>
             </a:r>
           </a:p>
           <a:p>
@@ -6921,23 +6728,7 @@
                   <a:srgbClr val="FF0000"/>
                 </a:solidFill>
               </a:rPr>
-              <a:t>1.5  1.5  1.5   1.5   1.5  1.5   1.5    </a:t>
-            </a:r>
-            <a:r>
-              <a:rPr lang="en-US" dirty="0" smtClean="0">
-                <a:solidFill>
-                  <a:srgbClr val="FF0000"/>
-                </a:solidFill>
-              </a:rPr>
-              <a:t>1.5   </a:t>
-            </a:r>
-            <a:r>
-              <a:rPr lang="en-US" dirty="0" smtClean="0">
-                <a:solidFill>
-                  <a:srgbClr val="FF0000"/>
-                </a:solidFill>
-              </a:rPr>
-              <a:t>1.5  1.5   1.5   1.5  1.5  1.5</a:t>
+              <a:t>1.5  1.5  1.5   1.5   1.5  1.5   1.5    1.5   1.5  1.5   1.5   1.5  1.5  1.5</a:t>
             </a:r>
           </a:p>
           <a:p>
@@ -7016,15 +6807,7 @@
                   <a:srgbClr val="FF0000"/>
                 </a:solidFill>
               </a:rPr>
-              <a:t> 1.5     </a:t>
-            </a:r>
-            <a:r>
-              <a:rPr lang="en-US" dirty="0" smtClean="0">
-                <a:solidFill>
-                  <a:srgbClr val="FF0000"/>
-                </a:solidFill>
-              </a:rPr>
-              <a:t>1.5  </a:t>
+              <a:t> 1.5     1.5  </a:t>
             </a:r>
             <a:r>
               <a:rPr lang="en-US" dirty="0">
@@ -7292,23 +7075,7 @@
                   <a:srgbClr val="FF0000"/>
                 </a:solidFill>
               </a:rPr>
-              <a:t>      1     2     1       2     1      2           4      1     2     1      </a:t>
-            </a:r>
-            <a:r>
-              <a:rPr lang="en-US" dirty="0" smtClean="0">
-                <a:solidFill>
-                  <a:srgbClr val="FF0000"/>
-                </a:solidFill>
-              </a:rPr>
-              <a:t>2      </a:t>
-            </a:r>
-            <a:r>
-              <a:rPr lang="en-US" dirty="0" smtClean="0">
-                <a:solidFill>
-                  <a:srgbClr val="FF0000"/>
-                </a:solidFill>
-              </a:rPr>
-              <a:t>1     2</a:t>
+              <a:t>      1     2     1       2     1      2           4      1     2     1      2      1     2</a:t>
             </a:r>
           </a:p>
           <a:p>
@@ -7387,23 +7154,7 @@
                   <a:srgbClr val="FF0000"/>
                 </a:solidFill>
               </a:rPr>
-              <a:t>     1     2     1      </a:t>
-            </a:r>
-            <a:r>
-              <a:rPr lang="en-US" dirty="0" smtClean="0">
-                <a:solidFill>
-                  <a:srgbClr val="FF0000"/>
-                </a:solidFill>
-              </a:rPr>
-              <a:t>2     </a:t>
-            </a:r>
-            <a:r>
-              <a:rPr lang="en-US" dirty="0" smtClean="0">
-                <a:solidFill>
-                  <a:srgbClr val="FF0000"/>
-                </a:solidFill>
-              </a:rPr>
-              <a:t>1      2</a:t>
+              <a:t>     1     2     1      2     1      2</a:t>
             </a:r>
             <a:endParaRPr lang="en-US" dirty="0">
               <a:solidFill>
@@ -7596,23 +7347,7 @@
                   <a:srgbClr val="FF0000"/>
                 </a:solidFill>
               </a:rPr>
-              <a:t>    1     2    1     </a:t>
-            </a:r>
-            <a:r>
-              <a:rPr lang="en-US" dirty="0" smtClean="0">
-                <a:solidFill>
-                  <a:srgbClr val="FF0000"/>
-                </a:solidFill>
-              </a:rPr>
-              <a:t>2    </a:t>
-            </a:r>
-            <a:r>
-              <a:rPr lang="en-US" dirty="0" smtClean="0">
-                <a:solidFill>
-                  <a:srgbClr val="FF0000"/>
-                </a:solidFill>
-              </a:rPr>
-              <a:t>1     2 </a:t>
+              <a:t>    1     2    1     2    1     2 </a:t>
             </a:r>
           </a:p>
           <a:p>
@@ -7652,23 +7387,7 @@
                   <a:srgbClr val="FF0000"/>
                 </a:solidFill>
               </a:rPr>
-              <a:t>      1     2     1       2     1      2           4      1     2     1    </a:t>
-            </a:r>
-            <a:r>
-              <a:rPr lang="en-US" dirty="0" smtClean="0">
-                <a:solidFill>
-                  <a:srgbClr val="FF0000"/>
-                </a:solidFill>
-              </a:rPr>
-              <a:t> </a:t>
-            </a:r>
-            <a:r>
-              <a:rPr lang="en-US" dirty="0" smtClean="0">
-                <a:solidFill>
-                  <a:srgbClr val="FF0000"/>
-                </a:solidFill>
-              </a:rPr>
-              <a:t>2      1     2</a:t>
+              <a:t>      1     2     1       2     1      2           4      1     2     1     2      1     2</a:t>
             </a:r>
           </a:p>
           <a:p>
@@ -7731,23 +7450,7 @@
                   <a:srgbClr val="FF0000"/>
                 </a:solidFill>
               </a:rPr>
-              <a:t>     1     2     1     </a:t>
-            </a:r>
-            <a:r>
-              <a:rPr lang="en-US" dirty="0" smtClean="0">
-                <a:solidFill>
-                  <a:srgbClr val="FF0000"/>
-                </a:solidFill>
-              </a:rPr>
-              <a:t>2     </a:t>
-            </a:r>
-            <a:r>
-              <a:rPr lang="en-US" dirty="0" smtClean="0">
-                <a:solidFill>
-                  <a:srgbClr val="FF0000"/>
-                </a:solidFill>
-              </a:rPr>
-              <a:t>1      2</a:t>
+              <a:t>     1     2     1     2     1      2</a:t>
             </a:r>
             <a:endParaRPr lang="en-US" dirty="0">
               <a:solidFill>
@@ -8041,23 +7744,7 @@
                   <a:srgbClr val="FF0000"/>
                 </a:solidFill>
               </a:rPr>
-              <a:t>    1     2    1     </a:t>
-            </a:r>
-            <a:r>
-              <a:rPr lang="en-US" dirty="0" smtClean="0">
-                <a:solidFill>
-                  <a:srgbClr val="FF0000"/>
-                </a:solidFill>
-              </a:rPr>
-              <a:t>2    </a:t>
-            </a:r>
-            <a:r>
-              <a:rPr lang="en-US" dirty="0" smtClean="0">
-                <a:solidFill>
-                  <a:srgbClr val="FF0000"/>
-                </a:solidFill>
-              </a:rPr>
-              <a:t>1     2 </a:t>
+              <a:t>    1     2    1     2    1     2 </a:t>
             </a:r>
           </a:p>
           <a:p>
@@ -8097,23 +7784,7 @@
                   <a:srgbClr val="FF0000"/>
                 </a:solidFill>
               </a:rPr>
-              <a:t>      1     2     1       2     1      2           4      1     2     1    </a:t>
-            </a:r>
-            <a:r>
-              <a:rPr lang="en-US" dirty="0" smtClean="0">
-                <a:solidFill>
-                  <a:srgbClr val="FF0000"/>
-                </a:solidFill>
-              </a:rPr>
-              <a:t> </a:t>
-            </a:r>
-            <a:r>
-              <a:rPr lang="en-US" dirty="0" smtClean="0">
-                <a:solidFill>
-                  <a:srgbClr val="FF0000"/>
-                </a:solidFill>
-              </a:rPr>
-              <a:t>2      1     2</a:t>
+              <a:t>      1     2     1       2     1      2           4      1     2     1     2      1     2</a:t>
             </a:r>
           </a:p>
           <a:p>
@@ -8176,23 +7847,7 @@
                   <a:srgbClr val="FF0000"/>
                 </a:solidFill>
               </a:rPr>
-              <a:t>     1     2     1     </a:t>
-            </a:r>
-            <a:r>
-              <a:rPr lang="en-US" dirty="0" smtClean="0">
-                <a:solidFill>
-                  <a:srgbClr val="FF0000"/>
-                </a:solidFill>
-              </a:rPr>
-              <a:t>2     </a:t>
-            </a:r>
-            <a:r>
-              <a:rPr lang="en-US" dirty="0" smtClean="0">
-                <a:solidFill>
-                  <a:srgbClr val="FF0000"/>
-                </a:solidFill>
-              </a:rPr>
-              <a:t>1      2</a:t>
+              <a:t>     1     2     1     2     1      2</a:t>
             </a:r>
             <a:endParaRPr lang="en-US" dirty="0">
               <a:solidFill>
@@ -8369,39 +8024,7 @@
                   <a:srgbClr val="FF0000"/>
                 </a:solidFill>
               </a:rPr>
-              <a:t>    1.5  7.5  1.5    12  1.5  12      </a:t>
-            </a:r>
-            <a:r>
-              <a:rPr lang="en-US" dirty="0" smtClean="0">
-                <a:solidFill>
-                  <a:srgbClr val="FF0000"/>
-                </a:solidFill>
-              </a:rPr>
-              <a:t>3    </a:t>
-            </a:r>
-            <a:r>
-              <a:rPr lang="en-US" dirty="0" smtClean="0">
-                <a:solidFill>
-                  <a:srgbClr val="FF0000"/>
-                </a:solidFill>
-              </a:rPr>
-              <a:t>1.5   3   1.5    </a:t>
-            </a:r>
-            <a:r>
-              <a:rPr lang="en-US" dirty="0" smtClean="0">
-                <a:solidFill>
-                  <a:srgbClr val="FF0000"/>
-                </a:solidFill>
-              </a:rPr>
-              <a:t>3  </a:t>
-            </a:r>
-            <a:r>
-              <a:rPr lang="en-US" dirty="0" smtClean="0">
-                <a:solidFill>
-                  <a:srgbClr val="FF0000"/>
-                </a:solidFill>
-              </a:rPr>
-              <a:t>1.5    3 </a:t>
+              <a:t>    1.5  7.5  1.5    12  1.5  12      3    1.5   3   1.5    3  1.5    3 </a:t>
             </a:r>
           </a:p>
           <a:p>
@@ -8433,23 +8056,7 @@
                   <a:srgbClr val="FF0000"/>
                 </a:solidFill>
               </a:rPr>
-              <a:t>7.5   1.5   3   1.5      3    1.5    3        </a:t>
-            </a:r>
-            <a:r>
-              <a:rPr lang="en-US" dirty="0" smtClean="0">
-                <a:solidFill>
-                  <a:srgbClr val="FF0000"/>
-                </a:solidFill>
-              </a:rPr>
-              <a:t>6    </a:t>
-            </a:r>
-            <a:r>
-              <a:rPr lang="en-US" dirty="0" smtClean="0">
-                <a:solidFill>
-                  <a:srgbClr val="FF0000"/>
-                </a:solidFill>
-              </a:rPr>
-              <a:t>1.5    3    1.5     3    1.5    3</a:t>
+              <a:t>7.5   1.5   3   1.5      3    1.5    3        6    1.5    3    1.5     3    1.5    3</a:t>
             </a:r>
           </a:p>
           <a:p>
@@ -8544,15 +8151,7 @@
                   <a:srgbClr val="FF0000"/>
                 </a:solidFill>
               </a:rPr>
-              <a:t> 12       </a:t>
-            </a:r>
-            <a:r>
-              <a:rPr lang="en-US" dirty="0" smtClean="0">
-                <a:solidFill>
-                  <a:srgbClr val="FF0000"/>
-                </a:solidFill>
-              </a:rPr>
-              <a:t>3    </a:t>
+              <a:t> 12       3    </a:t>
             </a:r>
             <a:r>
               <a:rPr lang="en-US" dirty="0">
@@ -8929,39 +8528,7 @@
                   <a:srgbClr val="FF0000"/>
                 </a:solidFill>
               </a:rPr>
-              <a:t>    1.5  7.5  1.5    12  1.5  12      </a:t>
-            </a:r>
-            <a:r>
-              <a:rPr lang="en-US" dirty="0" smtClean="0">
-                <a:solidFill>
-                  <a:srgbClr val="FF0000"/>
-                </a:solidFill>
-              </a:rPr>
-              <a:t>3    </a:t>
-            </a:r>
-            <a:r>
-              <a:rPr lang="en-US" dirty="0" smtClean="0">
-                <a:solidFill>
-                  <a:srgbClr val="FF0000"/>
-                </a:solidFill>
-              </a:rPr>
-              <a:t>1.5   3   1.5    </a:t>
-            </a:r>
-            <a:r>
-              <a:rPr lang="en-US" dirty="0" smtClean="0">
-                <a:solidFill>
-                  <a:srgbClr val="FF0000"/>
-                </a:solidFill>
-              </a:rPr>
-              <a:t>3  </a:t>
-            </a:r>
-            <a:r>
-              <a:rPr lang="en-US" dirty="0" smtClean="0">
-                <a:solidFill>
-                  <a:srgbClr val="FF0000"/>
-                </a:solidFill>
-              </a:rPr>
-              <a:t>1.5    3 </a:t>
+              <a:t>    1.5  7.5  1.5    12  1.5  12      3    1.5   3   1.5    3  1.5    3 </a:t>
             </a:r>
           </a:p>
           <a:p>
@@ -8993,23 +8560,7 @@
                   <a:srgbClr val="FF0000"/>
                 </a:solidFill>
               </a:rPr>
-              <a:t>7.5   1.5   3   1.5      3    1.5    3        </a:t>
-            </a:r>
-            <a:r>
-              <a:rPr lang="en-US" dirty="0" smtClean="0">
-                <a:solidFill>
-                  <a:srgbClr val="FF0000"/>
-                </a:solidFill>
-              </a:rPr>
-              <a:t>6    </a:t>
-            </a:r>
-            <a:r>
-              <a:rPr lang="en-US" dirty="0" smtClean="0">
-                <a:solidFill>
-                  <a:srgbClr val="FF0000"/>
-                </a:solidFill>
-              </a:rPr>
-              <a:t>1.5    3    1.5     3    1.5    3</a:t>
+              <a:t>7.5   1.5   3   1.5      3    1.5    3        6    1.5    3    1.5     3    1.5    3</a:t>
             </a:r>
           </a:p>
           <a:p>
@@ -9104,15 +8655,7 @@
                   <a:srgbClr val="FF0000"/>
                 </a:solidFill>
               </a:rPr>
-              <a:t> 12       </a:t>
-            </a:r>
-            <a:r>
-              <a:rPr lang="en-US" dirty="0" smtClean="0">
-                <a:solidFill>
-                  <a:srgbClr val="FF0000"/>
-                </a:solidFill>
-              </a:rPr>
-              <a:t>3    </a:t>
+              <a:t> 12       3    </a:t>
             </a:r>
             <a:r>
               <a:rPr lang="en-US" dirty="0">
@@ -9736,27 +9279,8 @@
                   </a:schemeClr>
                 </a:solidFill>
               </a:rPr>
-              <a:t>Note </a:t>
-            </a:r>
-            <a:r>
-              <a:rPr lang="en-US" dirty="0" smtClean="0">
-                <a:solidFill>
-                  <a:schemeClr val="tx1">
-                    <a:lumMod val="65000"/>
-                    <a:lumOff val="35000"/>
-                  </a:schemeClr>
-                </a:solidFill>
-              </a:rPr>
-              <a:t>Total</a:t>
-            </a:r>
-            <a:endParaRPr lang="en-US" dirty="0" smtClean="0">
-              <a:solidFill>
-                <a:schemeClr val="tx1">
-                  <a:lumMod val="65000"/>
-                  <a:lumOff val="35000"/>
-                </a:schemeClr>
-              </a:solidFill>
-            </a:endParaRPr>
+              <a:t>Note Total</a:t>
+            </a:r>
           </a:p>
           <a:p>
             <a:endParaRPr lang="en-US" dirty="0">
@@ -9778,27 +9302,8 @@
                   </a:schemeClr>
                 </a:solidFill>
               </a:rPr>
-              <a:t>Interval </a:t>
-            </a:r>
-            <a:r>
-              <a:rPr lang="en-US" dirty="0" smtClean="0">
-                <a:solidFill>
-                  <a:schemeClr val="tx1">
-                    <a:lumMod val="65000"/>
-                    <a:lumOff val="35000"/>
-                  </a:schemeClr>
-                </a:solidFill>
-              </a:rPr>
-              <a:t>Total</a:t>
-            </a:r>
-            <a:endParaRPr lang="en-US" dirty="0" smtClean="0">
-              <a:solidFill>
-                <a:schemeClr val="tx1">
-                  <a:lumMod val="65000"/>
-                  <a:lumOff val="35000"/>
-                </a:schemeClr>
-              </a:solidFill>
-            </a:endParaRPr>
+              <a:t>Interval Total</a:t>
+            </a:r>
           </a:p>
           <a:p>
             <a:endParaRPr lang="en-US" dirty="0">
@@ -9833,14 +9338,6 @@
               </a:rPr>
               <a:t>Score</a:t>
             </a:r>
-            <a:endParaRPr lang="en-US" dirty="0" smtClean="0">
-              <a:solidFill>
-                <a:schemeClr val="tx1">
-                  <a:lumMod val="65000"/>
-                  <a:lumOff val="35000"/>
-                </a:schemeClr>
-              </a:solidFill>
-            </a:endParaRPr>
           </a:p>
           <a:p>
             <a:endParaRPr lang="en-US" dirty="0">
@@ -10016,38 +9513,8 @@
                   </a:schemeClr>
                 </a:solidFill>
               </a:rPr>
-              <a:t>= </a:t>
-            </a:r>
-            <a:r>
-              <a:rPr lang="en-US" dirty="0" smtClean="0">
-                <a:solidFill>
-                  <a:schemeClr val="tx1">
-                    <a:lumMod val="65000"/>
-                    <a:lumOff val="35000"/>
-                  </a:schemeClr>
-                </a:solidFill>
-              </a:rPr>
-              <a:t>Note Weights * All </a:t>
-            </a:r>
-            <a:r>
-              <a:rPr lang="en-US" dirty="0" smtClean="0">
-                <a:solidFill>
-                  <a:schemeClr val="tx1">
-                    <a:lumMod val="65000"/>
-                    <a:lumOff val="35000"/>
-                  </a:schemeClr>
-                </a:solidFill>
-              </a:rPr>
-              <a:t>Multipliers</a:t>
-            </a:r>
-            <a:endParaRPr lang="en-US" dirty="0" smtClean="0">
-              <a:solidFill>
-                <a:schemeClr val="tx1">
-                  <a:lumMod val="65000"/>
-                  <a:lumOff val="35000"/>
-                </a:schemeClr>
-              </a:solidFill>
-            </a:endParaRPr>
+              <a:t>= Note Weights * All Multipliers</a:t>
+            </a:r>
           </a:p>
           <a:p>
             <a:endParaRPr lang="en-US" dirty="0">
@@ -10069,38 +9536,8 @@
                   </a:schemeClr>
                 </a:solidFill>
               </a:rPr>
-              <a:t>= </a:t>
-            </a:r>
-            <a:r>
-              <a:rPr lang="en-US" dirty="0" smtClean="0">
-                <a:solidFill>
-                  <a:schemeClr val="tx1">
-                    <a:lumMod val="65000"/>
-                    <a:lumOff val="35000"/>
-                  </a:schemeClr>
-                </a:solidFill>
-              </a:rPr>
-              <a:t>Interval Weights * All </a:t>
-            </a:r>
-            <a:r>
-              <a:rPr lang="en-US" dirty="0" smtClean="0">
-                <a:solidFill>
-                  <a:schemeClr val="tx1">
-                    <a:lumMod val="65000"/>
-                    <a:lumOff val="35000"/>
-                  </a:schemeClr>
-                </a:solidFill>
-              </a:rPr>
-              <a:t>Multipliers</a:t>
-            </a:r>
-            <a:endParaRPr lang="en-US" dirty="0" smtClean="0">
-              <a:solidFill>
-                <a:schemeClr val="tx1">
-                  <a:lumMod val="65000"/>
-                  <a:lumOff val="35000"/>
-                </a:schemeClr>
-              </a:solidFill>
-            </a:endParaRPr>
+              <a:t>= Interval Weights * All Multipliers</a:t>
+            </a:r>
           </a:p>
           <a:p>
             <a:endParaRPr lang="en-US" dirty="0">
@@ -10146,14 +9583,6 @@
               </a:rPr>
               <a:t>Total</a:t>
             </a:r>
-            <a:endParaRPr lang="en-US" dirty="0" smtClean="0">
-              <a:solidFill>
-                <a:schemeClr val="tx1">
-                  <a:lumMod val="65000"/>
-                  <a:lumOff val="35000"/>
-                </a:schemeClr>
-              </a:solidFill>
-            </a:endParaRPr>
           </a:p>
           <a:p>
             <a:endParaRPr lang="en-US" dirty="0">
@@ -10228,38 +9657,8 @@
                   </a:schemeClr>
                 </a:solidFill>
               </a:rPr>
-              <a:t>= </a:t>
-            </a:r>
-            <a:r>
-              <a:rPr lang="en-US" dirty="0" smtClean="0">
-                <a:solidFill>
-                  <a:schemeClr val="tx1">
-                    <a:lumMod val="65000"/>
-                    <a:lumOff val="35000"/>
-                  </a:schemeClr>
-                </a:solidFill>
-              </a:rPr>
-              <a:t>69 * </a:t>
-            </a:r>
-            <a:r>
-              <a:rPr lang="en-US" dirty="0" smtClean="0">
-                <a:solidFill>
-                  <a:schemeClr val="tx1">
-                    <a:lumMod val="65000"/>
-                    <a:lumOff val="35000"/>
-                  </a:schemeClr>
-                </a:solidFill>
-              </a:rPr>
-              <a:t>1.75</a:t>
-            </a:r>
-            <a:endParaRPr lang="en-US" dirty="0" smtClean="0">
-              <a:solidFill>
-                <a:schemeClr val="tx1">
-                  <a:lumMod val="65000"/>
-                  <a:lumOff val="35000"/>
-                </a:schemeClr>
-              </a:solidFill>
-            </a:endParaRPr>
+              <a:t>= 69 * 1.75</a:t>
+            </a:r>
           </a:p>
           <a:p>
             <a:endParaRPr lang="en-US" dirty="0">
@@ -10281,38 +9680,8 @@
                   </a:schemeClr>
                 </a:solidFill>
               </a:rPr>
-              <a:t>= </a:t>
-            </a:r>
-            <a:r>
-              <a:rPr lang="en-US" dirty="0" smtClean="0">
-                <a:solidFill>
-                  <a:schemeClr val="tx1">
-                    <a:lumMod val="65000"/>
-                    <a:lumOff val="35000"/>
-                  </a:schemeClr>
-                </a:solidFill>
-              </a:rPr>
-              <a:t>148.5 * </a:t>
-            </a:r>
-            <a:r>
-              <a:rPr lang="en-US" dirty="0" smtClean="0">
-                <a:solidFill>
-                  <a:schemeClr val="tx1">
-                    <a:lumMod val="65000"/>
-                    <a:lumOff val="35000"/>
-                  </a:schemeClr>
-                </a:solidFill>
-              </a:rPr>
-              <a:t>1.75</a:t>
-            </a:r>
-            <a:endParaRPr lang="en-US" dirty="0" smtClean="0">
-              <a:solidFill>
-                <a:schemeClr val="tx1">
-                  <a:lumMod val="65000"/>
-                  <a:lumOff val="35000"/>
-                </a:schemeClr>
-              </a:solidFill>
-            </a:endParaRPr>
+              <a:t>= 148.5 * 1.75</a:t>
+            </a:r>
           </a:p>
           <a:p>
             <a:endParaRPr lang="en-US" dirty="0">
@@ -10334,38 +9703,8 @@
                   </a:schemeClr>
                 </a:solidFill>
               </a:rPr>
-              <a:t>= </a:t>
-            </a:r>
-            <a:r>
-              <a:rPr lang="en-US" dirty="0" smtClean="0">
-                <a:solidFill>
-                  <a:schemeClr val="tx1">
-                    <a:lumMod val="65000"/>
-                    <a:lumOff val="35000"/>
-                  </a:schemeClr>
-                </a:solidFill>
-              </a:rPr>
-              <a:t>120.75 + </a:t>
-            </a:r>
-            <a:r>
-              <a:rPr lang="en-US" dirty="0" smtClean="0">
-                <a:solidFill>
-                  <a:schemeClr val="tx1">
-                    <a:lumMod val="65000"/>
-                    <a:lumOff val="35000"/>
-                  </a:schemeClr>
-                </a:solidFill>
-              </a:rPr>
-              <a:t>259.875</a:t>
-            </a:r>
-            <a:endParaRPr lang="en-US" dirty="0" smtClean="0">
-              <a:solidFill>
-                <a:schemeClr val="tx1">
-                  <a:lumMod val="65000"/>
-                  <a:lumOff val="35000"/>
-                </a:schemeClr>
-              </a:solidFill>
-            </a:endParaRPr>
+              <a:t>= 120.75 + 259.875</a:t>
+            </a:r>
           </a:p>
           <a:p>
             <a:endParaRPr lang="en-US" dirty="0">
@@ -10440,18 +9779,7 @@
                   </a:schemeClr>
                 </a:solidFill>
               </a:rPr>
-              <a:t>= </a:t>
-            </a:r>
-            <a:r>
-              <a:rPr lang="en-US" dirty="0" smtClean="0">
-                <a:solidFill>
-                  <a:schemeClr val="tx1">
-                    <a:lumMod val="65000"/>
-                    <a:lumOff val="35000"/>
-                  </a:schemeClr>
-                </a:solidFill>
-              </a:rPr>
-              <a:t>120.75</a:t>
+              <a:t>= 120.75</a:t>
             </a:r>
           </a:p>
           <a:p>
@@ -10474,18 +9802,7 @@
                   </a:schemeClr>
                 </a:solidFill>
               </a:rPr>
-              <a:t>= </a:t>
-            </a:r>
-            <a:r>
-              <a:rPr lang="en-US" dirty="0" smtClean="0">
-                <a:solidFill>
-                  <a:schemeClr val="tx1">
-                    <a:lumMod val="65000"/>
-                    <a:lumOff val="35000"/>
-                  </a:schemeClr>
-                </a:solidFill>
-              </a:rPr>
-              <a:t>259.875</a:t>
+              <a:t>= 259.875</a:t>
             </a:r>
           </a:p>
           <a:p>
@@ -10508,18 +9825,7 @@
                   </a:schemeClr>
                 </a:solidFill>
               </a:rPr>
-              <a:t>= </a:t>
-            </a:r>
-            <a:r>
-              <a:rPr lang="en-US" dirty="0" smtClean="0">
-                <a:solidFill>
-                  <a:schemeClr val="tx1">
-                    <a:lumMod val="65000"/>
-                    <a:lumOff val="35000"/>
-                  </a:schemeClr>
-                </a:solidFill>
-              </a:rPr>
-              <a:t>380.625</a:t>
+              <a:t>= 380.625</a:t>
             </a:r>
           </a:p>
           <a:p>
@@ -11062,6 +10368,1526 @@
             <p:ph idx="1"/>
           </p:nvPr>
         </p:nvSpPr>
+        <p:spPr>
+          <a:xfrm>
+            <a:off x="121976" y="2542406"/>
+            <a:ext cx="3996685" cy="3877661"/>
+          </a:xfrm>
+        </p:spPr>
+        <p:txBody>
+          <a:bodyPr>
+            <a:normAutofit/>
+          </a:bodyPr>
+          <a:lstStyle/>
+          <a:p>
+            <a:r>
+              <a:rPr lang="en-US" dirty="0" smtClean="0"/>
+              <a:t>First, I created the Java backend code that worked with some hardcoded complexity parameters (5137 SLOC).</a:t>
+            </a:r>
+            <a:endParaRPr lang="en-US" dirty="0"/>
+          </a:p>
+        </p:txBody>
+      </p:sp>
+      <p:pic>
+        <p:nvPicPr>
+          <p:cNvPr id="6" name="Picture 5" descr="JoinedCropped.png"/>
+          <p:cNvPicPr>
+            <a:picLocks noChangeAspect="1"/>
+          </p:cNvPicPr>
+          <p:nvPr/>
+        </p:nvPicPr>
+        <p:blipFill>
+          <a:blip r:embed="rId2">
+            <a:extLst>
+              <a:ext uri="{28A0092B-C50C-407E-A947-70E740481C1C}">
+                <a14:useLocalDpi xmlns:a14="http://schemas.microsoft.com/office/drawing/2010/main" val="0"/>
+              </a:ext>
+            </a:extLst>
+          </a:blip>
+          <a:stretch>
+            <a:fillRect/>
+          </a:stretch>
+        </p:blipFill>
+        <p:spPr>
+          <a:xfrm>
+            <a:off x="3984124" y="2278091"/>
+            <a:ext cx="5714612" cy="4141976"/>
+          </a:xfrm>
+          <a:prstGeom prst="rect">
+            <a:avLst/>
+          </a:prstGeom>
+        </p:spPr>
+      </p:pic>
+      <p:sp>
+        <p:nvSpPr>
+          <p:cNvPr id="7" name="Rectangle 6"/>
+          <p:cNvSpPr/>
+          <p:nvPr/>
+        </p:nvSpPr>
+        <p:spPr>
+          <a:xfrm>
+            <a:off x="7680477" y="3364158"/>
+            <a:ext cx="1463523" cy="1014319"/>
+          </a:xfrm>
+          <a:prstGeom prst="rect">
+            <a:avLst/>
+          </a:prstGeom>
+          <a:solidFill>
+            <a:srgbClr val="FFFFFF"/>
+          </a:solidFill>
+          <a:ln>
+            <a:noFill/>
+          </a:ln>
+          <a:effectLst/>
+        </p:spPr>
+        <p:style>
+          <a:lnRef idx="1">
+            <a:schemeClr val="accent1"/>
+          </a:lnRef>
+          <a:fillRef idx="3">
+            <a:schemeClr val="accent1"/>
+          </a:fillRef>
+          <a:effectRef idx="2">
+            <a:schemeClr val="accent1"/>
+          </a:effectRef>
+          <a:fontRef idx="minor">
+            <a:schemeClr val="lt1"/>
+          </a:fontRef>
+        </p:style>
+        <p:txBody>
+          <a:bodyPr rtlCol="0" anchor="ctr"/>
+          <a:lstStyle/>
+          <a:p>
+            <a:pPr algn="ctr"/>
+            <a:endParaRPr lang="en-US"/>
+          </a:p>
+        </p:txBody>
+      </p:sp>
+      <p:sp>
+        <p:nvSpPr>
+          <p:cNvPr id="8" name="Rectangle 7"/>
+          <p:cNvSpPr/>
+          <p:nvPr/>
+        </p:nvSpPr>
+        <p:spPr>
+          <a:xfrm>
+            <a:off x="6744306" y="5418668"/>
+            <a:ext cx="1463523" cy="822476"/>
+          </a:xfrm>
+          <a:prstGeom prst="rect">
+            <a:avLst/>
+          </a:prstGeom>
+          <a:solidFill>
+            <a:srgbClr val="FFFFFF"/>
+          </a:solidFill>
+          <a:ln>
+            <a:noFill/>
+          </a:ln>
+          <a:effectLst/>
+        </p:spPr>
+        <p:style>
+          <a:lnRef idx="1">
+            <a:schemeClr val="accent1"/>
+          </a:lnRef>
+          <a:fillRef idx="3">
+            <a:schemeClr val="accent1"/>
+          </a:fillRef>
+          <a:effectRef idx="2">
+            <a:schemeClr val="accent1"/>
+          </a:effectRef>
+          <a:fontRef idx="minor">
+            <a:schemeClr val="lt1"/>
+          </a:fontRef>
+        </p:style>
+        <p:txBody>
+          <a:bodyPr rtlCol="0" anchor="ctr"/>
+          <a:lstStyle/>
+          <a:p>
+            <a:pPr algn="ctr"/>
+            <a:endParaRPr lang="en-US"/>
+          </a:p>
+        </p:txBody>
+      </p:sp>
+      <p:sp>
+        <p:nvSpPr>
+          <p:cNvPr id="9" name="Rectangle 8"/>
+          <p:cNvSpPr/>
+          <p:nvPr/>
+        </p:nvSpPr>
+        <p:spPr>
+          <a:xfrm>
+            <a:off x="4118661" y="2278091"/>
+            <a:ext cx="1953149" cy="2088290"/>
+          </a:xfrm>
+          <a:prstGeom prst="rect">
+            <a:avLst/>
+          </a:prstGeom>
+          <a:solidFill>
+            <a:srgbClr val="FFFFFF"/>
+          </a:solidFill>
+          <a:ln>
+            <a:noFill/>
+          </a:ln>
+          <a:effectLst/>
+        </p:spPr>
+        <p:style>
+          <a:lnRef idx="1">
+            <a:schemeClr val="accent1"/>
+          </a:lnRef>
+          <a:fillRef idx="3">
+            <a:schemeClr val="accent1"/>
+          </a:fillRef>
+          <a:effectRef idx="2">
+            <a:schemeClr val="accent1"/>
+          </a:effectRef>
+          <a:fontRef idx="minor">
+            <a:schemeClr val="lt1"/>
+          </a:fontRef>
+        </p:style>
+        <p:txBody>
+          <a:bodyPr rtlCol="0" anchor="ctr"/>
+          <a:lstStyle/>
+          <a:p>
+            <a:pPr algn="ctr"/>
+            <a:endParaRPr lang="en-US"/>
+          </a:p>
+        </p:txBody>
+      </p:sp>
+    </p:spTree>
+    <p:extLst>
+      <p:ext uri="{BB962C8B-B14F-4D97-AF65-F5344CB8AC3E}">
+        <p14:creationId xmlns:p14="http://schemas.microsoft.com/office/powerpoint/2010/main" val="2251259720"/>
+      </p:ext>
+    </p:extLst>
+  </p:cSld>
+  <p:clrMapOvr>
+    <a:masterClrMapping/>
+  </p:clrMapOvr>
+  <p:timing>
+    <p:tnLst>
+      <p:par>
+        <p:cTn xmlns:p14="http://schemas.microsoft.com/office/powerpoint/2010/main" id="1" dur="indefinite" restart="never" nodeType="tmRoot">
+          <p:childTnLst>
+            <p:seq concurrent="1" nextAc="seek">
+              <p:cTn id="2" dur="indefinite" nodeType="mainSeq">
+                <p:childTnLst>
+                  <p:par>
+                    <p:cTn id="3" fill="hold">
+                      <p:stCondLst>
+                        <p:cond delay="indefinite"/>
+                      </p:stCondLst>
+                      <p:childTnLst>
+                        <p:par>
+                          <p:cTn id="4" fill="hold">
+                            <p:stCondLst>
+                              <p:cond delay="0"/>
+                            </p:stCondLst>
+                            <p:childTnLst>
+                              <p:par>
+                                <p:cTn id="5" presetID="1" presetClass="entr" presetSubtype="0" fill="hold" nodeType="clickEffect">
+                                  <p:stCondLst>
+                                    <p:cond delay="0"/>
+                                  </p:stCondLst>
+                                  <p:childTnLst>
+                                    <p:set>
+                                      <p:cBhvr>
+                                        <p:cTn id="6" dur="1" fill="hold">
+                                          <p:stCondLst>
+                                            <p:cond delay="0"/>
+                                          </p:stCondLst>
+                                        </p:cTn>
+                                        <p:tgtEl>
+                                          <p:spTgt spid="3">
+                                            <p:txEl>
+                                              <p:pRg st="0" end="0"/>
+                                            </p:txEl>
+                                          </p:spTgt>
+                                        </p:tgtEl>
+                                        <p:attrNameLst>
+                                          <p:attrName>style.visibility</p:attrName>
+                                        </p:attrNameLst>
+                                      </p:cBhvr>
+                                      <p:to>
+                                        <p:strVal val="visible"/>
+                                      </p:to>
+                                    </p:set>
+                                  </p:childTnLst>
+                                </p:cTn>
+                              </p:par>
+                            </p:childTnLst>
+                          </p:cTn>
+                        </p:par>
+                      </p:childTnLst>
+                    </p:cTn>
+                  </p:par>
+                </p:childTnLst>
+              </p:cTn>
+              <p:prevCondLst>
+                <p:cond evt="onPrev" delay="0">
+                  <p:tgtEl>
+                    <p:sldTgt/>
+                  </p:tgtEl>
+                </p:cond>
+              </p:prevCondLst>
+              <p:nextCondLst>
+                <p:cond evt="onNext" delay="0">
+                  <p:tgtEl>
+                    <p:sldTgt/>
+                  </p:tgtEl>
+                </p:cond>
+              </p:nextCondLst>
+            </p:seq>
+          </p:childTnLst>
+        </p:cTn>
+      </p:par>
+    </p:tnLst>
+  </p:timing>
+</p:sld>
+</file>
+
+<file path=ppt/slides/slide27.xml><?xml version="1.0" encoding="utf-8"?>
+<p:sld xmlns:a="http://schemas.openxmlformats.org/drawingml/2006/main" xmlns:r="http://schemas.openxmlformats.org/officeDocument/2006/relationships" xmlns:p="http://schemas.openxmlformats.org/presentationml/2006/main">
+  <p:cSld>
+    <p:spTree>
+      <p:nvGrpSpPr>
+        <p:cNvPr id="1" name=""/>
+        <p:cNvGrpSpPr/>
+        <p:nvPr/>
+      </p:nvGrpSpPr>
+      <p:grpSpPr>
+        <a:xfrm>
+          <a:off x="0" y="0"/>
+          <a:ext cx="0" cy="0"/>
+          <a:chOff x="0" y="0"/>
+          <a:chExt cx="0" cy="0"/>
+        </a:xfrm>
+      </p:grpSpPr>
+      <p:sp>
+        <p:nvSpPr>
+          <p:cNvPr id="2" name="Title 1"/>
+          <p:cNvSpPr>
+            <a:spLocks noGrp="1"/>
+          </p:cNvSpPr>
+          <p:nvPr>
+            <p:ph type="title"/>
+          </p:nvPr>
+        </p:nvSpPr>
+        <p:spPr/>
+        <p:txBody>
+          <a:bodyPr/>
+          <a:lstStyle/>
+          <a:p>
+            <a:r>
+              <a:rPr lang="en-US" dirty="0" smtClean="0"/>
+              <a:t>Proof of Concept</a:t>
+            </a:r>
+            <a:endParaRPr lang="en-US" dirty="0"/>
+          </a:p>
+        </p:txBody>
+      </p:sp>
+      <p:sp>
+        <p:nvSpPr>
+          <p:cNvPr id="3" name="Content Placeholder 2"/>
+          <p:cNvSpPr>
+            <a:spLocks noGrp="1"/>
+          </p:cNvSpPr>
+          <p:nvPr>
+            <p:ph idx="1"/>
+          </p:nvPr>
+        </p:nvSpPr>
+        <p:spPr>
+          <a:xfrm>
+            <a:off x="121976" y="2542406"/>
+            <a:ext cx="3996685" cy="3877661"/>
+          </a:xfrm>
+        </p:spPr>
+        <p:txBody>
+          <a:bodyPr>
+            <a:normAutofit/>
+          </a:bodyPr>
+          <a:lstStyle/>
+          <a:p>
+            <a:r>
+              <a:rPr lang="en-US" dirty="0" smtClean="0"/>
+              <a:t>First, I created the Java backend code that worked with some hardcoded </a:t>
+            </a:r>
+            <a:r>
+              <a:rPr lang="en-US" dirty="0"/>
+              <a:t>complexity parameters (5137 SLOC).</a:t>
+            </a:r>
+            <a:endParaRPr lang="en-US" dirty="0" smtClean="0"/>
+          </a:p>
+          <a:p>
+            <a:r>
+              <a:rPr lang="en-US" dirty="0" smtClean="0"/>
+              <a:t>Second, I formalized the complexity parameters and abstracted them away from the implementation.</a:t>
+            </a:r>
+            <a:endParaRPr lang="en-US" dirty="0"/>
+          </a:p>
+        </p:txBody>
+      </p:sp>
+      <p:pic>
+        <p:nvPicPr>
+          <p:cNvPr id="6" name="Picture 5" descr="JoinedCropped.png"/>
+          <p:cNvPicPr>
+            <a:picLocks noChangeAspect="1"/>
+          </p:cNvPicPr>
+          <p:nvPr/>
+        </p:nvPicPr>
+        <p:blipFill>
+          <a:blip r:embed="rId2">
+            <a:extLst>
+              <a:ext uri="{28A0092B-C50C-407E-A947-70E740481C1C}">
+                <a14:useLocalDpi xmlns:a14="http://schemas.microsoft.com/office/drawing/2010/main" val="0"/>
+              </a:ext>
+            </a:extLst>
+          </a:blip>
+          <a:stretch>
+            <a:fillRect/>
+          </a:stretch>
+        </p:blipFill>
+        <p:spPr>
+          <a:xfrm>
+            <a:off x="3984124" y="2278091"/>
+            <a:ext cx="5714612" cy="4141976"/>
+          </a:xfrm>
+          <a:prstGeom prst="rect">
+            <a:avLst/>
+          </a:prstGeom>
+        </p:spPr>
+      </p:pic>
+      <p:sp>
+        <p:nvSpPr>
+          <p:cNvPr id="8" name="Rectangle 7"/>
+          <p:cNvSpPr/>
+          <p:nvPr/>
+        </p:nvSpPr>
+        <p:spPr>
+          <a:xfrm>
+            <a:off x="6744306" y="5418668"/>
+            <a:ext cx="1463523" cy="822476"/>
+          </a:xfrm>
+          <a:prstGeom prst="rect">
+            <a:avLst/>
+          </a:prstGeom>
+          <a:solidFill>
+            <a:srgbClr val="FFFFFF"/>
+          </a:solidFill>
+          <a:ln>
+            <a:noFill/>
+          </a:ln>
+          <a:effectLst/>
+        </p:spPr>
+        <p:style>
+          <a:lnRef idx="1">
+            <a:schemeClr val="accent1"/>
+          </a:lnRef>
+          <a:fillRef idx="3">
+            <a:schemeClr val="accent1"/>
+          </a:fillRef>
+          <a:effectRef idx="2">
+            <a:schemeClr val="accent1"/>
+          </a:effectRef>
+          <a:fontRef idx="minor">
+            <a:schemeClr val="lt1"/>
+          </a:fontRef>
+        </p:style>
+        <p:txBody>
+          <a:bodyPr rtlCol="0" anchor="ctr"/>
+          <a:lstStyle/>
+          <a:p>
+            <a:pPr algn="ctr"/>
+            <a:endParaRPr lang="en-US"/>
+          </a:p>
+        </p:txBody>
+      </p:sp>
+      <p:sp>
+        <p:nvSpPr>
+          <p:cNvPr id="9" name="Rectangle 8"/>
+          <p:cNvSpPr/>
+          <p:nvPr/>
+        </p:nvSpPr>
+        <p:spPr>
+          <a:xfrm>
+            <a:off x="4118661" y="2278091"/>
+            <a:ext cx="1953149" cy="2088290"/>
+          </a:xfrm>
+          <a:prstGeom prst="rect">
+            <a:avLst/>
+          </a:prstGeom>
+          <a:solidFill>
+            <a:srgbClr val="FFFFFF"/>
+          </a:solidFill>
+          <a:ln>
+            <a:noFill/>
+          </a:ln>
+          <a:effectLst/>
+        </p:spPr>
+        <p:style>
+          <a:lnRef idx="1">
+            <a:schemeClr val="accent1"/>
+          </a:lnRef>
+          <a:fillRef idx="3">
+            <a:schemeClr val="accent1"/>
+          </a:fillRef>
+          <a:effectRef idx="2">
+            <a:schemeClr val="accent1"/>
+          </a:effectRef>
+          <a:fontRef idx="minor">
+            <a:schemeClr val="lt1"/>
+          </a:fontRef>
+        </p:style>
+        <p:txBody>
+          <a:bodyPr rtlCol="0" anchor="ctr"/>
+          <a:lstStyle/>
+          <a:p>
+            <a:pPr algn="ctr"/>
+            <a:endParaRPr lang="en-US"/>
+          </a:p>
+        </p:txBody>
+      </p:sp>
+    </p:spTree>
+    <p:extLst>
+      <p:ext uri="{BB962C8B-B14F-4D97-AF65-F5344CB8AC3E}">
+        <p14:creationId xmlns:p14="http://schemas.microsoft.com/office/powerpoint/2010/main" val="705273589"/>
+      </p:ext>
+    </p:extLst>
+  </p:cSld>
+  <p:clrMapOvr>
+    <a:masterClrMapping/>
+  </p:clrMapOvr>
+  <p:timing>
+    <p:tnLst>
+      <p:par>
+        <p:cTn xmlns:p14="http://schemas.microsoft.com/office/powerpoint/2010/main" id="1" dur="indefinite" restart="never" nodeType="tmRoot">
+          <p:childTnLst>
+            <p:seq concurrent="1" nextAc="seek">
+              <p:cTn id="2" dur="indefinite" nodeType="mainSeq">
+                <p:childTnLst>
+                  <p:par>
+                    <p:cTn id="3" fill="hold">
+                      <p:stCondLst>
+                        <p:cond delay="indefinite"/>
+                      </p:stCondLst>
+                      <p:childTnLst>
+                        <p:par>
+                          <p:cTn id="4" fill="hold">
+                            <p:stCondLst>
+                              <p:cond delay="0"/>
+                            </p:stCondLst>
+                            <p:childTnLst>
+                              <p:par>
+                                <p:cTn id="5" presetID="1" presetClass="entr" presetSubtype="0" fill="hold" nodeType="clickEffect">
+                                  <p:stCondLst>
+                                    <p:cond delay="0"/>
+                                  </p:stCondLst>
+                                  <p:childTnLst>
+                                    <p:set>
+                                      <p:cBhvr>
+                                        <p:cTn id="6" dur="1" fill="hold">
+                                          <p:stCondLst>
+                                            <p:cond delay="0"/>
+                                          </p:stCondLst>
+                                        </p:cTn>
+                                        <p:tgtEl>
+                                          <p:spTgt spid="3">
+                                            <p:txEl>
+                                              <p:pRg st="0" end="0"/>
+                                            </p:txEl>
+                                          </p:spTgt>
+                                        </p:tgtEl>
+                                        <p:attrNameLst>
+                                          <p:attrName>style.visibility</p:attrName>
+                                        </p:attrNameLst>
+                                      </p:cBhvr>
+                                      <p:to>
+                                        <p:strVal val="visible"/>
+                                      </p:to>
+                                    </p:set>
+                                  </p:childTnLst>
+                                </p:cTn>
+                              </p:par>
+                            </p:childTnLst>
+                          </p:cTn>
+                        </p:par>
+                      </p:childTnLst>
+                    </p:cTn>
+                  </p:par>
+                  <p:par>
+                    <p:cTn id="7" fill="hold">
+                      <p:stCondLst>
+                        <p:cond delay="indefinite"/>
+                      </p:stCondLst>
+                      <p:childTnLst>
+                        <p:par>
+                          <p:cTn id="8" fill="hold">
+                            <p:stCondLst>
+                              <p:cond delay="0"/>
+                            </p:stCondLst>
+                            <p:childTnLst>
+                              <p:par>
+                                <p:cTn id="9" presetID="1" presetClass="entr" presetSubtype="0" fill="hold" nodeType="clickEffect">
+                                  <p:stCondLst>
+                                    <p:cond delay="0"/>
+                                  </p:stCondLst>
+                                  <p:childTnLst>
+                                    <p:set>
+                                      <p:cBhvr>
+                                        <p:cTn id="10" dur="1" fill="hold">
+                                          <p:stCondLst>
+                                            <p:cond delay="0"/>
+                                          </p:stCondLst>
+                                        </p:cTn>
+                                        <p:tgtEl>
+                                          <p:spTgt spid="3">
+                                            <p:txEl>
+                                              <p:pRg st="1" end="1"/>
+                                            </p:txEl>
+                                          </p:spTgt>
+                                        </p:tgtEl>
+                                        <p:attrNameLst>
+                                          <p:attrName>style.visibility</p:attrName>
+                                        </p:attrNameLst>
+                                      </p:cBhvr>
+                                      <p:to>
+                                        <p:strVal val="visible"/>
+                                      </p:to>
+                                    </p:set>
+                                  </p:childTnLst>
+                                </p:cTn>
+                              </p:par>
+                            </p:childTnLst>
+                          </p:cTn>
+                        </p:par>
+                      </p:childTnLst>
+                    </p:cTn>
+                  </p:par>
+                </p:childTnLst>
+              </p:cTn>
+              <p:prevCondLst>
+                <p:cond evt="onPrev" delay="0">
+                  <p:tgtEl>
+                    <p:sldTgt/>
+                  </p:tgtEl>
+                </p:cond>
+              </p:prevCondLst>
+              <p:nextCondLst>
+                <p:cond evt="onNext" delay="0">
+                  <p:tgtEl>
+                    <p:sldTgt/>
+                  </p:tgtEl>
+                </p:cond>
+              </p:nextCondLst>
+            </p:seq>
+          </p:childTnLst>
+        </p:cTn>
+      </p:par>
+    </p:tnLst>
+  </p:timing>
+</p:sld>
+</file>
+
+<file path=ppt/slides/slide28.xml><?xml version="1.0" encoding="utf-8"?>
+<p:sld xmlns:a="http://schemas.openxmlformats.org/drawingml/2006/main" xmlns:r="http://schemas.openxmlformats.org/officeDocument/2006/relationships" xmlns:p="http://schemas.openxmlformats.org/presentationml/2006/main">
+  <p:cSld>
+    <p:spTree>
+      <p:nvGrpSpPr>
+        <p:cNvPr id="1" name=""/>
+        <p:cNvGrpSpPr/>
+        <p:nvPr/>
+      </p:nvGrpSpPr>
+      <p:grpSpPr>
+        <a:xfrm>
+          <a:off x="0" y="0"/>
+          <a:ext cx="0" cy="0"/>
+          <a:chOff x="0" y="0"/>
+          <a:chExt cx="0" cy="0"/>
+        </a:xfrm>
+      </p:grpSpPr>
+      <p:sp>
+        <p:nvSpPr>
+          <p:cNvPr id="2" name="Title 1"/>
+          <p:cNvSpPr>
+            <a:spLocks noGrp="1"/>
+          </p:cNvSpPr>
+          <p:nvPr>
+            <p:ph type="title"/>
+          </p:nvPr>
+        </p:nvSpPr>
+        <p:spPr/>
+        <p:txBody>
+          <a:bodyPr/>
+          <a:lstStyle/>
+          <a:p>
+            <a:r>
+              <a:rPr lang="en-US" dirty="0" smtClean="0"/>
+              <a:t>Proof of Concept</a:t>
+            </a:r>
+            <a:endParaRPr lang="en-US" dirty="0"/>
+          </a:p>
+        </p:txBody>
+      </p:sp>
+      <p:sp>
+        <p:nvSpPr>
+          <p:cNvPr id="3" name="Content Placeholder 2"/>
+          <p:cNvSpPr>
+            <a:spLocks noGrp="1"/>
+          </p:cNvSpPr>
+          <p:nvPr>
+            <p:ph idx="1"/>
+          </p:nvPr>
+        </p:nvSpPr>
+        <p:spPr>
+          <a:xfrm>
+            <a:off x="121976" y="2542406"/>
+            <a:ext cx="3996685" cy="3877661"/>
+          </a:xfrm>
+        </p:spPr>
+        <p:txBody>
+          <a:bodyPr>
+            <a:normAutofit/>
+          </a:bodyPr>
+          <a:lstStyle/>
+          <a:p>
+            <a:r>
+              <a:rPr lang="en-US" dirty="0" smtClean="0"/>
+              <a:t>First, I created the Java backend code that worked with some hardcoded </a:t>
+            </a:r>
+            <a:r>
+              <a:rPr lang="en-US" dirty="0"/>
+              <a:t>complexity parameters (5137 SLOC).</a:t>
+            </a:r>
+            <a:endParaRPr lang="en-US" dirty="0" smtClean="0"/>
+          </a:p>
+          <a:p>
+            <a:r>
+              <a:rPr lang="en-US" dirty="0" smtClean="0"/>
+              <a:t>Second, I formalized the complexity parameters and abstracted them away from the implementation.</a:t>
+            </a:r>
+          </a:p>
+          <a:p>
+            <a:r>
+              <a:rPr lang="en-US" dirty="0"/>
+              <a:t>Third, I created the web frontend using outside libraries so users could interact with the software </a:t>
+            </a:r>
+            <a:r>
+              <a:rPr lang="en-US" dirty="0" smtClean="0"/>
+              <a:t>online (3061 SLOC).</a:t>
+            </a:r>
+            <a:endParaRPr lang="en-US" dirty="0"/>
+          </a:p>
+        </p:txBody>
+      </p:sp>
+      <p:pic>
+        <p:nvPicPr>
+          <p:cNvPr id="6" name="Picture 5" descr="JoinedCropped.png"/>
+          <p:cNvPicPr>
+            <a:picLocks noChangeAspect="1"/>
+          </p:cNvPicPr>
+          <p:nvPr/>
+        </p:nvPicPr>
+        <p:blipFill>
+          <a:blip r:embed="rId2">
+            <a:extLst>
+              <a:ext uri="{28A0092B-C50C-407E-A947-70E740481C1C}">
+                <a14:useLocalDpi xmlns:a14="http://schemas.microsoft.com/office/drawing/2010/main" val="0"/>
+              </a:ext>
+            </a:extLst>
+          </a:blip>
+          <a:stretch>
+            <a:fillRect/>
+          </a:stretch>
+        </p:blipFill>
+        <p:spPr>
+          <a:xfrm>
+            <a:off x="3984124" y="2278091"/>
+            <a:ext cx="5714612" cy="4141976"/>
+          </a:xfrm>
+          <a:prstGeom prst="rect">
+            <a:avLst/>
+          </a:prstGeom>
+        </p:spPr>
+      </p:pic>
+      <p:sp>
+        <p:nvSpPr>
+          <p:cNvPr id="4" name="Rectangle 3"/>
+          <p:cNvSpPr/>
+          <p:nvPr/>
+        </p:nvSpPr>
+        <p:spPr>
+          <a:xfrm>
+            <a:off x="4118661" y="2278091"/>
+            <a:ext cx="1953149" cy="2088290"/>
+          </a:xfrm>
+          <a:prstGeom prst="rect">
+            <a:avLst/>
+          </a:prstGeom>
+          <a:solidFill>
+            <a:srgbClr val="FFFFFF"/>
+          </a:solidFill>
+          <a:ln>
+            <a:noFill/>
+          </a:ln>
+          <a:effectLst/>
+        </p:spPr>
+        <p:style>
+          <a:lnRef idx="1">
+            <a:schemeClr val="accent1"/>
+          </a:lnRef>
+          <a:fillRef idx="3">
+            <a:schemeClr val="accent1"/>
+          </a:fillRef>
+          <a:effectRef idx="2">
+            <a:schemeClr val="accent1"/>
+          </a:effectRef>
+          <a:fontRef idx="minor">
+            <a:schemeClr val="lt1"/>
+          </a:fontRef>
+        </p:style>
+        <p:txBody>
+          <a:bodyPr rtlCol="0" anchor="ctr"/>
+          <a:lstStyle/>
+          <a:p>
+            <a:pPr algn="ctr"/>
+            <a:endParaRPr lang="en-US"/>
+          </a:p>
+        </p:txBody>
+      </p:sp>
+    </p:spTree>
+    <p:extLst>
+      <p:ext uri="{BB962C8B-B14F-4D97-AF65-F5344CB8AC3E}">
+        <p14:creationId xmlns:p14="http://schemas.microsoft.com/office/powerpoint/2010/main" val="2887158869"/>
+      </p:ext>
+    </p:extLst>
+  </p:cSld>
+  <p:clrMapOvr>
+    <a:masterClrMapping/>
+  </p:clrMapOvr>
+  <p:timing>
+    <p:tnLst>
+      <p:par>
+        <p:cTn xmlns:p14="http://schemas.microsoft.com/office/powerpoint/2010/main" id="1" dur="indefinite" restart="never" nodeType="tmRoot">
+          <p:childTnLst>
+            <p:seq concurrent="1" nextAc="seek">
+              <p:cTn id="2" dur="indefinite" nodeType="mainSeq">
+                <p:childTnLst>
+                  <p:par>
+                    <p:cTn id="3" fill="hold">
+                      <p:stCondLst>
+                        <p:cond delay="indefinite"/>
+                      </p:stCondLst>
+                      <p:childTnLst>
+                        <p:par>
+                          <p:cTn id="4" fill="hold">
+                            <p:stCondLst>
+                              <p:cond delay="0"/>
+                            </p:stCondLst>
+                            <p:childTnLst>
+                              <p:par>
+                                <p:cTn id="5" presetID="1" presetClass="entr" presetSubtype="0" fill="hold" nodeType="clickEffect">
+                                  <p:stCondLst>
+                                    <p:cond delay="0"/>
+                                  </p:stCondLst>
+                                  <p:childTnLst>
+                                    <p:set>
+                                      <p:cBhvr>
+                                        <p:cTn id="6" dur="1" fill="hold">
+                                          <p:stCondLst>
+                                            <p:cond delay="0"/>
+                                          </p:stCondLst>
+                                        </p:cTn>
+                                        <p:tgtEl>
+                                          <p:spTgt spid="3">
+                                            <p:txEl>
+                                              <p:pRg st="0" end="0"/>
+                                            </p:txEl>
+                                          </p:spTgt>
+                                        </p:tgtEl>
+                                        <p:attrNameLst>
+                                          <p:attrName>style.visibility</p:attrName>
+                                        </p:attrNameLst>
+                                      </p:cBhvr>
+                                      <p:to>
+                                        <p:strVal val="visible"/>
+                                      </p:to>
+                                    </p:set>
+                                  </p:childTnLst>
+                                </p:cTn>
+                              </p:par>
+                            </p:childTnLst>
+                          </p:cTn>
+                        </p:par>
+                      </p:childTnLst>
+                    </p:cTn>
+                  </p:par>
+                  <p:par>
+                    <p:cTn id="7" fill="hold">
+                      <p:stCondLst>
+                        <p:cond delay="indefinite"/>
+                      </p:stCondLst>
+                      <p:childTnLst>
+                        <p:par>
+                          <p:cTn id="8" fill="hold">
+                            <p:stCondLst>
+                              <p:cond delay="0"/>
+                            </p:stCondLst>
+                            <p:childTnLst>
+                              <p:par>
+                                <p:cTn id="9" presetID="1" presetClass="entr" presetSubtype="0" fill="hold" nodeType="clickEffect">
+                                  <p:stCondLst>
+                                    <p:cond delay="0"/>
+                                  </p:stCondLst>
+                                  <p:childTnLst>
+                                    <p:set>
+                                      <p:cBhvr>
+                                        <p:cTn id="10" dur="1" fill="hold">
+                                          <p:stCondLst>
+                                            <p:cond delay="0"/>
+                                          </p:stCondLst>
+                                        </p:cTn>
+                                        <p:tgtEl>
+                                          <p:spTgt spid="3">
+                                            <p:txEl>
+                                              <p:pRg st="1" end="1"/>
+                                            </p:txEl>
+                                          </p:spTgt>
+                                        </p:tgtEl>
+                                        <p:attrNameLst>
+                                          <p:attrName>style.visibility</p:attrName>
+                                        </p:attrNameLst>
+                                      </p:cBhvr>
+                                      <p:to>
+                                        <p:strVal val="visible"/>
+                                      </p:to>
+                                    </p:set>
+                                  </p:childTnLst>
+                                </p:cTn>
+                              </p:par>
+                            </p:childTnLst>
+                          </p:cTn>
+                        </p:par>
+                      </p:childTnLst>
+                    </p:cTn>
+                  </p:par>
+                  <p:par>
+                    <p:cTn id="11" fill="hold">
+                      <p:stCondLst>
+                        <p:cond delay="indefinite"/>
+                      </p:stCondLst>
+                      <p:childTnLst>
+                        <p:par>
+                          <p:cTn id="12" fill="hold">
+                            <p:stCondLst>
+                              <p:cond delay="0"/>
+                            </p:stCondLst>
+                            <p:childTnLst>
+                              <p:par>
+                                <p:cTn id="13" presetID="1" presetClass="entr" presetSubtype="0" fill="hold" nodeType="clickEffect">
+                                  <p:stCondLst>
+                                    <p:cond delay="0"/>
+                                  </p:stCondLst>
+                                  <p:childTnLst>
+                                    <p:set>
+                                      <p:cBhvr>
+                                        <p:cTn id="14" dur="1" fill="hold">
+                                          <p:stCondLst>
+                                            <p:cond delay="0"/>
+                                          </p:stCondLst>
+                                        </p:cTn>
+                                        <p:tgtEl>
+                                          <p:spTgt spid="3">
+                                            <p:txEl>
+                                              <p:pRg st="2" end="2"/>
+                                            </p:txEl>
+                                          </p:spTgt>
+                                        </p:tgtEl>
+                                        <p:attrNameLst>
+                                          <p:attrName>style.visibility</p:attrName>
+                                        </p:attrNameLst>
+                                      </p:cBhvr>
+                                      <p:to>
+                                        <p:strVal val="visible"/>
+                                      </p:to>
+                                    </p:set>
+                                  </p:childTnLst>
+                                </p:cTn>
+                              </p:par>
+                            </p:childTnLst>
+                          </p:cTn>
+                        </p:par>
+                      </p:childTnLst>
+                    </p:cTn>
+                  </p:par>
+                </p:childTnLst>
+              </p:cTn>
+              <p:prevCondLst>
+                <p:cond evt="onPrev" delay="0">
+                  <p:tgtEl>
+                    <p:sldTgt/>
+                  </p:tgtEl>
+                </p:cond>
+              </p:prevCondLst>
+              <p:nextCondLst>
+                <p:cond evt="onNext" delay="0">
+                  <p:tgtEl>
+                    <p:sldTgt/>
+                  </p:tgtEl>
+                </p:cond>
+              </p:nextCondLst>
+            </p:seq>
+          </p:childTnLst>
+        </p:cTn>
+      </p:par>
+    </p:tnLst>
+  </p:timing>
+</p:sld>
+</file>
+
+<file path=ppt/slides/slide29.xml><?xml version="1.0" encoding="utf-8"?>
+<p:sld xmlns:a="http://schemas.openxmlformats.org/drawingml/2006/main" xmlns:r="http://schemas.openxmlformats.org/officeDocument/2006/relationships" xmlns:p="http://schemas.openxmlformats.org/presentationml/2006/main">
+  <p:cSld>
+    <p:spTree>
+      <p:nvGrpSpPr>
+        <p:cNvPr id="1" name=""/>
+        <p:cNvGrpSpPr/>
+        <p:nvPr/>
+      </p:nvGrpSpPr>
+      <p:grpSpPr>
+        <a:xfrm>
+          <a:off x="0" y="0"/>
+          <a:ext cx="0" cy="0"/>
+          <a:chOff x="0" y="0"/>
+          <a:chExt cx="0" cy="0"/>
+        </a:xfrm>
+      </p:grpSpPr>
+      <p:sp>
+        <p:nvSpPr>
+          <p:cNvPr id="2" name="Title 1"/>
+          <p:cNvSpPr>
+            <a:spLocks noGrp="1"/>
+          </p:cNvSpPr>
+          <p:nvPr>
+            <p:ph type="title"/>
+          </p:nvPr>
+        </p:nvSpPr>
+        <p:spPr/>
+        <p:txBody>
+          <a:bodyPr/>
+          <a:lstStyle/>
+          <a:p>
+            <a:r>
+              <a:rPr lang="en-US" dirty="0" smtClean="0"/>
+              <a:t>Proof of Concept</a:t>
+            </a:r>
+            <a:endParaRPr lang="en-US" dirty="0"/>
+          </a:p>
+        </p:txBody>
+      </p:sp>
+      <p:sp>
+        <p:nvSpPr>
+          <p:cNvPr id="3" name="Content Placeholder 2"/>
+          <p:cNvSpPr>
+            <a:spLocks noGrp="1"/>
+          </p:cNvSpPr>
+          <p:nvPr>
+            <p:ph idx="1"/>
+          </p:nvPr>
+        </p:nvSpPr>
+        <p:spPr>
+          <a:xfrm>
+            <a:off x="121976" y="2542406"/>
+            <a:ext cx="3996685" cy="4218832"/>
+          </a:xfrm>
+        </p:spPr>
+        <p:txBody>
+          <a:bodyPr>
+            <a:normAutofit/>
+          </a:bodyPr>
+          <a:lstStyle/>
+          <a:p>
+            <a:r>
+              <a:rPr lang="en-US" dirty="0" smtClean="0"/>
+              <a:t>First, I created the Java backend code that worked with some hardcoded </a:t>
+            </a:r>
+            <a:r>
+              <a:rPr lang="en-US" dirty="0"/>
+              <a:t>complexity parameters (5137 SLOC).</a:t>
+            </a:r>
+            <a:endParaRPr lang="en-US" dirty="0" smtClean="0"/>
+          </a:p>
+          <a:p>
+            <a:r>
+              <a:rPr lang="en-US" dirty="0" smtClean="0"/>
+              <a:t>Second, I formalized the complexity parameters and abstracted them away from the implementation.</a:t>
+            </a:r>
+          </a:p>
+          <a:p>
+            <a:r>
+              <a:rPr lang="en-US" dirty="0" smtClean="0"/>
+              <a:t>Third, I created the web frontend using outside libraries so users could interact with the </a:t>
+            </a:r>
+            <a:r>
+              <a:rPr lang="en-US" dirty="0"/>
+              <a:t>software online (3061 SLOC).</a:t>
+            </a:r>
+            <a:endParaRPr lang="en-US" dirty="0" smtClean="0"/>
+          </a:p>
+          <a:p>
+            <a:r>
+              <a:rPr lang="en-US" dirty="0" smtClean="0"/>
+              <a:t>Finally, I added support for music OCR to the front of the pipeline.</a:t>
+            </a:r>
+            <a:endParaRPr lang="en-US" dirty="0"/>
+          </a:p>
+        </p:txBody>
+      </p:sp>
+      <p:pic>
+        <p:nvPicPr>
+          <p:cNvPr id="6" name="Picture 5" descr="JoinedCropped.png"/>
+          <p:cNvPicPr>
+            <a:picLocks noChangeAspect="1"/>
+          </p:cNvPicPr>
+          <p:nvPr/>
+        </p:nvPicPr>
+        <p:blipFill>
+          <a:blip r:embed="rId2">
+            <a:extLst>
+              <a:ext uri="{28A0092B-C50C-407E-A947-70E740481C1C}">
+                <a14:useLocalDpi xmlns:a14="http://schemas.microsoft.com/office/drawing/2010/main" val="0"/>
+              </a:ext>
+            </a:extLst>
+          </a:blip>
+          <a:stretch>
+            <a:fillRect/>
+          </a:stretch>
+        </p:blipFill>
+        <p:spPr>
+          <a:xfrm>
+            <a:off x="3984124" y="2278091"/>
+            <a:ext cx="5714612" cy="4141976"/>
+          </a:xfrm>
+          <a:prstGeom prst="rect">
+            <a:avLst/>
+          </a:prstGeom>
+        </p:spPr>
+      </p:pic>
+    </p:spTree>
+    <p:extLst>
+      <p:ext uri="{BB962C8B-B14F-4D97-AF65-F5344CB8AC3E}">
+        <p14:creationId xmlns:p14="http://schemas.microsoft.com/office/powerpoint/2010/main" val="1594622000"/>
+      </p:ext>
+    </p:extLst>
+  </p:cSld>
+  <p:clrMapOvr>
+    <a:masterClrMapping/>
+  </p:clrMapOvr>
+  <p:timing>
+    <p:tnLst>
+      <p:par>
+        <p:cTn xmlns:p14="http://schemas.microsoft.com/office/powerpoint/2010/main" id="1" dur="indefinite" restart="never" nodeType="tmRoot">
+          <p:childTnLst>
+            <p:seq concurrent="1" nextAc="seek">
+              <p:cTn id="2" dur="indefinite" nodeType="mainSeq">
+                <p:childTnLst>
+                  <p:par>
+                    <p:cTn id="3" fill="hold">
+                      <p:stCondLst>
+                        <p:cond delay="indefinite"/>
+                      </p:stCondLst>
+                      <p:childTnLst>
+                        <p:par>
+                          <p:cTn id="4" fill="hold">
+                            <p:stCondLst>
+                              <p:cond delay="0"/>
+                            </p:stCondLst>
+                            <p:childTnLst>
+                              <p:par>
+                                <p:cTn id="5" presetID="1" presetClass="entr" presetSubtype="0" fill="hold" nodeType="clickEffect">
+                                  <p:stCondLst>
+                                    <p:cond delay="0"/>
+                                  </p:stCondLst>
+                                  <p:childTnLst>
+                                    <p:set>
+                                      <p:cBhvr>
+                                        <p:cTn id="6" dur="1" fill="hold">
+                                          <p:stCondLst>
+                                            <p:cond delay="0"/>
+                                          </p:stCondLst>
+                                        </p:cTn>
+                                        <p:tgtEl>
+                                          <p:spTgt spid="3">
+                                            <p:txEl>
+                                              <p:pRg st="0" end="0"/>
+                                            </p:txEl>
+                                          </p:spTgt>
+                                        </p:tgtEl>
+                                        <p:attrNameLst>
+                                          <p:attrName>style.visibility</p:attrName>
+                                        </p:attrNameLst>
+                                      </p:cBhvr>
+                                      <p:to>
+                                        <p:strVal val="visible"/>
+                                      </p:to>
+                                    </p:set>
+                                  </p:childTnLst>
+                                </p:cTn>
+                              </p:par>
+                            </p:childTnLst>
+                          </p:cTn>
+                        </p:par>
+                      </p:childTnLst>
+                    </p:cTn>
+                  </p:par>
+                  <p:par>
+                    <p:cTn id="7" fill="hold">
+                      <p:stCondLst>
+                        <p:cond delay="indefinite"/>
+                      </p:stCondLst>
+                      <p:childTnLst>
+                        <p:par>
+                          <p:cTn id="8" fill="hold">
+                            <p:stCondLst>
+                              <p:cond delay="0"/>
+                            </p:stCondLst>
+                            <p:childTnLst>
+                              <p:par>
+                                <p:cTn id="9" presetID="1" presetClass="entr" presetSubtype="0" fill="hold" nodeType="clickEffect">
+                                  <p:stCondLst>
+                                    <p:cond delay="0"/>
+                                  </p:stCondLst>
+                                  <p:childTnLst>
+                                    <p:set>
+                                      <p:cBhvr>
+                                        <p:cTn id="10" dur="1" fill="hold">
+                                          <p:stCondLst>
+                                            <p:cond delay="0"/>
+                                          </p:stCondLst>
+                                        </p:cTn>
+                                        <p:tgtEl>
+                                          <p:spTgt spid="3">
+                                            <p:txEl>
+                                              <p:pRg st="1" end="1"/>
+                                            </p:txEl>
+                                          </p:spTgt>
+                                        </p:tgtEl>
+                                        <p:attrNameLst>
+                                          <p:attrName>style.visibility</p:attrName>
+                                        </p:attrNameLst>
+                                      </p:cBhvr>
+                                      <p:to>
+                                        <p:strVal val="visible"/>
+                                      </p:to>
+                                    </p:set>
+                                  </p:childTnLst>
+                                </p:cTn>
+                              </p:par>
+                            </p:childTnLst>
+                          </p:cTn>
+                        </p:par>
+                      </p:childTnLst>
+                    </p:cTn>
+                  </p:par>
+                  <p:par>
+                    <p:cTn id="11" fill="hold">
+                      <p:stCondLst>
+                        <p:cond delay="indefinite"/>
+                      </p:stCondLst>
+                      <p:childTnLst>
+                        <p:par>
+                          <p:cTn id="12" fill="hold">
+                            <p:stCondLst>
+                              <p:cond delay="0"/>
+                            </p:stCondLst>
+                            <p:childTnLst>
+                              <p:par>
+                                <p:cTn id="13" presetID="1" presetClass="entr" presetSubtype="0" fill="hold" nodeType="clickEffect">
+                                  <p:stCondLst>
+                                    <p:cond delay="0"/>
+                                  </p:stCondLst>
+                                  <p:childTnLst>
+                                    <p:set>
+                                      <p:cBhvr>
+                                        <p:cTn id="14" dur="1" fill="hold">
+                                          <p:stCondLst>
+                                            <p:cond delay="0"/>
+                                          </p:stCondLst>
+                                        </p:cTn>
+                                        <p:tgtEl>
+                                          <p:spTgt spid="3">
+                                            <p:txEl>
+                                              <p:pRg st="2" end="2"/>
+                                            </p:txEl>
+                                          </p:spTgt>
+                                        </p:tgtEl>
+                                        <p:attrNameLst>
+                                          <p:attrName>style.visibility</p:attrName>
+                                        </p:attrNameLst>
+                                      </p:cBhvr>
+                                      <p:to>
+                                        <p:strVal val="visible"/>
+                                      </p:to>
+                                    </p:set>
+                                  </p:childTnLst>
+                                </p:cTn>
+                              </p:par>
+                            </p:childTnLst>
+                          </p:cTn>
+                        </p:par>
+                      </p:childTnLst>
+                    </p:cTn>
+                  </p:par>
+                  <p:par>
+                    <p:cTn id="15" fill="hold">
+                      <p:stCondLst>
+                        <p:cond delay="indefinite"/>
+                      </p:stCondLst>
+                      <p:childTnLst>
+                        <p:par>
+                          <p:cTn id="16" fill="hold">
+                            <p:stCondLst>
+                              <p:cond delay="0"/>
+                            </p:stCondLst>
+                            <p:childTnLst>
+                              <p:par>
+                                <p:cTn id="17" presetID="1" presetClass="entr" presetSubtype="0" fill="hold" nodeType="clickEffect">
+                                  <p:stCondLst>
+                                    <p:cond delay="0"/>
+                                  </p:stCondLst>
+                                  <p:childTnLst>
+                                    <p:set>
+                                      <p:cBhvr>
+                                        <p:cTn id="18" dur="1" fill="hold">
+                                          <p:stCondLst>
+                                            <p:cond delay="0"/>
+                                          </p:stCondLst>
+                                        </p:cTn>
+                                        <p:tgtEl>
+                                          <p:spTgt spid="3">
+                                            <p:txEl>
+                                              <p:pRg st="3" end="3"/>
+                                            </p:txEl>
+                                          </p:spTgt>
+                                        </p:tgtEl>
+                                        <p:attrNameLst>
+                                          <p:attrName>style.visibility</p:attrName>
+                                        </p:attrNameLst>
+                                      </p:cBhvr>
+                                      <p:to>
+                                        <p:strVal val="visible"/>
+                                      </p:to>
+                                    </p:set>
+                                  </p:childTnLst>
+                                </p:cTn>
+                              </p:par>
+                            </p:childTnLst>
+                          </p:cTn>
+                        </p:par>
+                      </p:childTnLst>
+                    </p:cTn>
+                  </p:par>
+                </p:childTnLst>
+              </p:cTn>
+              <p:prevCondLst>
+                <p:cond evt="onPrev" delay="0">
+                  <p:tgtEl>
+                    <p:sldTgt/>
+                  </p:tgtEl>
+                </p:cond>
+              </p:prevCondLst>
+              <p:nextCondLst>
+                <p:cond evt="onNext" delay="0">
+                  <p:tgtEl>
+                    <p:sldTgt/>
+                  </p:tgtEl>
+                </p:cond>
+              </p:nextCondLst>
+            </p:seq>
+          </p:childTnLst>
+        </p:cTn>
+      </p:par>
+    </p:tnLst>
+  </p:timing>
+</p:sld>
+</file>
+
+<file path=ppt/slides/slide3.xml><?xml version="1.0" encoding="utf-8"?>
+<p:sld xmlns:a="http://schemas.openxmlformats.org/drawingml/2006/main" xmlns:r="http://schemas.openxmlformats.org/officeDocument/2006/relationships" xmlns:p="http://schemas.openxmlformats.org/presentationml/2006/main">
+  <p:cSld>
+    <p:spTree>
+      <p:nvGrpSpPr>
+        <p:cNvPr id="1" name=""/>
+        <p:cNvGrpSpPr/>
+        <p:nvPr/>
+      </p:nvGrpSpPr>
+      <p:grpSpPr>
+        <a:xfrm>
+          <a:off x="0" y="0"/>
+          <a:ext cx="0" cy="0"/>
+          <a:chOff x="0" y="0"/>
+          <a:chExt cx="0" cy="0"/>
+        </a:xfrm>
+      </p:grpSpPr>
+      <p:sp>
+        <p:nvSpPr>
+          <p:cNvPr id="2" name="Title 1"/>
+          <p:cNvSpPr>
+            <a:spLocks noGrp="1"/>
+          </p:cNvSpPr>
+          <p:nvPr>
+            <p:ph type="title"/>
+          </p:nvPr>
+        </p:nvSpPr>
+        <p:spPr/>
+        <p:txBody>
+          <a:bodyPr/>
+          <a:lstStyle/>
+          <a:p>
+            <a:r>
+              <a:rPr lang="en-US" dirty="0" smtClean="0"/>
+              <a:t>Contents</a:t>
+            </a:r>
+            <a:endParaRPr lang="en-US" dirty="0"/>
+          </a:p>
+        </p:txBody>
+      </p:sp>
+      <p:sp>
+        <p:nvSpPr>
+          <p:cNvPr id="3" name="Content Placeholder 2"/>
+          <p:cNvSpPr>
+            <a:spLocks noGrp="1"/>
+          </p:cNvSpPr>
+          <p:nvPr>
+            <p:ph idx="1"/>
+          </p:nvPr>
+        </p:nvSpPr>
+        <p:spPr/>
+        <p:txBody>
+          <a:bodyPr>
+            <a:normAutofit/>
+          </a:bodyPr>
+          <a:lstStyle/>
+          <a:p>
+            <a:r>
+              <a:rPr lang="en-US" sz="2800" dirty="0" smtClean="0"/>
+              <a:t>Insights</a:t>
+            </a:r>
+          </a:p>
+          <a:p>
+            <a:r>
+              <a:rPr lang="en-US" sz="2800" dirty="0" smtClean="0"/>
+              <a:t>Approach</a:t>
+            </a:r>
+          </a:p>
+          <a:p>
+            <a:r>
+              <a:rPr lang="en-US" sz="2800" dirty="0" smtClean="0"/>
+              <a:t>Example</a:t>
+            </a:r>
+            <a:endParaRPr lang="en-US" sz="2800" dirty="0"/>
+          </a:p>
+          <a:p>
+            <a:r>
+              <a:rPr lang="en-US" sz="2800" dirty="0" smtClean="0"/>
+              <a:t>Proof of Concept</a:t>
+            </a:r>
+          </a:p>
+          <a:p>
+            <a:r>
+              <a:rPr lang="en-US" sz="2800" dirty="0" err="1" smtClean="0"/>
+              <a:t>Musiplectics</a:t>
+            </a:r>
+            <a:r>
+              <a:rPr lang="en-US" sz="2800" dirty="0" smtClean="0"/>
+              <a:t> in Action</a:t>
+            </a:r>
+          </a:p>
+          <a:p>
+            <a:r>
+              <a:rPr lang="en-US" sz="2800" dirty="0" smtClean="0"/>
+              <a:t>Future Work</a:t>
+            </a:r>
+          </a:p>
+          <a:p>
+            <a:r>
+              <a:rPr lang="en-US" sz="2800" dirty="0" smtClean="0"/>
+              <a:t>Thesis Contributions</a:t>
+            </a:r>
+          </a:p>
+          <a:p>
+            <a:endParaRPr lang="en-US" dirty="0"/>
+          </a:p>
+        </p:txBody>
+      </p:sp>
+    </p:spTree>
+    <p:extLst>
+      <p:ext uri="{BB962C8B-B14F-4D97-AF65-F5344CB8AC3E}">
+        <p14:creationId xmlns:p14="http://schemas.microsoft.com/office/powerpoint/2010/main" val="1705346336"/>
+      </p:ext>
+    </p:extLst>
+  </p:cSld>
+  <p:clrMapOvr>
+    <a:masterClrMapping/>
+  </p:clrMapOvr>
+  <p:timing>
+    <p:tnLst>
+      <p:par>
+        <p:cTn xmlns:p14="http://schemas.microsoft.com/office/powerpoint/2010/main" id="1" dur="indefinite" restart="never" nodeType="tmRoot"/>
+      </p:par>
+    </p:tnLst>
+  </p:timing>
+</p:sld>
+</file>
+
+<file path=ppt/slides/slide30.xml><?xml version="1.0" encoding="utf-8"?>
+<p:sld xmlns:a="http://schemas.openxmlformats.org/drawingml/2006/main" xmlns:r="http://schemas.openxmlformats.org/officeDocument/2006/relationships" xmlns:p="http://schemas.openxmlformats.org/presentationml/2006/main">
+  <p:cSld>
+    <p:spTree>
+      <p:nvGrpSpPr>
+        <p:cNvPr id="1" name=""/>
+        <p:cNvGrpSpPr/>
+        <p:nvPr/>
+      </p:nvGrpSpPr>
+      <p:grpSpPr>
+        <a:xfrm>
+          <a:off x="0" y="0"/>
+          <a:ext cx="0" cy="0"/>
+          <a:chOff x="0" y="0"/>
+          <a:chExt cx="0" cy="0"/>
+        </a:xfrm>
+      </p:grpSpPr>
+      <p:sp>
+        <p:nvSpPr>
+          <p:cNvPr id="2" name="Title 1"/>
+          <p:cNvSpPr>
+            <a:spLocks noGrp="1"/>
+          </p:cNvSpPr>
+          <p:nvPr>
+            <p:ph type="title"/>
+          </p:nvPr>
+        </p:nvSpPr>
+        <p:spPr/>
+        <p:txBody>
+          <a:bodyPr/>
+          <a:lstStyle/>
+          <a:p>
+            <a:r>
+              <a:rPr lang="en-US" dirty="0" smtClean="0"/>
+              <a:t>Proof of Concept</a:t>
+            </a:r>
+            <a:endParaRPr lang="en-US" dirty="0"/>
+          </a:p>
+        </p:txBody>
+      </p:sp>
+      <p:sp>
+        <p:nvSpPr>
+          <p:cNvPr id="3" name="Content Placeholder 2"/>
+          <p:cNvSpPr>
+            <a:spLocks noGrp="1"/>
+          </p:cNvSpPr>
+          <p:nvPr>
+            <p:ph idx="1"/>
+          </p:nvPr>
+        </p:nvSpPr>
         <p:spPr/>
         <p:txBody>
           <a:bodyPr/>
@@ -11148,7 +11974,7 @@
 </p:sld>
 </file>
 
-<file path=ppt/slides/slide27.xml><?xml version="1.0" encoding="utf-8"?>
+<file path=ppt/slides/slide31.xml><?xml version="1.0" encoding="utf-8"?>
 <p:sld xmlns:a="http://schemas.openxmlformats.org/drawingml/2006/main" xmlns:r="http://schemas.openxmlformats.org/officeDocument/2006/relationships" xmlns:p="http://schemas.openxmlformats.org/presentationml/2006/main">
   <p:cSld>
     <p:spTree>
@@ -11238,7 +12064,7 @@
 </p:sld>
 </file>
 
-<file path=ppt/slides/slide28.xml><?xml version="1.0" encoding="utf-8"?>
+<file path=ppt/slides/slide32.xml><?xml version="1.0" encoding="utf-8"?>
 <p:sld xmlns:a="http://schemas.openxmlformats.org/drawingml/2006/main" xmlns:r="http://schemas.openxmlformats.org/officeDocument/2006/relationships" xmlns:p="http://schemas.openxmlformats.org/presentationml/2006/main">
   <p:cSld>
     <p:spTree>
@@ -11320,7 +12146,7 @@
 </p:sld>
 </file>
 
-<file path=ppt/slides/slide29.xml><?xml version="1.0" encoding="utf-8"?>
+<file path=ppt/slides/slide33.xml><?xml version="1.0" encoding="utf-8"?>
 <p:sld xmlns:a="http://schemas.openxmlformats.org/drawingml/2006/main" xmlns:r="http://schemas.openxmlformats.org/officeDocument/2006/relationships" xmlns:p="http://schemas.openxmlformats.org/presentationml/2006/main">
   <p:cSld>
     <p:spTree>
@@ -11403,7 +12229,7 @@
 </p:sld>
 </file>
 
-<file path=ppt/slides/slide3.xml><?xml version="1.0" encoding="utf-8"?>
+<file path=ppt/slides/slide34.xml><?xml version="1.0" encoding="utf-8"?>
 <p:sld xmlns:a="http://schemas.openxmlformats.org/drawingml/2006/main" xmlns:r="http://schemas.openxmlformats.org/officeDocument/2006/relationships" xmlns:p="http://schemas.openxmlformats.org/presentationml/2006/main">
   <p:cSld>
     <p:spTree>
@@ -11436,134 +12262,6 @@
           <a:lstStyle/>
           <a:p>
             <a:r>
-              <a:rPr lang="en-US" dirty="0" smtClean="0"/>
-              <a:t>Contents</a:t>
-            </a:r>
-            <a:endParaRPr lang="en-US" dirty="0"/>
-          </a:p>
-        </p:txBody>
-      </p:sp>
-      <p:sp>
-        <p:nvSpPr>
-          <p:cNvPr id="3" name="Content Placeholder 2"/>
-          <p:cNvSpPr>
-            <a:spLocks noGrp="1"/>
-          </p:cNvSpPr>
-          <p:nvPr>
-            <p:ph idx="1"/>
-          </p:nvPr>
-        </p:nvSpPr>
-        <p:spPr/>
-        <p:txBody>
-          <a:bodyPr>
-            <a:normAutofit/>
-          </a:bodyPr>
-          <a:lstStyle/>
-          <a:p>
-            <a:r>
-              <a:rPr lang="en-US" sz="2800" dirty="0" smtClean="0"/>
-              <a:t>Insights</a:t>
-            </a:r>
-          </a:p>
-          <a:p>
-            <a:r>
-              <a:rPr lang="en-US" sz="2800" dirty="0" smtClean="0"/>
-              <a:t>Approach</a:t>
-            </a:r>
-          </a:p>
-          <a:p>
-            <a:r>
-              <a:rPr lang="en-US" sz="2800" dirty="0" smtClean="0"/>
-              <a:t>Example</a:t>
-            </a:r>
-            <a:endParaRPr lang="en-US" sz="2800" dirty="0"/>
-          </a:p>
-          <a:p>
-            <a:r>
-              <a:rPr lang="en-US" sz="2800" dirty="0" smtClean="0"/>
-              <a:t>Proof of Concept</a:t>
-            </a:r>
-          </a:p>
-          <a:p>
-            <a:r>
-              <a:rPr lang="en-US" sz="2800" dirty="0" err="1" smtClean="0"/>
-              <a:t>Musiplectics</a:t>
-            </a:r>
-            <a:r>
-              <a:rPr lang="en-US" sz="2800" dirty="0" smtClean="0"/>
-              <a:t> in Action</a:t>
-            </a:r>
-          </a:p>
-          <a:p>
-            <a:r>
-              <a:rPr lang="en-US" sz="2800" dirty="0" smtClean="0"/>
-              <a:t>Future Work</a:t>
-            </a:r>
-          </a:p>
-          <a:p>
-            <a:r>
-              <a:rPr lang="en-US" sz="2800" dirty="0" smtClean="0"/>
-              <a:t>Thesis Contributions</a:t>
-            </a:r>
-          </a:p>
-          <a:p>
-            <a:endParaRPr lang="en-US" dirty="0"/>
-          </a:p>
-        </p:txBody>
-      </p:sp>
-    </p:spTree>
-    <p:extLst>
-      <p:ext uri="{BB962C8B-B14F-4D97-AF65-F5344CB8AC3E}">
-        <p14:creationId xmlns:p14="http://schemas.microsoft.com/office/powerpoint/2010/main" val="1705346336"/>
-      </p:ext>
-    </p:extLst>
-  </p:cSld>
-  <p:clrMapOvr>
-    <a:masterClrMapping/>
-  </p:clrMapOvr>
-  <p:timing>
-    <p:tnLst>
-      <p:par>
-        <p:cTn xmlns:p14="http://schemas.microsoft.com/office/powerpoint/2010/main" id="1" dur="indefinite" restart="never" nodeType="tmRoot"/>
-      </p:par>
-    </p:tnLst>
-  </p:timing>
-</p:sld>
-</file>
-
-<file path=ppt/slides/slide30.xml><?xml version="1.0" encoding="utf-8"?>
-<p:sld xmlns:a="http://schemas.openxmlformats.org/drawingml/2006/main" xmlns:r="http://schemas.openxmlformats.org/officeDocument/2006/relationships" xmlns:p="http://schemas.openxmlformats.org/presentationml/2006/main">
-  <p:cSld>
-    <p:spTree>
-      <p:nvGrpSpPr>
-        <p:cNvPr id="1" name=""/>
-        <p:cNvGrpSpPr/>
-        <p:nvPr/>
-      </p:nvGrpSpPr>
-      <p:grpSpPr>
-        <a:xfrm>
-          <a:off x="0" y="0"/>
-          <a:ext cx="0" cy="0"/>
-          <a:chOff x="0" y="0"/>
-          <a:chExt cx="0" cy="0"/>
-        </a:xfrm>
-      </p:grpSpPr>
-      <p:sp>
-        <p:nvSpPr>
-          <p:cNvPr id="2" name="Title 1"/>
-          <p:cNvSpPr>
-            <a:spLocks noGrp="1"/>
-          </p:cNvSpPr>
-          <p:nvPr>
-            <p:ph type="title"/>
-          </p:nvPr>
-        </p:nvSpPr>
-        <p:spPr/>
-        <p:txBody>
-          <a:bodyPr/>
-          <a:lstStyle/>
-          <a:p>
-            <a:r>
               <a:rPr lang="en-US" dirty="0" err="1"/>
               <a:t>Musiplectics</a:t>
             </a:r>
@@ -11656,7 +12354,7 @@
 </p:sld>
 </file>
 
-<file path=ppt/slides/slide31.xml><?xml version="1.0" encoding="utf-8"?>
+<file path=ppt/slides/slide35.xml><?xml version="1.0" encoding="utf-8"?>
 <p:sld xmlns:a="http://schemas.openxmlformats.org/drawingml/2006/main" xmlns:r="http://schemas.openxmlformats.org/officeDocument/2006/relationships" xmlns:p="http://schemas.openxmlformats.org/presentationml/2006/main">
   <p:cSld>
     <p:spTree>
@@ -11828,7 +12526,7 @@
 </p:sld>
 </file>
 
-<file path=ppt/slides/slide32.xml><?xml version="1.0" encoding="utf-8"?>
+<file path=ppt/slides/slide36.xml><?xml version="1.0" encoding="utf-8"?>
 <p:sld xmlns:a="http://schemas.openxmlformats.org/drawingml/2006/main" xmlns:r="http://schemas.openxmlformats.org/officeDocument/2006/relationships" xmlns:p="http://schemas.openxmlformats.org/presentationml/2006/main">
   <p:cSld>
     <p:spTree>
@@ -12011,7 +12709,7 @@
 </p:sld>
 </file>
 
-<file path=ppt/slides/slide33.xml><?xml version="1.0" encoding="utf-8"?>
+<file path=ppt/slides/slide37.xml><?xml version="1.0" encoding="utf-8"?>
 <p:sld xmlns:a="http://schemas.openxmlformats.org/drawingml/2006/main" xmlns:r="http://schemas.openxmlformats.org/officeDocument/2006/relationships" xmlns:p="http://schemas.openxmlformats.org/presentationml/2006/main">
   <p:cSld>
     <p:spTree>
@@ -12161,7 +12859,7 @@
 </p:sld>
 </file>
 
-<file path=ppt/slides/slide34.xml><?xml version="1.0" encoding="utf-8"?>
+<file path=ppt/slides/slide38.xml><?xml version="1.0" encoding="utf-8"?>
 <p:sld xmlns:a="http://schemas.openxmlformats.org/drawingml/2006/main" xmlns:r="http://schemas.openxmlformats.org/officeDocument/2006/relationships" xmlns:p="http://schemas.openxmlformats.org/presentationml/2006/main">
   <p:cSld>
     <p:spTree>
@@ -12293,7 +12991,7 @@
 </p:sld>
 </file>
 
-<file path=ppt/slides/slide35.xml><?xml version="1.0" encoding="utf-8"?>
+<file path=ppt/slides/slide39.xml><?xml version="1.0" encoding="utf-8"?>
 <p:sld xmlns:a="http://schemas.openxmlformats.org/drawingml/2006/main" xmlns:r="http://schemas.openxmlformats.org/officeDocument/2006/relationships" xmlns:p="http://schemas.openxmlformats.org/presentationml/2006/main">
   <p:cSld>
     <p:spTree>
@@ -12387,7 +13085,7 @@
 </p:sld>
 </file>
 
-<file path=ppt/slides/slide36.xml><?xml version="1.0" encoding="utf-8"?>
+<file path=ppt/slides/slide4.xml><?xml version="1.0" encoding="utf-8"?>
 <p:sld xmlns:a="http://schemas.openxmlformats.org/drawingml/2006/main" xmlns:r="http://schemas.openxmlformats.org/officeDocument/2006/relationships" xmlns:p="http://schemas.openxmlformats.org/presentationml/2006/main">
   <p:cSld>
     <p:spTree>
@@ -12421,6 +13119,503 @@
           <a:p>
             <a:r>
               <a:rPr lang="en-US" dirty="0" smtClean="0"/>
+              <a:t>Insights</a:t>
+            </a:r>
+            <a:endParaRPr lang="en-US" dirty="0"/>
+          </a:p>
+        </p:txBody>
+      </p:sp>
+      <p:sp>
+        <p:nvSpPr>
+          <p:cNvPr id="3" name="Content Placeholder 2"/>
+          <p:cNvSpPr>
+            <a:spLocks noGrp="1"/>
+          </p:cNvSpPr>
+          <p:nvPr>
+            <p:ph idx="1"/>
+          </p:nvPr>
+        </p:nvSpPr>
+        <p:spPr>
+          <a:xfrm>
+            <a:off x="749281" y="1888787"/>
+            <a:ext cx="4184027" cy="4087906"/>
+          </a:xfrm>
+        </p:spPr>
+        <p:txBody>
+          <a:bodyPr>
+            <a:normAutofit/>
+          </a:bodyPr>
+          <a:lstStyle/>
+          <a:p>
+            <a:endParaRPr lang="en-US" dirty="0" smtClean="0"/>
+          </a:p>
+          <a:p>
+            <a:r>
+              <a:rPr lang="en-US" dirty="0" smtClean="0"/>
+              <a:t>Musicians are a contentious and cantankerous bunch (i.e. two musicians, three opinions).</a:t>
+            </a:r>
+          </a:p>
+          <a:p>
+            <a:r>
+              <a:rPr lang="en-US" dirty="0" smtClean="0"/>
+              <a:t>But, all can agree different notes pose different difficulties on wind instruments.</a:t>
+            </a:r>
+          </a:p>
+          <a:p>
+            <a:r>
+              <a:rPr lang="en-US" dirty="0" smtClean="0"/>
+              <a:t>However, they may disagree on the magnitude of the differences.</a:t>
+            </a:r>
+            <a:endParaRPr lang="en-US" dirty="0"/>
+          </a:p>
+        </p:txBody>
+      </p:sp>
+      <p:pic>
+        <p:nvPicPr>
+          <p:cNvPr id="4" name="Picture 3"/>
+          <p:cNvPicPr>
+            <a:picLocks noChangeAspect="1"/>
+          </p:cNvPicPr>
+          <p:nvPr/>
+        </p:nvPicPr>
+        <p:blipFill>
+          <a:blip r:embed="rId3"/>
+          <a:stretch>
+            <a:fillRect/>
+          </a:stretch>
+        </p:blipFill>
+        <p:spPr>
+          <a:xfrm>
+            <a:off x="4923802" y="2380080"/>
+            <a:ext cx="3343552" cy="2223605"/>
+          </a:xfrm>
+          <a:prstGeom prst="rect">
+            <a:avLst/>
+          </a:prstGeom>
+        </p:spPr>
+      </p:pic>
+      <p:sp>
+        <p:nvSpPr>
+          <p:cNvPr id="5" name="TextBox 4"/>
+          <p:cNvSpPr txBox="1"/>
+          <p:nvPr/>
+        </p:nvSpPr>
+        <p:spPr>
+          <a:xfrm>
+            <a:off x="8366760" y="4255994"/>
+            <a:ext cx="377544" cy="253916"/>
+          </a:xfrm>
+          <a:prstGeom prst="rect">
+            <a:avLst/>
+          </a:prstGeom>
+          <a:noFill/>
+        </p:spPr>
+        <p:txBody>
+          <a:bodyPr wrap="square" rtlCol="0">
+            <a:spAutoFit/>
+          </a:bodyPr>
+          <a:lstStyle/>
+          <a:p>
+            <a:r>
+              <a:rPr lang="en-US" sz="1050" dirty="0" smtClean="0"/>
+              <a:t>[1]</a:t>
+            </a:r>
+            <a:endParaRPr lang="en-US" sz="1050" dirty="0"/>
+          </a:p>
+        </p:txBody>
+      </p:sp>
+      <p:sp>
+        <p:nvSpPr>
+          <p:cNvPr id="7" name="Content Placeholder 2"/>
+          <p:cNvSpPr txBox="1">
+            <a:spLocks/>
+          </p:cNvSpPr>
+          <p:nvPr/>
+        </p:nvSpPr>
+        <p:spPr>
+          <a:xfrm>
+            <a:off x="5609102" y="4839237"/>
+            <a:ext cx="2350495" cy="1792311"/>
+          </a:xfrm>
+          <a:prstGeom prst="rect">
+            <a:avLst/>
+          </a:prstGeom>
+        </p:spPr>
+        <p:txBody>
+          <a:bodyPr vert="horz" lIns="91440" tIns="45720" rIns="91440" bIns="45720" rtlCol="0">
+            <a:normAutofit fontScale="70000" lnSpcReduction="20000"/>
+          </a:bodyPr>
+          <a:lstStyle>
+            <a:lvl1pPr marL="342900" indent="-342900" algn="l" defTabSz="914400" rtl="0" eaLnBrk="1" latinLnBrk="0" hangingPunct="1">
+              <a:spcBef>
+                <a:spcPts val="2000"/>
+              </a:spcBef>
+              <a:buClr>
+                <a:schemeClr val="accent1"/>
+              </a:buClr>
+              <a:buSzPct val="90000"/>
+              <a:buFont typeface="Wingdings" pitchFamily="2" charset="2"/>
+              <a:buChar char="S"/>
+              <a:defRPr sz="2200" kern="1200">
+                <a:solidFill>
+                  <a:schemeClr val="tx1">
+                    <a:lumMod val="65000"/>
+                    <a:lumOff val="35000"/>
+                  </a:schemeClr>
+                </a:solidFill>
+                <a:latin typeface="+mn-lt"/>
+                <a:ea typeface="+mn-ea"/>
+                <a:cs typeface="+mn-cs"/>
+              </a:defRPr>
+            </a:lvl1pPr>
+            <a:lvl2pPr marL="685800" indent="-336550" algn="l" defTabSz="914400" rtl="0" eaLnBrk="1" latinLnBrk="0" hangingPunct="1">
+              <a:spcBef>
+                <a:spcPts val="600"/>
+              </a:spcBef>
+              <a:buClr>
+                <a:schemeClr val="accent1">
+                  <a:lumMod val="60000"/>
+                  <a:lumOff val="40000"/>
+                </a:schemeClr>
+              </a:buClr>
+              <a:buSzPct val="90000"/>
+              <a:buFont typeface="Wingdings" pitchFamily="2" charset="2"/>
+              <a:buChar char="S"/>
+              <a:defRPr sz="2000" kern="1200">
+                <a:solidFill>
+                  <a:schemeClr val="tx1">
+                    <a:lumMod val="65000"/>
+                    <a:lumOff val="35000"/>
+                  </a:schemeClr>
+                </a:solidFill>
+                <a:latin typeface="+mn-lt"/>
+                <a:ea typeface="+mn-ea"/>
+                <a:cs typeface="+mn-cs"/>
+              </a:defRPr>
+            </a:lvl2pPr>
+            <a:lvl3pPr marL="1035050" indent="-349250" algn="l" defTabSz="914400" rtl="0" eaLnBrk="1" latinLnBrk="0" hangingPunct="1">
+              <a:spcBef>
+                <a:spcPts val="600"/>
+              </a:spcBef>
+              <a:buClr>
+                <a:schemeClr val="accent1"/>
+              </a:buClr>
+              <a:buSzPct val="90000"/>
+              <a:buFont typeface="Wingdings" pitchFamily="2" charset="2"/>
+              <a:buChar char="S"/>
+              <a:defRPr sz="1800" kern="1200">
+                <a:solidFill>
+                  <a:schemeClr val="tx1">
+                    <a:lumMod val="65000"/>
+                    <a:lumOff val="35000"/>
+                  </a:schemeClr>
+                </a:solidFill>
+                <a:latin typeface="+mn-lt"/>
+                <a:ea typeface="+mn-ea"/>
+                <a:cs typeface="+mn-cs"/>
+              </a:defRPr>
+            </a:lvl3pPr>
+            <a:lvl4pPr marL="1371600" indent="-336550" algn="l" defTabSz="914400" rtl="0" eaLnBrk="1" latinLnBrk="0" hangingPunct="1">
+              <a:spcBef>
+                <a:spcPts val="600"/>
+              </a:spcBef>
+              <a:buClr>
+                <a:schemeClr val="accent1">
+                  <a:lumMod val="60000"/>
+                  <a:lumOff val="40000"/>
+                </a:schemeClr>
+              </a:buClr>
+              <a:buSzPct val="90000"/>
+              <a:buFont typeface="Wingdings" pitchFamily="2" charset="2"/>
+              <a:buChar char="S"/>
+              <a:defRPr sz="1800" kern="1200">
+                <a:solidFill>
+                  <a:schemeClr val="tx1">
+                    <a:lumMod val="65000"/>
+                    <a:lumOff val="35000"/>
+                  </a:schemeClr>
+                </a:solidFill>
+                <a:latin typeface="+mn-lt"/>
+                <a:ea typeface="+mn-ea"/>
+                <a:cs typeface="+mn-cs"/>
+              </a:defRPr>
+            </a:lvl4pPr>
+            <a:lvl5pPr marL="1720850" indent="-349250" algn="l" defTabSz="914400" rtl="0" eaLnBrk="1" latinLnBrk="0" hangingPunct="1">
+              <a:spcBef>
+                <a:spcPts val="600"/>
+              </a:spcBef>
+              <a:buClr>
+                <a:schemeClr val="accent1"/>
+              </a:buClr>
+              <a:buSzPct val="90000"/>
+              <a:buFont typeface="Wingdings" pitchFamily="2" charset="2"/>
+              <a:buChar char="S"/>
+              <a:defRPr sz="1800" kern="1200">
+                <a:solidFill>
+                  <a:schemeClr val="tx1">
+                    <a:lumMod val="65000"/>
+                    <a:lumOff val="35000"/>
+                  </a:schemeClr>
+                </a:solidFill>
+                <a:latin typeface="+mn-lt"/>
+                <a:ea typeface="+mn-ea"/>
+                <a:cs typeface="+mn-cs"/>
+              </a:defRPr>
+            </a:lvl5pPr>
+            <a:lvl6pPr marL="2055813" indent="-344488" algn="l" defTabSz="914400" rtl="0" eaLnBrk="1" latinLnBrk="0" hangingPunct="1">
+              <a:spcBef>
+                <a:spcPct val="20000"/>
+              </a:spcBef>
+              <a:buClr>
+                <a:schemeClr val="accent1">
+                  <a:lumMod val="60000"/>
+                  <a:lumOff val="40000"/>
+                </a:schemeClr>
+              </a:buClr>
+              <a:buSzPct val="90000"/>
+              <a:buFont typeface="Wingdings" pitchFamily="2" charset="2"/>
+              <a:buChar char=""/>
+              <a:defRPr lang="en-US" sz="1800" kern="1200" dirty="0" smtClean="0">
+                <a:solidFill>
+                  <a:schemeClr val="tx1">
+                    <a:lumMod val="65000"/>
+                    <a:lumOff val="35000"/>
+                  </a:schemeClr>
+                </a:solidFill>
+                <a:latin typeface="+mn-lt"/>
+                <a:ea typeface="+mn-ea"/>
+                <a:cs typeface="+mn-cs"/>
+              </a:defRPr>
+            </a:lvl6pPr>
+            <a:lvl7pPr marL="2398713" indent="-344488" algn="l" defTabSz="914400" rtl="0" eaLnBrk="1" latinLnBrk="0" hangingPunct="1">
+              <a:spcBef>
+                <a:spcPct val="20000"/>
+              </a:spcBef>
+              <a:buClr>
+                <a:schemeClr val="accent1"/>
+              </a:buClr>
+              <a:buSzPct val="90000"/>
+              <a:buFont typeface="Wingdings" pitchFamily="2" charset="2"/>
+              <a:buChar char=""/>
+              <a:defRPr lang="en-US" sz="1800" kern="1200" dirty="0" smtClean="0">
+                <a:solidFill>
+                  <a:schemeClr val="tx1">
+                    <a:lumMod val="65000"/>
+                    <a:lumOff val="35000"/>
+                  </a:schemeClr>
+                </a:solidFill>
+                <a:latin typeface="+mn-lt"/>
+                <a:ea typeface="+mn-ea"/>
+                <a:cs typeface="+mn-cs"/>
+              </a:defRPr>
+            </a:lvl7pPr>
+            <a:lvl8pPr marL="2743200" indent="-344488" algn="l" defTabSz="914400" rtl="0" eaLnBrk="1" latinLnBrk="0" hangingPunct="1">
+              <a:spcBef>
+                <a:spcPct val="20000"/>
+              </a:spcBef>
+              <a:buClr>
+                <a:schemeClr val="accent1">
+                  <a:lumMod val="60000"/>
+                  <a:lumOff val="40000"/>
+                </a:schemeClr>
+              </a:buClr>
+              <a:buSzPct val="90000"/>
+              <a:buFont typeface="Wingdings" pitchFamily="2" charset="2"/>
+              <a:buChar char=""/>
+              <a:defRPr lang="en-US" sz="1800" kern="1200" dirty="0" smtClean="0">
+                <a:solidFill>
+                  <a:schemeClr val="tx1">
+                    <a:lumMod val="65000"/>
+                    <a:lumOff val="35000"/>
+                  </a:schemeClr>
+                </a:solidFill>
+                <a:latin typeface="+mn-lt"/>
+                <a:ea typeface="+mn-ea"/>
+                <a:cs typeface="+mn-cs"/>
+              </a:defRPr>
+            </a:lvl8pPr>
+            <a:lvl9pPr marL="3087688" indent="-344488" algn="l" defTabSz="914400" rtl="0" eaLnBrk="1" latinLnBrk="0" hangingPunct="1">
+              <a:spcBef>
+                <a:spcPct val="20000"/>
+              </a:spcBef>
+              <a:buClr>
+                <a:schemeClr val="accent1"/>
+              </a:buClr>
+              <a:buSzPct val="90000"/>
+              <a:buFont typeface="Wingdings" pitchFamily="2" charset="2"/>
+              <a:buChar char=""/>
+              <a:defRPr lang="en-US" sz="1800" kern="1200" dirty="0">
+                <a:solidFill>
+                  <a:schemeClr val="tx1">
+                    <a:lumMod val="65000"/>
+                    <a:lumOff val="35000"/>
+                  </a:schemeClr>
+                </a:solidFill>
+                <a:latin typeface="+mn-lt"/>
+                <a:ea typeface="+mn-ea"/>
+                <a:cs typeface="+mn-cs"/>
+              </a:defRPr>
+            </a:lvl9pPr>
+          </a:lstStyle>
+          <a:p>
+            <a:pPr marL="0" indent="0" algn="ctr">
+              <a:buFont typeface="Wingdings" pitchFamily="2" charset="2"/>
+              <a:buNone/>
+            </a:pPr>
+            <a:endParaRPr lang="en-US" dirty="0" smtClean="0"/>
+          </a:p>
+          <a:p>
+            <a:pPr marL="0" indent="0" algn="ctr">
+              <a:buFont typeface="Wingdings" pitchFamily="2" charset="2"/>
+              <a:buNone/>
+            </a:pPr>
+            <a:r>
+              <a:rPr lang="en-US" sz="13800" dirty="0" smtClean="0"/>
+              <a:t>?</a:t>
+            </a:r>
+            <a:endParaRPr lang="en-US" sz="13800" dirty="0"/>
+          </a:p>
+        </p:txBody>
+      </p:sp>
+      <p:pic>
+        <p:nvPicPr>
+          <p:cNvPr id="8" name="Picture 7"/>
+          <p:cNvPicPr>
+            <a:picLocks noChangeAspect="1"/>
+          </p:cNvPicPr>
+          <p:nvPr/>
+        </p:nvPicPr>
+        <p:blipFill>
+          <a:blip r:embed="rId4">
+            <a:extLst>
+              <a:ext uri="{28A0092B-C50C-407E-A947-70E740481C1C}">
+                <a14:useLocalDpi xmlns:a14="http://schemas.microsoft.com/office/drawing/2010/main" val="0"/>
+              </a:ext>
+            </a:extLst>
+          </a:blip>
+          <a:stretch>
+            <a:fillRect/>
+          </a:stretch>
+        </p:blipFill>
+        <p:spPr>
+          <a:xfrm>
+            <a:off x="1400669" y="5374515"/>
+            <a:ext cx="5085856" cy="811162"/>
+          </a:xfrm>
+          <a:prstGeom prst="rect">
+            <a:avLst/>
+          </a:prstGeom>
+        </p:spPr>
+      </p:pic>
+      <p:sp>
+        <p:nvSpPr>
+          <p:cNvPr id="9" name="TextBox 8"/>
+          <p:cNvSpPr txBox="1"/>
+          <p:nvPr/>
+        </p:nvSpPr>
+        <p:spPr>
+          <a:xfrm>
+            <a:off x="2679074" y="5272264"/>
+            <a:ext cx="3748142" cy="1015663"/>
+          </a:xfrm>
+          <a:prstGeom prst="rect">
+            <a:avLst/>
+          </a:prstGeom>
+          <a:noFill/>
+        </p:spPr>
+        <p:txBody>
+          <a:bodyPr wrap="none" rtlCol="0">
+            <a:spAutoFit/>
+          </a:bodyPr>
+          <a:lstStyle/>
+          <a:p>
+            <a:r>
+              <a:rPr lang="en-US" sz="2000" b="1" dirty="0" smtClean="0">
+                <a:solidFill>
+                  <a:srgbClr val="FF0000"/>
+                </a:solidFill>
+              </a:rPr>
+              <a:t>                     2                 3                 4</a:t>
+            </a:r>
+          </a:p>
+          <a:p>
+            <a:endParaRPr lang="en-US" sz="2000" b="1" dirty="0">
+              <a:solidFill>
+                <a:srgbClr val="FF0000"/>
+              </a:solidFill>
+            </a:endParaRPr>
+          </a:p>
+          <a:p>
+            <a:r>
+              <a:rPr lang="en-US" sz="2000" b="1" dirty="0" smtClean="0">
+                <a:solidFill>
+                  <a:srgbClr val="FF0000"/>
+                </a:solidFill>
+              </a:rPr>
+              <a:t>             1                2                 1</a:t>
+            </a:r>
+            <a:endParaRPr lang="en-US" sz="2000" b="1" dirty="0">
+              <a:solidFill>
+                <a:srgbClr val="FF0000"/>
+              </a:solidFill>
+            </a:endParaRPr>
+          </a:p>
+        </p:txBody>
+      </p:sp>
+    </p:spTree>
+    <p:extLst>
+      <p:ext uri="{BB962C8B-B14F-4D97-AF65-F5344CB8AC3E}">
+        <p14:creationId xmlns:p14="http://schemas.microsoft.com/office/powerpoint/2010/main" val="4080678011"/>
+      </p:ext>
+    </p:extLst>
+  </p:cSld>
+  <p:clrMapOvr>
+    <a:masterClrMapping/>
+  </p:clrMapOvr>
+  <p:timing>
+    <p:tnLst>
+      <p:par>
+        <p:cTn xmlns:p14="http://schemas.microsoft.com/office/powerpoint/2010/main" id="1" dur="indefinite" restart="never" nodeType="tmRoot"/>
+      </p:par>
+    </p:tnLst>
+  </p:timing>
+</p:sld>
+</file>
+
+<file path=ppt/slides/slide40.xml><?xml version="1.0" encoding="utf-8"?>
+<p:sld xmlns:a="http://schemas.openxmlformats.org/drawingml/2006/main" xmlns:r="http://schemas.openxmlformats.org/officeDocument/2006/relationships" xmlns:p="http://schemas.openxmlformats.org/presentationml/2006/main">
+  <p:cSld>
+    <p:spTree>
+      <p:nvGrpSpPr>
+        <p:cNvPr id="1" name=""/>
+        <p:cNvGrpSpPr/>
+        <p:nvPr/>
+      </p:nvGrpSpPr>
+      <p:grpSpPr>
+        <a:xfrm>
+          <a:off x="0" y="0"/>
+          <a:ext cx="0" cy="0"/>
+          <a:chOff x="0" y="0"/>
+          <a:chExt cx="0" cy="0"/>
+        </a:xfrm>
+      </p:grpSpPr>
+      <p:sp>
+        <p:nvSpPr>
+          <p:cNvPr id="2" name="Title 1"/>
+          <p:cNvSpPr>
+            <a:spLocks noGrp="1"/>
+          </p:cNvSpPr>
+          <p:nvPr>
+            <p:ph type="title"/>
+          </p:nvPr>
+        </p:nvSpPr>
+        <p:spPr/>
+        <p:txBody>
+          <a:bodyPr/>
+          <a:lstStyle/>
+          <a:p>
+            <a:r>
+              <a:rPr lang="en-US" dirty="0" smtClean="0"/>
               <a:t>Images</a:t>
             </a:r>
             <a:endParaRPr lang="en-US" dirty="0"/>
@@ -12534,7 +13729,7 @@
 </p:sld>
 </file>
 
-<file path=ppt/slides/slide37.xml><?xml version="1.0" encoding="utf-8"?>
+<file path=ppt/slides/slide41.xml><?xml version="1.0" encoding="utf-8"?>
 <p:sld xmlns:a="http://schemas.openxmlformats.org/drawingml/2006/main" xmlns:r="http://schemas.openxmlformats.org/officeDocument/2006/relationships" xmlns:p="http://schemas.openxmlformats.org/presentationml/2006/main">
   <p:cSld>
     <p:spTree>
@@ -12710,7 +13905,7 @@
 </p:sld>
 </file>
 
-<file path=ppt/slides/slide38.xml><?xml version="1.0" encoding="utf-8"?>
+<file path=ppt/slides/slide42.xml><?xml version="1.0" encoding="utf-8"?>
 <p:sld xmlns:a="http://schemas.openxmlformats.org/drawingml/2006/main" xmlns:r="http://schemas.openxmlformats.org/officeDocument/2006/relationships" xmlns:p="http://schemas.openxmlformats.org/presentationml/2006/main">
   <p:cSld>
     <p:spTree>
@@ -12912,7 +14107,7 @@
 </p:sld>
 </file>
 
-<file path=ppt/slides/slide39.xml><?xml version="1.0" encoding="utf-8"?>
+<file path=ppt/slides/slide43.xml><?xml version="1.0" encoding="utf-8"?>
 <p:sld xmlns:a="http://schemas.openxmlformats.org/drawingml/2006/main" xmlns:r="http://schemas.openxmlformats.org/officeDocument/2006/relationships" xmlns:p="http://schemas.openxmlformats.org/presentationml/2006/main">
   <p:cSld>
     <p:spTree>
@@ -12944,7 +14139,11 @@
           <a:bodyPr/>
           <a:lstStyle/>
           <a:p>
-            <a:endParaRPr lang="en-US"/>
+            <a:r>
+              <a:rPr lang="en-US" dirty="0" smtClean="0"/>
+              <a:t>Related Work</a:t>
+            </a:r>
+            <a:endParaRPr lang="en-US" dirty="0"/>
           </a:p>
         </p:txBody>
       </p:sp>
@@ -12960,150 +14159,51 @@
         </p:nvSpPr>
         <p:spPr/>
         <p:txBody>
-          <a:bodyPr/>
-          <a:lstStyle/>
-          <a:p>
-            <a:endParaRPr lang="en-US"/>
-          </a:p>
-        </p:txBody>
-      </p:sp>
-      <p:sp>
-        <p:nvSpPr>
-          <p:cNvPr id="4" name="TextBox 3"/>
-          <p:cNvSpPr txBox="1"/>
-          <p:nvPr/>
-        </p:nvSpPr>
-        <p:spPr>
-          <a:xfrm>
-            <a:off x="1015322" y="3003961"/>
-            <a:ext cx="7576113" cy="2585323"/>
-          </a:xfrm>
-          <a:prstGeom prst="rect">
-            <a:avLst/>
-          </a:prstGeom>
-          <a:noFill/>
-        </p:spPr>
-        <p:txBody>
-          <a:bodyPr wrap="none" rtlCol="0">
-            <a:spAutoFit/>
+          <a:bodyPr>
+            <a:normAutofit/>
           </a:bodyPr>
           <a:lstStyle/>
           <a:p>
             <a:r>
-              <a:rPr lang="en-US" dirty="0" smtClean="0">
-                <a:solidFill>
-                  <a:schemeClr val="tx1">
-                    <a:lumMod val="65000"/>
-                    <a:lumOff val="35000"/>
-                  </a:schemeClr>
-                </a:solidFill>
-              </a:rPr>
-              <a:t>Note Total 	= Note Weights * All Multipliers 	= 69 * 1.75 		= 120.75</a:t>
-            </a:r>
-          </a:p>
-          <a:p>
-            <a:endParaRPr lang="en-US" dirty="0">
-              <a:solidFill>
-                <a:schemeClr val="tx1">
-                  <a:lumMod val="65000"/>
-                  <a:lumOff val="35000"/>
-                </a:schemeClr>
-              </a:solidFill>
-            </a:endParaRPr>
-          </a:p>
-          <a:p>
-            <a:r>
-              <a:rPr lang="en-US" dirty="0" smtClean="0">
-                <a:solidFill>
-                  <a:schemeClr val="tx1">
-                    <a:lumMod val="65000"/>
-                    <a:lumOff val="35000"/>
-                  </a:schemeClr>
-                </a:solidFill>
-              </a:rPr>
-              <a:t>Interval Total 	= Interval Weights * All Multipliers	= 148.5 * 1.75 		= 259.875</a:t>
-            </a:r>
-          </a:p>
-          <a:p>
-            <a:endParaRPr lang="en-US" dirty="0">
-              <a:solidFill>
-                <a:schemeClr val="tx1">
-                  <a:lumMod val="65000"/>
-                  <a:lumOff val="35000"/>
-                </a:schemeClr>
-              </a:solidFill>
-            </a:endParaRPr>
-          </a:p>
-          <a:p>
-            <a:r>
-              <a:rPr lang="en-US" dirty="0">
-                <a:solidFill>
-                  <a:schemeClr val="tx1">
-                    <a:lumMod val="65000"/>
-                    <a:lumOff val="35000"/>
-                  </a:schemeClr>
-                </a:solidFill>
-              </a:rPr>
-              <a:t>Total Score 	= Note Total + Interval </a:t>
-            </a:r>
-            <a:r>
-              <a:rPr lang="en-US" dirty="0" smtClean="0">
-                <a:solidFill>
-                  <a:schemeClr val="tx1">
-                    <a:lumMod val="65000"/>
-                    <a:lumOff val="35000"/>
-                  </a:schemeClr>
-                </a:solidFill>
-              </a:rPr>
-              <a:t>Total		= 120.75 + 259.875	= 380.625</a:t>
-            </a:r>
-          </a:p>
-          <a:p>
-            <a:endParaRPr lang="en-US" dirty="0">
-              <a:solidFill>
-                <a:schemeClr val="tx1">
-                  <a:lumMod val="65000"/>
-                  <a:lumOff val="35000"/>
-                </a:schemeClr>
-              </a:solidFill>
-            </a:endParaRPr>
-          </a:p>
-          <a:p>
-            <a:endParaRPr lang="en-US" dirty="0" smtClean="0">
-              <a:solidFill>
-                <a:schemeClr val="tx1">
-                  <a:lumMod val="65000"/>
-                  <a:lumOff val="35000"/>
-                </a:schemeClr>
-              </a:solidFill>
-            </a:endParaRPr>
-          </a:p>
-          <a:p>
-            <a:endParaRPr lang="en-US" dirty="0">
-              <a:solidFill>
-                <a:schemeClr val="tx1">
-                  <a:lumMod val="65000"/>
-                  <a:lumOff val="35000"/>
-                </a:schemeClr>
-              </a:solidFill>
-            </a:endParaRPr>
-          </a:p>
-          <a:p>
-            <a:endParaRPr lang="en-US" dirty="0" smtClean="0">
-              <a:solidFill>
-                <a:schemeClr val="tx1">
-                  <a:lumMod val="65000"/>
-                  <a:lumOff val="35000"/>
-                </a:schemeClr>
-              </a:solidFill>
-            </a:endParaRPr>
+              <a:rPr lang="en-US" sz="2800" dirty="0" smtClean="0"/>
+              <a:t>Complexity Analysis</a:t>
+            </a:r>
+          </a:p>
+          <a:p>
+            <a:pPr lvl="1"/>
+            <a:r>
+              <a:rPr lang="en-US" sz="2400" dirty="0" smtClean="0"/>
+              <a:t>Chiu2012 (just for piano) and Heijink2002 (just for guitar)</a:t>
+            </a:r>
+          </a:p>
+          <a:p>
+            <a:pPr lvl="1"/>
+            <a:r>
+              <a:rPr lang="en-US" sz="2400" dirty="0" smtClean="0"/>
+              <a:t>Liou2010 (L-system for trees on rhythm only)</a:t>
+            </a:r>
+          </a:p>
+          <a:p>
+            <a:pPr lvl="1"/>
+            <a:r>
+              <a:rPr lang="en-US" sz="2400" dirty="0" smtClean="0"/>
+              <a:t>VBODA and NYSSMA (state organizations manual rankings)</a:t>
+            </a:r>
+          </a:p>
+          <a:p>
+            <a:pPr lvl="1"/>
+            <a:r>
+              <a:rPr lang="en-US" sz="2400" dirty="0" smtClean="0"/>
+              <a:t>Madsen2006 and Streich2006 (listener complexity)</a:t>
+            </a:r>
+            <a:endParaRPr lang="en-US" dirty="0"/>
           </a:p>
         </p:txBody>
       </p:sp>
     </p:spTree>
     <p:extLst>
       <p:ext uri="{BB962C8B-B14F-4D97-AF65-F5344CB8AC3E}">
-        <p14:creationId xmlns:p14="http://schemas.microsoft.com/office/powerpoint/2010/main" val="1398949278"/>
+        <p14:creationId xmlns:p14="http://schemas.microsoft.com/office/powerpoint/2010/main" val="4131887759"/>
       </p:ext>
     </p:extLst>
   </p:cSld>
@@ -13113,7 +14213,7 @@
 </p:sld>
 </file>
 
-<file path=ppt/slides/slide4.xml><?xml version="1.0" encoding="utf-8"?>
+<file path=ppt/slides/slide44.xml><?xml version="1.0" encoding="utf-8"?>
 <p:sld xmlns:a="http://schemas.openxmlformats.org/drawingml/2006/main" xmlns:r="http://schemas.openxmlformats.org/officeDocument/2006/relationships" xmlns:p="http://schemas.openxmlformats.org/presentationml/2006/main">
   <p:cSld>
     <p:spTree>
@@ -13147,7 +14247,7 @@
           <a:p>
             <a:r>
               <a:rPr lang="en-US" dirty="0" smtClean="0"/>
-              <a:t>Insights</a:t>
+              <a:t>Related Work</a:t>
             </a:r>
             <a:endParaRPr lang="en-US" dirty="0"/>
           </a:p>
@@ -13163,75 +14263,205 @@
             <p:ph idx="1"/>
           </p:nvPr>
         </p:nvSpPr>
-        <p:spPr>
-          <a:xfrm>
-            <a:off x="749281" y="1888787"/>
-            <a:ext cx="4184027" cy="4087906"/>
-          </a:xfrm>
-        </p:spPr>
+        <p:spPr/>
         <p:txBody>
           <a:bodyPr>
             <a:normAutofit/>
           </a:bodyPr>
           <a:lstStyle/>
           <a:p>
-            <a:endParaRPr lang="en-US" dirty="0" smtClean="0"/>
-          </a:p>
+            <a:r>
+              <a:rPr lang="en-US" sz="2800" dirty="0" smtClean="0"/>
+              <a:t>Music Scan and Search</a:t>
+            </a:r>
+          </a:p>
+          <a:p>
+            <a:pPr lvl="1"/>
+            <a:r>
+              <a:rPr lang="en-US" sz="2400" dirty="0" smtClean="0"/>
+              <a:t>Byrd2001 shows why we need efficient means of searching for music which complexity scores can provide.</a:t>
+            </a:r>
+          </a:p>
+          <a:p>
+            <a:pPr lvl="1"/>
+            <a:r>
+              <a:rPr lang="en-US" sz="2400" dirty="0" smtClean="0"/>
+              <a:t>Allali2009 demonstrates how we can alter complexity by simplifying polyphonic music down to a monophonic equivalent.</a:t>
+            </a:r>
+            <a:endParaRPr lang="en-US" sz="2400" dirty="0"/>
+          </a:p>
+        </p:txBody>
+      </p:sp>
+    </p:spTree>
+    <p:extLst>
+      <p:ext uri="{BB962C8B-B14F-4D97-AF65-F5344CB8AC3E}">
+        <p14:creationId xmlns:p14="http://schemas.microsoft.com/office/powerpoint/2010/main" val="1441547652"/>
+      </p:ext>
+    </p:extLst>
+  </p:cSld>
+  <p:clrMapOvr>
+    <a:masterClrMapping/>
+  </p:clrMapOvr>
+</p:sld>
+</file>
+
+<file path=ppt/slides/slide45.xml><?xml version="1.0" encoding="utf-8"?>
+<p:sld xmlns:a="http://schemas.openxmlformats.org/drawingml/2006/main" xmlns:r="http://schemas.openxmlformats.org/officeDocument/2006/relationships" xmlns:p="http://schemas.openxmlformats.org/presentationml/2006/main">
+  <p:cSld>
+    <p:spTree>
+      <p:nvGrpSpPr>
+        <p:cNvPr id="1" name=""/>
+        <p:cNvGrpSpPr/>
+        <p:nvPr/>
+      </p:nvGrpSpPr>
+      <p:grpSpPr>
+        <a:xfrm>
+          <a:off x="0" y="0"/>
+          <a:ext cx="0" cy="0"/>
+          <a:chOff x="0" y="0"/>
+          <a:chExt cx="0" cy="0"/>
+        </a:xfrm>
+      </p:grpSpPr>
+      <p:sp>
+        <p:nvSpPr>
+          <p:cNvPr id="2" name="Title 1"/>
+          <p:cNvSpPr>
+            <a:spLocks noGrp="1"/>
+          </p:cNvSpPr>
+          <p:nvPr>
+            <p:ph type="title"/>
+          </p:nvPr>
+        </p:nvSpPr>
+        <p:spPr/>
+        <p:txBody>
+          <a:bodyPr/>
+          <a:lstStyle/>
           <a:p>
             <a:r>
               <a:rPr lang="en-US" dirty="0" smtClean="0"/>
-              <a:t>Musicians are a contentious and cantankerous bunch (i.e. two musicians, three opinions).</a:t>
-            </a:r>
-          </a:p>
-          <a:p>
-            <a:r>
-              <a:rPr lang="en-US" dirty="0" smtClean="0"/>
-              <a:t>But, all can agree different notes pose different difficulties on wind instruments.</a:t>
-            </a:r>
-          </a:p>
-          <a:p>
-            <a:r>
-              <a:rPr lang="en-US" dirty="0" smtClean="0"/>
-              <a:t>However, they may disagree on the magnitude of the differences.</a:t>
+              <a:t>Related Work</a:t>
             </a:r>
             <a:endParaRPr lang="en-US" dirty="0"/>
           </a:p>
         </p:txBody>
       </p:sp>
-      <p:pic>
-        <p:nvPicPr>
-          <p:cNvPr id="4" name="Picture 3"/>
-          <p:cNvPicPr>
-            <a:picLocks noChangeAspect="1"/>
-          </p:cNvPicPr>
+      <p:sp>
+        <p:nvSpPr>
+          <p:cNvPr id="3" name="Content Placeholder 2"/>
+          <p:cNvSpPr>
+            <a:spLocks noGrp="1"/>
+          </p:cNvSpPr>
+          <p:nvPr>
+            <p:ph idx="1"/>
+          </p:nvPr>
+        </p:nvSpPr>
+        <p:spPr/>
+        <p:txBody>
+          <a:bodyPr>
+            <a:normAutofit/>
+          </a:bodyPr>
+          <a:lstStyle/>
+          <a:p>
+            <a:r>
+              <a:rPr lang="en-US" sz="2800" dirty="0" smtClean="0"/>
+              <a:t>Music Classification</a:t>
+            </a:r>
+          </a:p>
+          <a:p>
+            <a:pPr lvl="1"/>
+            <a:r>
+              <a:rPr lang="en-US" sz="2400" dirty="0" smtClean="0"/>
+              <a:t>Cuthbert2011 shows how to extract features from pieces and apply machine learning to classify the genre of a work.</a:t>
+            </a:r>
+          </a:p>
+          <a:p>
+            <a:pPr lvl="1"/>
+            <a:r>
+              <a:rPr lang="en-US" sz="2400" dirty="0" smtClean="0"/>
+              <a:t>Cataltepe2007 are able to classify MIDI pieces of music by approximating the Kolmogorov distance with a string representation and matching based on that measurement.</a:t>
+            </a:r>
+            <a:endParaRPr lang="en-US" sz="2400" dirty="0"/>
+          </a:p>
+        </p:txBody>
+      </p:sp>
+    </p:spTree>
+    <p:extLst>
+      <p:ext uri="{BB962C8B-B14F-4D97-AF65-F5344CB8AC3E}">
+        <p14:creationId xmlns:p14="http://schemas.microsoft.com/office/powerpoint/2010/main" val="2799883974"/>
+      </p:ext>
+    </p:extLst>
+  </p:cSld>
+  <p:clrMapOvr>
+    <a:masterClrMapping/>
+  </p:clrMapOvr>
+</p:sld>
+</file>
+
+<file path=ppt/slides/slide46.xml><?xml version="1.0" encoding="utf-8"?>
+<p:sld xmlns:a="http://schemas.openxmlformats.org/drawingml/2006/main" xmlns:r="http://schemas.openxmlformats.org/officeDocument/2006/relationships" xmlns:p="http://schemas.openxmlformats.org/presentationml/2006/main">
+  <p:cSld>
+    <p:spTree>
+      <p:nvGrpSpPr>
+        <p:cNvPr id="1" name=""/>
+        <p:cNvGrpSpPr/>
+        <p:nvPr/>
+      </p:nvGrpSpPr>
+      <p:grpSpPr>
+        <a:xfrm>
+          <a:off x="0" y="0"/>
+          <a:ext cx="0" cy="0"/>
+          <a:chOff x="0" y="0"/>
+          <a:chExt cx="0" cy="0"/>
+        </a:xfrm>
+      </p:grpSpPr>
+      <p:sp>
+        <p:nvSpPr>
+          <p:cNvPr id="2" name="Title 1"/>
+          <p:cNvSpPr>
+            <a:spLocks noGrp="1"/>
+          </p:cNvSpPr>
+          <p:nvPr>
+            <p:ph type="title"/>
+          </p:nvPr>
+        </p:nvSpPr>
+        <p:spPr/>
+        <p:txBody>
+          <a:bodyPr/>
+          <a:lstStyle/>
+          <a:p>
+            <a:endParaRPr lang="en-US"/>
+          </a:p>
+        </p:txBody>
+      </p:sp>
+      <p:sp>
+        <p:nvSpPr>
+          <p:cNvPr id="3" name="Content Placeholder 2"/>
+          <p:cNvSpPr>
+            <a:spLocks noGrp="1"/>
+          </p:cNvSpPr>
+          <p:nvPr>
+            <p:ph idx="1"/>
+          </p:nvPr>
+        </p:nvSpPr>
+        <p:spPr/>
+        <p:txBody>
+          <a:bodyPr/>
+          <a:lstStyle/>
+          <a:p>
+            <a:endParaRPr lang="en-US"/>
+          </a:p>
+        </p:txBody>
+      </p:sp>
+      <p:sp>
+        <p:nvSpPr>
+          <p:cNvPr id="4" name="TextBox 3"/>
+          <p:cNvSpPr txBox="1"/>
           <p:nvPr/>
-        </p:nvPicPr>
-        <p:blipFill>
-          <a:blip r:embed="rId3"/>
-          <a:stretch>
-            <a:fillRect/>
-          </a:stretch>
-        </p:blipFill>
+        </p:nvSpPr>
         <p:spPr>
           <a:xfrm>
-            <a:off x="4923802" y="2380080"/>
-            <a:ext cx="3343552" cy="2223605"/>
-          </a:xfrm>
-          <a:prstGeom prst="rect">
-            <a:avLst/>
-          </a:prstGeom>
-        </p:spPr>
-      </p:pic>
-      <p:sp>
-        <p:nvSpPr>
-          <p:cNvPr id="5" name="TextBox 4"/>
-          <p:cNvSpPr txBox="1"/>
-          <p:nvPr/>
-        </p:nvSpPr>
-        <p:spPr>
-          <a:xfrm>
-            <a:off x="8366760" y="4255994"/>
-            <a:ext cx="377544" cy="253916"/>
+            <a:off x="1015322" y="3003961"/>
+            <a:ext cx="7576113" cy="2585323"/>
           </a:xfrm>
           <a:prstGeom prst="rect">
             <a:avLst/>
@@ -13239,352 +14469,117 @@
           <a:noFill/>
         </p:spPr>
         <p:txBody>
-          <a:bodyPr wrap="square" rtlCol="0">
+          <a:bodyPr wrap="none" rtlCol="0">
             <a:spAutoFit/>
           </a:bodyPr>
           <a:lstStyle/>
           <a:p>
             <a:r>
-              <a:rPr lang="en-US" sz="1050" dirty="0" smtClean="0"/>
-              <a:t>[1]</a:t>
-            </a:r>
-            <a:endParaRPr lang="en-US" sz="1050" dirty="0"/>
-          </a:p>
-        </p:txBody>
-      </p:sp>
-      <p:sp>
-        <p:nvSpPr>
-          <p:cNvPr id="7" name="Content Placeholder 2"/>
-          <p:cNvSpPr txBox="1">
-            <a:spLocks/>
-          </p:cNvSpPr>
-          <p:nvPr/>
-        </p:nvSpPr>
-        <p:spPr>
-          <a:xfrm>
-            <a:off x="5609102" y="4839237"/>
-            <a:ext cx="2350495" cy="1792311"/>
-          </a:xfrm>
-          <a:prstGeom prst="rect">
-            <a:avLst/>
-          </a:prstGeom>
-        </p:spPr>
-        <p:txBody>
-          <a:bodyPr vert="horz" lIns="91440" tIns="45720" rIns="91440" bIns="45720" rtlCol="0">
-            <a:normAutofit fontScale="70000" lnSpcReduction="20000"/>
-          </a:bodyPr>
-          <a:lstStyle>
-            <a:lvl1pPr marL="342900" indent="-342900" algn="l" defTabSz="914400" rtl="0" eaLnBrk="1" latinLnBrk="0" hangingPunct="1">
-              <a:spcBef>
-                <a:spcPts val="2000"/>
-              </a:spcBef>
-              <a:buClr>
-                <a:schemeClr val="accent1"/>
-              </a:buClr>
-              <a:buSzPct val="90000"/>
-              <a:buFont typeface="Wingdings" pitchFamily="2" charset="2"/>
-              <a:buChar char="S"/>
-              <a:defRPr sz="2200" kern="1200">
+              <a:rPr lang="en-US" dirty="0" smtClean="0">
                 <a:solidFill>
                   <a:schemeClr val="tx1">
                     <a:lumMod val="65000"/>
                     <a:lumOff val="35000"/>
                   </a:schemeClr>
                 </a:solidFill>
-                <a:latin typeface="+mn-lt"/>
-                <a:ea typeface="+mn-ea"/>
-                <a:cs typeface="+mn-cs"/>
-              </a:defRPr>
-            </a:lvl1pPr>
-            <a:lvl2pPr marL="685800" indent="-336550" algn="l" defTabSz="914400" rtl="0" eaLnBrk="1" latinLnBrk="0" hangingPunct="1">
-              <a:spcBef>
-                <a:spcPts val="600"/>
-              </a:spcBef>
-              <a:buClr>
-                <a:schemeClr val="accent1">
-                  <a:lumMod val="60000"/>
-                  <a:lumOff val="40000"/>
+              </a:rPr>
+              <a:t>Note Total 	= Note Weights * All Multipliers 	= 69 * 1.75 		= 120.75</a:t>
+            </a:r>
+          </a:p>
+          <a:p>
+            <a:endParaRPr lang="en-US" dirty="0">
+              <a:solidFill>
+                <a:schemeClr val="tx1">
+                  <a:lumMod val="65000"/>
+                  <a:lumOff val="35000"/>
                 </a:schemeClr>
-              </a:buClr>
-              <a:buSzPct val="90000"/>
-              <a:buFont typeface="Wingdings" pitchFamily="2" charset="2"/>
-              <a:buChar char="S"/>
-              <a:defRPr sz="2000" kern="1200">
+              </a:solidFill>
+            </a:endParaRPr>
+          </a:p>
+          <a:p>
+            <a:r>
+              <a:rPr lang="en-US" dirty="0" smtClean="0">
                 <a:solidFill>
                   <a:schemeClr val="tx1">
                     <a:lumMod val="65000"/>
                     <a:lumOff val="35000"/>
                   </a:schemeClr>
                 </a:solidFill>
-                <a:latin typeface="+mn-lt"/>
-                <a:ea typeface="+mn-ea"/>
-                <a:cs typeface="+mn-cs"/>
-              </a:defRPr>
-            </a:lvl2pPr>
-            <a:lvl3pPr marL="1035050" indent="-349250" algn="l" defTabSz="914400" rtl="0" eaLnBrk="1" latinLnBrk="0" hangingPunct="1">
-              <a:spcBef>
-                <a:spcPts val="600"/>
-              </a:spcBef>
-              <a:buClr>
-                <a:schemeClr val="accent1"/>
-              </a:buClr>
-              <a:buSzPct val="90000"/>
-              <a:buFont typeface="Wingdings" pitchFamily="2" charset="2"/>
-              <a:buChar char="S"/>
-              <a:defRPr sz="1800" kern="1200">
+              </a:rPr>
+              <a:t>Interval Total 	= Interval Weights * All Multipliers	= 148.5 * 1.75 		= 259.875</a:t>
+            </a:r>
+          </a:p>
+          <a:p>
+            <a:endParaRPr lang="en-US" dirty="0">
+              <a:solidFill>
+                <a:schemeClr val="tx1">
+                  <a:lumMod val="65000"/>
+                  <a:lumOff val="35000"/>
+                </a:schemeClr>
+              </a:solidFill>
+            </a:endParaRPr>
+          </a:p>
+          <a:p>
+            <a:r>
+              <a:rPr lang="en-US" dirty="0">
                 <a:solidFill>
                   <a:schemeClr val="tx1">
                     <a:lumMod val="65000"/>
                     <a:lumOff val="35000"/>
                   </a:schemeClr>
                 </a:solidFill>
-                <a:latin typeface="+mn-lt"/>
-                <a:ea typeface="+mn-ea"/>
-                <a:cs typeface="+mn-cs"/>
-              </a:defRPr>
-            </a:lvl3pPr>
-            <a:lvl4pPr marL="1371600" indent="-336550" algn="l" defTabSz="914400" rtl="0" eaLnBrk="1" latinLnBrk="0" hangingPunct="1">
-              <a:spcBef>
-                <a:spcPts val="600"/>
-              </a:spcBef>
-              <a:buClr>
-                <a:schemeClr val="accent1">
-                  <a:lumMod val="60000"/>
-                  <a:lumOff val="40000"/>
-                </a:schemeClr>
-              </a:buClr>
-              <a:buSzPct val="90000"/>
-              <a:buFont typeface="Wingdings" pitchFamily="2" charset="2"/>
-              <a:buChar char="S"/>
-              <a:defRPr sz="1800" kern="1200">
+              </a:rPr>
+              <a:t>Total Score 	= Note Total + Interval </a:t>
+            </a:r>
+            <a:r>
+              <a:rPr lang="en-US" dirty="0" smtClean="0">
                 <a:solidFill>
                   <a:schemeClr val="tx1">
                     <a:lumMod val="65000"/>
                     <a:lumOff val="35000"/>
                   </a:schemeClr>
                 </a:solidFill>
-                <a:latin typeface="+mn-lt"/>
-                <a:ea typeface="+mn-ea"/>
-                <a:cs typeface="+mn-cs"/>
-              </a:defRPr>
-            </a:lvl4pPr>
-            <a:lvl5pPr marL="1720850" indent="-349250" algn="l" defTabSz="914400" rtl="0" eaLnBrk="1" latinLnBrk="0" hangingPunct="1">
-              <a:spcBef>
-                <a:spcPts val="600"/>
-              </a:spcBef>
-              <a:buClr>
-                <a:schemeClr val="accent1"/>
-              </a:buClr>
-              <a:buSzPct val="90000"/>
-              <a:buFont typeface="Wingdings" pitchFamily="2" charset="2"/>
-              <a:buChar char="S"/>
-              <a:defRPr sz="1800" kern="1200">
-                <a:solidFill>
-                  <a:schemeClr val="tx1">
-                    <a:lumMod val="65000"/>
-                    <a:lumOff val="35000"/>
-                  </a:schemeClr>
-                </a:solidFill>
-                <a:latin typeface="+mn-lt"/>
-                <a:ea typeface="+mn-ea"/>
-                <a:cs typeface="+mn-cs"/>
-              </a:defRPr>
-            </a:lvl5pPr>
-            <a:lvl6pPr marL="2055813" indent="-344488" algn="l" defTabSz="914400" rtl="0" eaLnBrk="1" latinLnBrk="0" hangingPunct="1">
-              <a:spcBef>
-                <a:spcPct val="20000"/>
-              </a:spcBef>
-              <a:buClr>
-                <a:schemeClr val="accent1">
-                  <a:lumMod val="60000"/>
-                  <a:lumOff val="40000"/>
+              </a:rPr>
+              <a:t>Total		= 120.75 + 259.875	= 380.625</a:t>
+            </a:r>
+          </a:p>
+          <a:p>
+            <a:endParaRPr lang="en-US" dirty="0">
+              <a:solidFill>
+                <a:schemeClr val="tx1">
+                  <a:lumMod val="65000"/>
+                  <a:lumOff val="35000"/>
                 </a:schemeClr>
-              </a:buClr>
-              <a:buSzPct val="90000"/>
-              <a:buFont typeface="Wingdings" pitchFamily="2" charset="2"/>
-              <a:buChar char=""/>
-              <a:defRPr lang="en-US" sz="1800" kern="1200" dirty="0" smtClean="0">
-                <a:solidFill>
-                  <a:schemeClr val="tx1">
-                    <a:lumMod val="65000"/>
-                    <a:lumOff val="35000"/>
-                  </a:schemeClr>
-                </a:solidFill>
-                <a:latin typeface="+mn-lt"/>
-                <a:ea typeface="+mn-ea"/>
-                <a:cs typeface="+mn-cs"/>
-              </a:defRPr>
-            </a:lvl6pPr>
-            <a:lvl7pPr marL="2398713" indent="-344488" algn="l" defTabSz="914400" rtl="0" eaLnBrk="1" latinLnBrk="0" hangingPunct="1">
-              <a:spcBef>
-                <a:spcPct val="20000"/>
-              </a:spcBef>
-              <a:buClr>
-                <a:schemeClr val="accent1"/>
-              </a:buClr>
-              <a:buSzPct val="90000"/>
-              <a:buFont typeface="Wingdings" pitchFamily="2" charset="2"/>
-              <a:buChar char=""/>
-              <a:defRPr lang="en-US" sz="1800" kern="1200" dirty="0" smtClean="0">
-                <a:solidFill>
-                  <a:schemeClr val="tx1">
-                    <a:lumMod val="65000"/>
-                    <a:lumOff val="35000"/>
-                  </a:schemeClr>
-                </a:solidFill>
-                <a:latin typeface="+mn-lt"/>
-                <a:ea typeface="+mn-ea"/>
-                <a:cs typeface="+mn-cs"/>
-              </a:defRPr>
-            </a:lvl7pPr>
-            <a:lvl8pPr marL="2743200" indent="-344488" algn="l" defTabSz="914400" rtl="0" eaLnBrk="1" latinLnBrk="0" hangingPunct="1">
-              <a:spcBef>
-                <a:spcPct val="20000"/>
-              </a:spcBef>
-              <a:buClr>
-                <a:schemeClr val="accent1">
-                  <a:lumMod val="60000"/>
-                  <a:lumOff val="40000"/>
-                </a:schemeClr>
-              </a:buClr>
-              <a:buSzPct val="90000"/>
-              <a:buFont typeface="Wingdings" pitchFamily="2" charset="2"/>
-              <a:buChar char=""/>
-              <a:defRPr lang="en-US" sz="1800" kern="1200" dirty="0" smtClean="0">
-                <a:solidFill>
-                  <a:schemeClr val="tx1">
-                    <a:lumMod val="65000"/>
-                    <a:lumOff val="35000"/>
-                  </a:schemeClr>
-                </a:solidFill>
-                <a:latin typeface="+mn-lt"/>
-                <a:ea typeface="+mn-ea"/>
-                <a:cs typeface="+mn-cs"/>
-              </a:defRPr>
-            </a:lvl8pPr>
-            <a:lvl9pPr marL="3087688" indent="-344488" algn="l" defTabSz="914400" rtl="0" eaLnBrk="1" latinLnBrk="0" hangingPunct="1">
-              <a:spcBef>
-                <a:spcPct val="20000"/>
-              </a:spcBef>
-              <a:buClr>
-                <a:schemeClr val="accent1"/>
-              </a:buClr>
-              <a:buSzPct val="90000"/>
-              <a:buFont typeface="Wingdings" pitchFamily="2" charset="2"/>
-              <a:buChar char=""/>
-              <a:defRPr lang="en-US" sz="1800" kern="1200" dirty="0">
-                <a:solidFill>
-                  <a:schemeClr val="tx1">
-                    <a:lumMod val="65000"/>
-                    <a:lumOff val="35000"/>
-                  </a:schemeClr>
-                </a:solidFill>
-                <a:latin typeface="+mn-lt"/>
-                <a:ea typeface="+mn-ea"/>
-                <a:cs typeface="+mn-cs"/>
-              </a:defRPr>
-            </a:lvl9pPr>
-          </a:lstStyle>
-          <a:p>
-            <a:pPr marL="0" indent="0" algn="ctr">
-              <a:buFont typeface="Wingdings" pitchFamily="2" charset="2"/>
-              <a:buNone/>
-            </a:pPr>
-            <a:endParaRPr lang="en-US" dirty="0" smtClean="0"/>
-          </a:p>
-          <a:p>
-            <a:pPr marL="0" indent="0" algn="ctr">
-              <a:buFont typeface="Wingdings" pitchFamily="2" charset="2"/>
-              <a:buNone/>
-            </a:pPr>
-            <a:r>
-              <a:rPr lang="en-US" sz="13800" dirty="0" smtClean="0"/>
-              <a:t>?</a:t>
-            </a:r>
-            <a:endParaRPr lang="en-US" sz="13800" dirty="0"/>
-          </a:p>
-        </p:txBody>
-      </p:sp>
-      <p:pic>
-        <p:nvPicPr>
-          <p:cNvPr id="8" name="Picture 7"/>
-          <p:cNvPicPr>
-            <a:picLocks noChangeAspect="1"/>
-          </p:cNvPicPr>
-          <p:nvPr/>
-        </p:nvPicPr>
-        <p:blipFill>
-          <a:blip r:embed="rId4">
-            <a:extLst>
-              <a:ext uri="{28A0092B-C50C-407E-A947-70E740481C1C}">
-                <a14:useLocalDpi xmlns:a14="http://schemas.microsoft.com/office/drawing/2010/main" val="0"/>
-              </a:ext>
-            </a:extLst>
-          </a:blip>
-          <a:stretch>
-            <a:fillRect/>
-          </a:stretch>
-        </p:blipFill>
-        <p:spPr>
-          <a:xfrm>
-            <a:off x="1400669" y="5374515"/>
-            <a:ext cx="5085856" cy="811162"/>
-          </a:xfrm>
-          <a:prstGeom prst="rect">
-            <a:avLst/>
-          </a:prstGeom>
-        </p:spPr>
-      </p:pic>
-      <p:sp>
-        <p:nvSpPr>
-          <p:cNvPr id="9" name="TextBox 8"/>
-          <p:cNvSpPr txBox="1"/>
-          <p:nvPr/>
-        </p:nvSpPr>
-        <p:spPr>
-          <a:xfrm>
-            <a:off x="2679074" y="5272264"/>
-            <a:ext cx="3748142" cy="1015663"/>
-          </a:xfrm>
-          <a:prstGeom prst="rect">
-            <a:avLst/>
-          </a:prstGeom>
-          <a:noFill/>
-        </p:spPr>
-        <p:txBody>
-          <a:bodyPr wrap="none" rtlCol="0">
-            <a:spAutoFit/>
-          </a:bodyPr>
-          <a:lstStyle/>
-          <a:p>
-            <a:r>
-              <a:rPr lang="en-US" sz="2000" b="1" dirty="0" smtClean="0">
-                <a:solidFill>
-                  <a:srgbClr val="FF0000"/>
-                </a:solidFill>
-              </a:rPr>
-              <a:t>                     2                 3                 4</a:t>
-            </a:r>
-          </a:p>
-          <a:p>
-            <a:endParaRPr lang="en-US" sz="2000" b="1" dirty="0">
-              <a:solidFill>
-                <a:srgbClr val="FF0000"/>
               </a:solidFill>
             </a:endParaRPr>
           </a:p>
           <a:p>
-            <a:r>
-              <a:rPr lang="en-US" sz="2000" b="1" dirty="0" smtClean="0">
-                <a:solidFill>
-                  <a:srgbClr val="FF0000"/>
-                </a:solidFill>
-              </a:rPr>
-              <a:t>             1                2                 1</a:t>
-            </a:r>
-            <a:endParaRPr lang="en-US" sz="2000" b="1" dirty="0">
+            <a:endParaRPr lang="en-US" dirty="0" smtClean="0">
               <a:solidFill>
-                <a:srgbClr val="FF0000"/>
+                <a:schemeClr val="tx1">
+                  <a:lumMod val="65000"/>
+                  <a:lumOff val="35000"/>
+                </a:schemeClr>
+              </a:solidFill>
+            </a:endParaRPr>
+          </a:p>
+          <a:p>
+            <a:endParaRPr lang="en-US" dirty="0">
+              <a:solidFill>
+                <a:schemeClr val="tx1">
+                  <a:lumMod val="65000"/>
+                  <a:lumOff val="35000"/>
+                </a:schemeClr>
+              </a:solidFill>
+            </a:endParaRPr>
+          </a:p>
+          <a:p>
+            <a:endParaRPr lang="en-US" dirty="0" smtClean="0">
+              <a:solidFill>
+                <a:schemeClr val="tx1">
+                  <a:lumMod val="65000"/>
+                  <a:lumOff val="35000"/>
+                </a:schemeClr>
               </a:solidFill>
             </a:endParaRPr>
           </a:p>
@@ -13593,20 +14588,13 @@
     </p:spTree>
     <p:extLst>
       <p:ext uri="{BB962C8B-B14F-4D97-AF65-F5344CB8AC3E}">
-        <p14:creationId xmlns:p14="http://schemas.microsoft.com/office/powerpoint/2010/main" val="4080678011"/>
+        <p14:creationId xmlns:p14="http://schemas.microsoft.com/office/powerpoint/2010/main" val="1398949278"/>
       </p:ext>
     </p:extLst>
   </p:cSld>
   <p:clrMapOvr>
     <a:masterClrMapping/>
   </p:clrMapOvr>
-  <p:timing>
-    <p:tnLst>
-      <p:par>
-        <p:cTn xmlns:p14="http://schemas.microsoft.com/office/powerpoint/2010/main" id="1" dur="indefinite" restart="never" nodeType="tmRoot"/>
-      </p:par>
-    </p:tnLst>
-  </p:timing>
 </p:sld>
 </file>
 
@@ -14889,7 +15877,7 @@
   <a:extraClrSchemeLst/>
   <a:extLst>
     <a:ext uri="{05A4C25C-085E-4340-85A3-A5531E510DB2}">
-      <thm15:themeFamily xmlns:thm15="http://schemas.microsoft.com/office/thememl/2012/main" xmlns="" name="Retrospect" id="{5F128B03-DCCA-4EEB-AB3B-CF2899314A46}" vid="{3F1AAB62-24C6-49D2-8E01-B56FAC9A3DCD}"/>
+      <thm15:themeFamily xmlns="" xmlns:thm15="http://schemas.microsoft.com/office/thememl/2012/main" name="Retrospect" id="{5F128B03-DCCA-4EEB-AB3B-CF2899314A46}" vid="{3F1AAB62-24C6-49D2-8E01-B56FAC9A3DCD}"/>
     </a:ext>
   </a:extLst>
 </a:theme>

</xml_diff>